<commit_message>
Moved DirectShow graph for tuner into a specific class
</commit_message>
<xml_diff>
--- a/doc/tsduck-diagrams.pptx
+++ b/doc/tsduck-diagrams.pptx
@@ -8,6 +8,7 @@
     <p:sldId id="256" r:id="rId2"/>
     <p:sldId id="257" r:id="rId3"/>
     <p:sldId id="258" r:id="rId4"/>
+    <p:sldId id="259" r:id="rId5"/>
   </p:sldIdLst>
   <p:sldSz cx="6858000" cy="9906000" type="A4"/>
   <p:notesSz cx="6858000" cy="9144000"/>
@@ -108,7 +109,7 @@
   </p:defaultTextStyle>
   <p:extLst>
     <p:ext uri="{EFAFB233-063F-42B5-8137-9DF3F51BA10A}">
-      <p15:sldGuideLst xmlns:p15="http://schemas.microsoft.com/office/powerpoint/2012/main" xmlns="">
+      <p15:sldGuideLst xmlns:p15="http://schemas.microsoft.com/office/powerpoint/2012/main">
         <p15:guide id="1" orient="horz" pos="3120">
           <p15:clr>
             <a:srgbClr val="A4A3A4"/>
@@ -256,7 +257,7 @@
           <a:p>
             <a:fld id="{58A7CDC3-5B40-B341-B3D1-EE720DBB9E8A}" type="datetimeFigureOut">
               <a:rPr lang="fr-FR" smtClean="0"/>
-              <a:t>21/11/2018</a:t>
+              <a:t>19/10/2019</a:t>
             </a:fld>
             <a:endParaRPr lang="fr-FR"/>
           </a:p>
@@ -421,7 +422,7 @@
           <a:p>
             <a:fld id="{58A7CDC3-5B40-B341-B3D1-EE720DBB9E8A}" type="datetimeFigureOut">
               <a:rPr lang="fr-FR" smtClean="0"/>
-              <a:t>21/11/2018</a:t>
+              <a:t>19/10/2019</a:t>
             </a:fld>
             <a:endParaRPr lang="fr-FR"/>
           </a:p>
@@ -596,7 +597,7 @@
           <a:p>
             <a:fld id="{58A7CDC3-5B40-B341-B3D1-EE720DBB9E8A}" type="datetimeFigureOut">
               <a:rPr lang="fr-FR" smtClean="0"/>
-              <a:t>21/11/2018</a:t>
+              <a:t>19/10/2019</a:t>
             </a:fld>
             <a:endParaRPr lang="fr-FR"/>
           </a:p>
@@ -761,7 +762,7 @@
           <a:p>
             <a:fld id="{58A7CDC3-5B40-B341-B3D1-EE720DBB9E8A}" type="datetimeFigureOut">
               <a:rPr lang="fr-FR" smtClean="0"/>
-              <a:t>21/11/2018</a:t>
+              <a:t>19/10/2019</a:t>
             </a:fld>
             <a:endParaRPr lang="fr-FR"/>
           </a:p>
@@ -1000,7 +1001,7 @@
           <a:p>
             <a:fld id="{58A7CDC3-5B40-B341-B3D1-EE720DBB9E8A}" type="datetimeFigureOut">
               <a:rPr lang="fr-FR" smtClean="0"/>
-              <a:t>21/11/2018</a:t>
+              <a:t>19/10/2019</a:t>
             </a:fld>
             <a:endParaRPr lang="fr-FR"/>
           </a:p>
@@ -1227,7 +1228,7 @@
           <a:p>
             <a:fld id="{58A7CDC3-5B40-B341-B3D1-EE720DBB9E8A}" type="datetimeFigureOut">
               <a:rPr lang="fr-FR" smtClean="0"/>
-              <a:t>21/11/2018</a:t>
+              <a:t>19/10/2019</a:t>
             </a:fld>
             <a:endParaRPr lang="fr-FR"/>
           </a:p>
@@ -1589,7 +1590,7 @@
           <a:p>
             <a:fld id="{58A7CDC3-5B40-B341-B3D1-EE720DBB9E8A}" type="datetimeFigureOut">
               <a:rPr lang="fr-FR" smtClean="0"/>
-              <a:t>21/11/2018</a:t>
+              <a:t>19/10/2019</a:t>
             </a:fld>
             <a:endParaRPr lang="fr-FR"/>
           </a:p>
@@ -1702,7 +1703,7 @@
           <a:p>
             <a:fld id="{58A7CDC3-5B40-B341-B3D1-EE720DBB9E8A}" type="datetimeFigureOut">
               <a:rPr lang="fr-FR" smtClean="0"/>
-              <a:t>21/11/2018</a:t>
+              <a:t>19/10/2019</a:t>
             </a:fld>
             <a:endParaRPr lang="fr-FR"/>
           </a:p>
@@ -1792,7 +1793,7 @@
           <a:p>
             <a:fld id="{58A7CDC3-5B40-B341-B3D1-EE720DBB9E8A}" type="datetimeFigureOut">
               <a:rPr lang="fr-FR" smtClean="0"/>
-              <a:t>21/11/2018</a:t>
+              <a:t>19/10/2019</a:t>
             </a:fld>
             <a:endParaRPr lang="fr-FR"/>
           </a:p>
@@ -2064,7 +2065,7 @@
           <a:p>
             <a:fld id="{58A7CDC3-5B40-B341-B3D1-EE720DBB9E8A}" type="datetimeFigureOut">
               <a:rPr lang="fr-FR" smtClean="0"/>
-              <a:t>21/11/2018</a:t>
+              <a:t>19/10/2019</a:t>
             </a:fld>
             <a:endParaRPr lang="fr-FR"/>
           </a:p>
@@ -2316,7 +2317,7 @@
           <a:p>
             <a:fld id="{58A7CDC3-5B40-B341-B3D1-EE720DBB9E8A}" type="datetimeFigureOut">
               <a:rPr lang="fr-FR" smtClean="0"/>
-              <a:t>21/11/2018</a:t>
+              <a:t>19/10/2019</a:t>
             </a:fld>
             <a:endParaRPr lang="fr-FR"/>
           </a:p>
@@ -2524,7 +2525,7 @@
           <a:p>
             <a:fld id="{58A7CDC3-5B40-B341-B3D1-EE720DBB9E8A}" type="datetimeFigureOut">
               <a:rPr lang="fr-FR" smtClean="0"/>
-              <a:t>21/11/2018</a:t>
+              <a:t>19/10/2019</a:t>
             </a:fld>
             <a:endParaRPr lang="fr-FR"/>
           </a:p>
@@ -5716,18 +5717,13 @@
           <a:p>
             <a:pPr algn="ctr"/>
             <a:r>
-              <a:rPr lang="fr-FR" sz="1000" b="1" noProof="1" smtClean="0">
+              <a:rPr lang="fr-FR" sz="1000" b="1" noProof="1">
                 <a:latin typeface="Cambria" panose="02040503050406030204" pitchFamily="18" charset="0"/>
                 <a:ea typeface="Arial Rounded MT Bold" charset="0"/>
                 <a:cs typeface="Arial Rounded MT Bold" charset="0"/>
               </a:rPr>
               <a:t>Media Server</a:t>
             </a:r>
-            <a:endParaRPr lang="fr-FR" sz="1000" b="1" noProof="1">
-              <a:latin typeface="Cambria" panose="02040503050406030204" pitchFamily="18" charset="0"/>
-              <a:ea typeface="Arial Rounded MT Bold" charset="0"/>
-              <a:cs typeface="Arial Rounded MT Bold" charset="0"/>
-            </a:endParaRPr>
           </a:p>
         </p:txBody>
       </p:sp>
@@ -5755,18 +5751,13 @@
           <a:p>
             <a:pPr algn="ctr"/>
             <a:r>
-              <a:rPr lang="fr-FR" sz="900" i="1" noProof="1" smtClean="0">
+              <a:rPr lang="fr-FR" sz="900" i="1" noProof="1">
                 <a:latin typeface="Cambria" panose="02040503050406030204" pitchFamily="18" charset="0"/>
                 <a:ea typeface="Arial Rounded MT Bold" charset="0"/>
                 <a:cs typeface="Arial Rounded MT Bold" charset="0"/>
               </a:rPr>
               <a:t>Network 1</a:t>
             </a:r>
-            <a:endParaRPr lang="fr-FR" sz="900" i="1" noProof="1">
-              <a:latin typeface="Cambria" panose="02040503050406030204" pitchFamily="18" charset="0"/>
-              <a:ea typeface="Arial Rounded MT Bold" charset="0"/>
-              <a:cs typeface="Arial Rounded MT Bold" charset="0"/>
-            </a:endParaRPr>
           </a:p>
         </p:txBody>
       </p:sp>
@@ -5834,18 +5825,13 @@
           <a:lstStyle/>
           <a:p>
             <a:r>
-              <a:rPr lang="fr-FR" sz="700" noProof="1" smtClean="0">
+              <a:rPr lang="fr-FR" sz="700" noProof="1">
                 <a:latin typeface="Cambria" panose="02040503050406030204" pitchFamily="18" charset="0"/>
                 <a:ea typeface="Arial Rounded MT Bold" charset="0"/>
                 <a:cs typeface="Arial Rounded MT Bold" charset="0"/>
               </a:rPr>
               <a:t>TSDuck</a:t>
             </a:r>
-            <a:endParaRPr lang="fr-FR" sz="700" noProof="1">
-              <a:latin typeface="Cambria" panose="02040503050406030204" pitchFamily="18" charset="0"/>
-              <a:ea typeface="Arial Rounded MT Bold" charset="0"/>
-              <a:cs typeface="Arial Rounded MT Bold" charset="0"/>
-            </a:endParaRPr>
           </a:p>
         </p:txBody>
       </p:sp>
@@ -5894,18 +5880,13 @@
           <a:p>
             <a:pPr algn="ctr"/>
             <a:r>
-              <a:rPr lang="fr-FR" sz="1000" b="1" noProof="1" smtClean="0">
+              <a:rPr lang="fr-FR" sz="1000" b="1" noProof="1">
                 <a:latin typeface="Cambria" panose="02040503050406030204" pitchFamily="18" charset="0"/>
                 <a:ea typeface="Arial Rounded MT Bold" charset="0"/>
                 <a:cs typeface="Arial Rounded MT Bold" charset="0"/>
               </a:rPr>
               <a:t>Linux or Windows</a:t>
             </a:r>
-            <a:endParaRPr lang="fr-FR" sz="1000" b="1" noProof="1">
-              <a:latin typeface="Cambria" panose="02040503050406030204" pitchFamily="18" charset="0"/>
-              <a:ea typeface="Arial Rounded MT Bold" charset="0"/>
-              <a:cs typeface="Arial Rounded MT Bold" charset="0"/>
-            </a:endParaRPr>
           </a:p>
         </p:txBody>
       </p:sp>
@@ -5995,7 +5976,7 @@
           <a:p>
             <a:pPr algn="ctr"/>
             <a:r>
-              <a:rPr lang="fr-FR" sz="900" noProof="1" smtClean="0">
+              <a:rPr lang="fr-FR" sz="900" noProof="1">
                 <a:solidFill>
                   <a:schemeClr val="tx1"/>
                 </a:solidFill>
@@ -6009,7 +5990,7 @@
           <a:p>
             <a:pPr algn="ctr"/>
             <a:r>
-              <a:rPr lang="fr-FR" sz="900" noProof="1" smtClean="0">
+              <a:rPr lang="fr-FR" sz="900" noProof="1">
                 <a:solidFill>
                   <a:schemeClr val="tx1"/>
                 </a:solidFill>
@@ -6019,14 +6000,6 @@
               </a:rPr>
               <a:t>tuner</a:t>
             </a:r>
-            <a:endParaRPr lang="fr-FR" sz="900" noProof="1">
-              <a:solidFill>
-                <a:schemeClr val="tx1"/>
-              </a:solidFill>
-              <a:latin typeface="Cambria" panose="02040503050406030204" pitchFamily="18" charset="0"/>
-              <a:ea typeface="Arial Rounded MT Bold" charset="0"/>
-              <a:cs typeface="Arial Rounded MT Bold" charset="0"/>
-            </a:endParaRPr>
           </a:p>
         </p:txBody>
       </p:sp>
@@ -6075,18 +6048,13 @@
           <a:p>
             <a:pPr algn="ctr"/>
             <a:r>
-              <a:rPr lang="fr-FR" sz="1000" b="1" noProof="1" smtClean="0">
+              <a:rPr lang="fr-FR" sz="1000" b="1" noProof="1">
                 <a:latin typeface="Cambria" panose="02040503050406030204" pitchFamily="18" charset="0"/>
                 <a:ea typeface="Arial Rounded MT Bold" charset="0"/>
                 <a:cs typeface="Arial Rounded MT Bold" charset="0"/>
               </a:rPr>
               <a:t>Linux or Windows</a:t>
             </a:r>
-            <a:endParaRPr lang="fr-FR" sz="1000" b="1" noProof="1">
-              <a:latin typeface="Cambria" panose="02040503050406030204" pitchFamily="18" charset="0"/>
-              <a:ea typeface="Arial Rounded MT Bold" charset="0"/>
-              <a:cs typeface="Arial Rounded MT Bold" charset="0"/>
-            </a:endParaRPr>
           </a:p>
         </p:txBody>
       </p:sp>
@@ -6181,7 +6149,7 @@
           <a:p>
             <a:pPr algn="ctr"/>
             <a:r>
-              <a:rPr lang="fr-FR" sz="900" i="1" noProof="1" smtClean="0">
+              <a:rPr lang="fr-FR" sz="900" i="1" noProof="1">
                 <a:solidFill>
                   <a:schemeClr val="tx1"/>
                 </a:solidFill>
@@ -6191,14 +6159,6 @@
               </a:rPr>
               <a:t>tsp</a:t>
             </a:r>
-            <a:endParaRPr lang="fr-FR" sz="900" i="1" noProof="1">
-              <a:solidFill>
-                <a:schemeClr val="tx1"/>
-              </a:solidFill>
-              <a:latin typeface="Cambria" panose="02040503050406030204" pitchFamily="18" charset="0"/>
-              <a:ea typeface="Arial Rounded MT Bold" charset="0"/>
-              <a:cs typeface="Arial Rounded MT Bold" charset="0"/>
-            </a:endParaRPr>
           </a:p>
         </p:txBody>
       </p:sp>
@@ -6250,7 +6210,7 @@
           <a:p>
             <a:pPr algn="ctr"/>
             <a:r>
-              <a:rPr lang="fr-FR" sz="900" noProof="1" smtClean="0">
+              <a:rPr lang="fr-FR" sz="900" noProof="1">
                 <a:solidFill>
                   <a:schemeClr val="tx1"/>
                 </a:solidFill>
@@ -6260,14 +6220,6 @@
               </a:rPr>
               <a:t>Dektec modulator</a:t>
             </a:r>
-            <a:endParaRPr lang="fr-FR" sz="900" noProof="1">
-              <a:solidFill>
-                <a:schemeClr val="tx1"/>
-              </a:solidFill>
-              <a:latin typeface="Cambria" panose="02040503050406030204" pitchFamily="18" charset="0"/>
-              <a:ea typeface="Arial Rounded MT Bold" charset="0"/>
-              <a:cs typeface="Arial Rounded MT Bold" charset="0"/>
-            </a:endParaRPr>
           </a:p>
         </p:txBody>
       </p:sp>
@@ -6316,18 +6268,13 @@
           <a:p>
             <a:pPr algn="ctr"/>
             <a:r>
-              <a:rPr lang="fr-FR" sz="1000" b="1" noProof="1" smtClean="0">
+              <a:rPr lang="fr-FR" sz="1000" b="1" noProof="1">
                 <a:latin typeface="Cambria" panose="02040503050406030204" pitchFamily="18" charset="0"/>
                 <a:ea typeface="Arial Rounded MT Bold" charset="0"/>
                 <a:cs typeface="Arial Rounded MT Bold" charset="0"/>
               </a:rPr>
               <a:t>STB</a:t>
             </a:r>
-            <a:endParaRPr lang="fr-FR" sz="1000" b="1" noProof="1">
-              <a:latin typeface="Cambria" panose="02040503050406030204" pitchFamily="18" charset="0"/>
-              <a:ea typeface="Arial Rounded MT Bold" charset="0"/>
-              <a:cs typeface="Arial Rounded MT Bold" charset="0"/>
-            </a:endParaRPr>
           </a:p>
         </p:txBody>
       </p:sp>
@@ -6376,18 +6323,13 @@
           <a:p>
             <a:pPr algn="ctr"/>
             <a:r>
-              <a:rPr lang="fr-FR" sz="1000" b="1" noProof="1" smtClean="0">
+              <a:rPr lang="fr-FR" sz="1000" b="1" noProof="1">
                 <a:latin typeface="Cambria" panose="02040503050406030204" pitchFamily="18" charset="0"/>
                 <a:ea typeface="Arial Rounded MT Bold" charset="0"/>
                 <a:cs typeface="Arial Rounded MT Bold" charset="0"/>
               </a:rPr>
               <a:t>STB</a:t>
             </a:r>
-            <a:endParaRPr lang="fr-FR" sz="1000" b="1" noProof="1">
-              <a:latin typeface="Cambria" panose="02040503050406030204" pitchFamily="18" charset="0"/>
-              <a:ea typeface="Arial Rounded MT Bold" charset="0"/>
-              <a:cs typeface="Arial Rounded MT Bold" charset="0"/>
-            </a:endParaRPr>
           </a:p>
         </p:txBody>
       </p:sp>
@@ -6704,18 +6646,13 @@
           <a:p>
             <a:pPr algn="ctr"/>
             <a:r>
-              <a:rPr lang="fr-FR" sz="900" i="1" noProof="1" smtClean="0">
+              <a:rPr lang="fr-FR" sz="900" i="1" noProof="1">
                 <a:latin typeface="Cambria" panose="02040503050406030204" pitchFamily="18" charset="0"/>
                 <a:ea typeface="Arial Rounded MT Bold" charset="0"/>
                 <a:cs typeface="Arial Rounded MT Bold" charset="0"/>
               </a:rPr>
               <a:t>Multicast to 224.250.250.1 : 9000</a:t>
             </a:r>
-            <a:endParaRPr lang="fr-FR" sz="900" i="1" noProof="1">
-              <a:latin typeface="Cambria" panose="02040503050406030204" pitchFamily="18" charset="0"/>
-              <a:ea typeface="Arial Rounded MT Bold" charset="0"/>
-              <a:cs typeface="Arial Rounded MT Bold" charset="0"/>
-            </a:endParaRPr>
           </a:p>
         </p:txBody>
       </p:sp>
@@ -6743,18 +6680,13 @@
           <a:p>
             <a:pPr algn="ctr"/>
             <a:r>
-              <a:rPr lang="fr-FR" sz="900" i="1" noProof="1" smtClean="0">
+              <a:rPr lang="fr-FR" sz="900" i="1" noProof="1">
                 <a:latin typeface="Cambria" panose="02040503050406030204" pitchFamily="18" charset="0"/>
                 <a:ea typeface="Arial Rounded MT Bold" charset="0"/>
                 <a:cs typeface="Arial Rounded MT Bold" charset="0"/>
               </a:rPr>
               <a:t>Network 2</a:t>
             </a:r>
-            <a:endParaRPr lang="fr-FR" sz="900" i="1" noProof="1">
-              <a:latin typeface="Cambria" panose="02040503050406030204" pitchFamily="18" charset="0"/>
-              <a:ea typeface="Arial Rounded MT Bold" charset="0"/>
-              <a:cs typeface="Arial Rounded MT Bold" charset="0"/>
-            </a:endParaRPr>
           </a:p>
         </p:txBody>
       </p:sp>
@@ -6803,18 +6735,13 @@
           <a:p>
             <a:pPr algn="ctr"/>
             <a:r>
-              <a:rPr lang="fr-FR" sz="1000" b="1" noProof="1" smtClean="0">
+              <a:rPr lang="fr-FR" sz="1000" b="1" noProof="1">
                 <a:latin typeface="Cambria" panose="02040503050406030204" pitchFamily="18" charset="0"/>
                 <a:ea typeface="Arial Rounded MT Bold" charset="0"/>
                 <a:cs typeface="Arial Rounded MT Bold" charset="0"/>
               </a:rPr>
               <a:t>STB</a:t>
             </a:r>
-            <a:endParaRPr lang="fr-FR" sz="1000" b="1" noProof="1">
-              <a:latin typeface="Cambria" panose="02040503050406030204" pitchFamily="18" charset="0"/>
-              <a:ea typeface="Arial Rounded MT Bold" charset="0"/>
-              <a:cs typeface="Arial Rounded MT Bold" charset="0"/>
-            </a:endParaRPr>
           </a:p>
         </p:txBody>
       </p:sp>
@@ -6863,18 +6790,13 @@
           <a:p>
             <a:pPr algn="ctr"/>
             <a:r>
-              <a:rPr lang="fr-FR" sz="1000" b="1" noProof="1" smtClean="0">
+              <a:rPr lang="fr-FR" sz="1000" b="1" noProof="1">
                 <a:latin typeface="Cambria" panose="02040503050406030204" pitchFamily="18" charset="0"/>
                 <a:ea typeface="Arial Rounded MT Bold" charset="0"/>
                 <a:cs typeface="Arial Rounded MT Bold" charset="0"/>
               </a:rPr>
               <a:t>STB</a:t>
             </a:r>
-            <a:endParaRPr lang="fr-FR" sz="1000" b="1" noProof="1">
-              <a:latin typeface="Cambria" panose="02040503050406030204" pitchFamily="18" charset="0"/>
-              <a:ea typeface="Arial Rounded MT Bold" charset="0"/>
-              <a:cs typeface="Arial Rounded MT Bold" charset="0"/>
-            </a:endParaRPr>
           </a:p>
         </p:txBody>
       </p:sp>
@@ -7152,18 +7074,13 @@
           <a:p>
             <a:pPr algn="ctr"/>
             <a:r>
-              <a:rPr lang="fr-FR" sz="900" i="1" noProof="1" smtClean="0">
+              <a:rPr lang="fr-FR" sz="900" i="1" noProof="1">
                 <a:latin typeface="Cambria" panose="02040503050406030204" pitchFamily="18" charset="0"/>
                 <a:ea typeface="Arial Rounded MT Bold" charset="0"/>
                 <a:cs typeface="Arial Rounded MT Bold" charset="0"/>
               </a:rPr>
               <a:t>Multicast to 230.2.3.4 : 7000</a:t>
             </a:r>
-            <a:endParaRPr lang="fr-FR" sz="900" i="1" noProof="1">
-              <a:latin typeface="Cambria" panose="02040503050406030204" pitchFamily="18" charset="0"/>
-              <a:ea typeface="Arial Rounded MT Bold" charset="0"/>
-              <a:cs typeface="Arial Rounded MT Bold" charset="0"/>
-            </a:endParaRPr>
           </a:p>
         </p:txBody>
       </p:sp>
@@ -7212,18 +7129,13 @@
           <a:p>
             <a:pPr algn="ctr"/>
             <a:r>
-              <a:rPr lang="fr-FR" sz="1000" b="1" noProof="1" smtClean="0">
+              <a:rPr lang="fr-FR" sz="1000" b="1" noProof="1">
                 <a:latin typeface="Cambria" panose="02040503050406030204" pitchFamily="18" charset="0"/>
                 <a:ea typeface="Arial Rounded MT Bold" charset="0"/>
                 <a:cs typeface="Arial Rounded MT Bold" charset="0"/>
               </a:rPr>
               <a:t>STB</a:t>
             </a:r>
-            <a:endParaRPr lang="fr-FR" sz="1000" b="1" noProof="1">
-              <a:latin typeface="Cambria" panose="02040503050406030204" pitchFamily="18" charset="0"/>
-              <a:ea typeface="Arial Rounded MT Bold" charset="0"/>
-              <a:cs typeface="Arial Rounded MT Bold" charset="0"/>
-            </a:endParaRPr>
           </a:p>
         </p:txBody>
       </p:sp>
@@ -7366,18 +7278,13 @@
           <a:p>
             <a:pPr algn="ctr"/>
             <a:r>
-              <a:rPr lang="fr-FR" sz="900" i="1" noProof="1" smtClean="0">
+              <a:rPr lang="fr-FR" sz="900" i="1" noProof="1">
                 <a:latin typeface="Cambria" panose="02040503050406030204" pitchFamily="18" charset="0"/>
                 <a:ea typeface="Arial Rounded MT Bold" charset="0"/>
                 <a:cs typeface="Arial Rounded MT Bold" charset="0"/>
               </a:rPr>
               <a:t>MPE encapsulation, forged destination: 230.2.3.4 : 7000</a:t>
             </a:r>
-            <a:endParaRPr lang="fr-FR" sz="900" i="1" noProof="1">
-              <a:latin typeface="Cambria" panose="02040503050406030204" pitchFamily="18" charset="0"/>
-              <a:ea typeface="Arial Rounded MT Bold" charset="0"/>
-              <a:cs typeface="Arial Rounded MT Bold" charset="0"/>
-            </a:endParaRPr>
           </a:p>
         </p:txBody>
       </p:sp>
@@ -7467,7 +7374,7 @@
           <a:p>
             <a:pPr algn="ctr"/>
             <a:r>
-              <a:rPr lang="fr-FR" sz="900" noProof="1" smtClean="0">
+              <a:rPr lang="fr-FR" sz="900" noProof="1">
                 <a:solidFill>
                   <a:schemeClr val="tx1"/>
                 </a:solidFill>
@@ -7481,7 +7388,7 @@
           <a:p>
             <a:pPr algn="ctr"/>
             <a:r>
-              <a:rPr lang="fr-FR" sz="900" noProof="1" smtClean="0">
+              <a:rPr lang="fr-FR" sz="900" noProof="1">
                 <a:solidFill>
                   <a:schemeClr val="tx1"/>
                 </a:solidFill>
@@ -7491,14 +7398,6 @@
               </a:rPr>
               <a:t>tuner</a:t>
             </a:r>
-            <a:endParaRPr lang="fr-FR" sz="900" noProof="1">
-              <a:solidFill>
-                <a:schemeClr val="tx1"/>
-              </a:solidFill>
-              <a:latin typeface="Cambria" panose="02040503050406030204" pitchFamily="18" charset="0"/>
-              <a:ea typeface="Arial Rounded MT Bold" charset="0"/>
-              <a:cs typeface="Arial Rounded MT Bold" charset="0"/>
-            </a:endParaRPr>
           </a:p>
         </p:txBody>
       </p:sp>
@@ -7736,7 +7635,7 @@
           <a:p>
             <a:pPr algn="ctr"/>
             <a:r>
-              <a:rPr lang="fr-FR" sz="900" i="1" noProof="1" smtClean="0">
+              <a:rPr lang="fr-FR" sz="900" i="1" noProof="1">
                 <a:solidFill>
                   <a:schemeClr val="tx1"/>
                 </a:solidFill>
@@ -7746,14 +7645,6 @@
               </a:rPr>
               <a:t>tsp</a:t>
             </a:r>
-            <a:endParaRPr lang="fr-FR" sz="900" i="1" noProof="1">
-              <a:solidFill>
-                <a:schemeClr val="tx1"/>
-              </a:solidFill>
-              <a:latin typeface="Cambria" panose="02040503050406030204" pitchFamily="18" charset="0"/>
-              <a:ea typeface="Arial Rounded MT Bold" charset="0"/>
-              <a:cs typeface="Arial Rounded MT Bold" charset="0"/>
-            </a:endParaRPr>
           </a:p>
         </p:txBody>
       </p:sp>
@@ -7903,7 +7794,7 @@
           <a:p>
             <a:pPr algn="ctr"/>
             <a:r>
-              <a:rPr lang="fr-FR" sz="600" b="1" noProof="1" smtClean="0">
+              <a:rPr lang="fr-FR" sz="600" b="1" noProof="1">
                 <a:solidFill>
                   <a:schemeClr val="tx1"/>
                 </a:solidFill>
@@ -7913,14 +7804,6 @@
               </a:rPr>
               <a:t>tsp</a:t>
             </a:r>
-            <a:endParaRPr lang="fr-FR" sz="600" b="1" noProof="1">
-              <a:solidFill>
-                <a:schemeClr val="tx1"/>
-              </a:solidFill>
-              <a:latin typeface="Cambria" panose="02040503050406030204" pitchFamily="18" charset="0"/>
-              <a:ea typeface="Arial Rounded MT Bold" charset="0"/>
-              <a:cs typeface="Arial Rounded MT Bold" charset="0"/>
-            </a:endParaRPr>
           </a:p>
         </p:txBody>
       </p:sp>
@@ -7967,18 +7850,13 @@
           <a:p>
             <a:pPr algn="ctr"/>
             <a:r>
-              <a:rPr lang="fr-FR" sz="600" i="1" noProof="1" smtClean="0">
+              <a:rPr lang="fr-FR" sz="600" i="1" noProof="1">
                 <a:latin typeface="Cambria" panose="02040503050406030204" pitchFamily="18" charset="0"/>
                 <a:ea typeface="Arial Rounded MT Bold" charset="0"/>
                 <a:cs typeface="Arial Rounded MT Bold" charset="0"/>
               </a:rPr>
               <a:t>input</a:t>
             </a:r>
-            <a:endParaRPr lang="fr-FR" sz="600" i="1" noProof="1">
-              <a:latin typeface="Cambria" panose="02040503050406030204" pitchFamily="18" charset="0"/>
-              <a:ea typeface="Arial Rounded MT Bold" charset="0"/>
-              <a:cs typeface="Arial Rounded MT Bold" charset="0"/>
-            </a:endParaRPr>
           </a:p>
         </p:txBody>
       </p:sp>
@@ -8044,18 +7922,13 @@
           <a:lstStyle/>
           <a:p>
             <a:r>
-              <a:rPr lang="fr-FR" sz="600" noProof="1" smtClean="0">
+              <a:rPr lang="fr-FR" sz="600" noProof="1">
                 <a:latin typeface="Cambria" panose="02040503050406030204" pitchFamily="18" charset="0"/>
                 <a:ea typeface="Arial Rounded MT Bold" charset="0"/>
                 <a:cs typeface="Arial Rounded MT Bold" charset="0"/>
               </a:rPr>
               <a:t>input TS 2</a:t>
             </a:r>
-            <a:endParaRPr lang="fr-FR" sz="600" noProof="1">
-              <a:latin typeface="Cambria" panose="02040503050406030204" pitchFamily="18" charset="0"/>
-              <a:ea typeface="Arial Rounded MT Bold" charset="0"/>
-              <a:cs typeface="Arial Rounded MT Bold" charset="0"/>
-            </a:endParaRPr>
           </a:p>
         </p:txBody>
       </p:sp>
@@ -8082,18 +7955,13 @@
           <a:lstStyle/>
           <a:p>
             <a:r>
-              <a:rPr lang="fr-FR" sz="600" noProof="1" smtClean="0">
+              <a:rPr lang="fr-FR" sz="600" noProof="1">
                 <a:latin typeface="Cambria" panose="02040503050406030204" pitchFamily="18" charset="0"/>
                 <a:ea typeface="Arial Rounded MT Bold" charset="0"/>
                 <a:cs typeface="Arial Rounded MT Bold" charset="0"/>
               </a:rPr>
               <a:t>output TS 2</a:t>
             </a:r>
-            <a:endParaRPr lang="fr-FR" sz="600" noProof="1">
-              <a:latin typeface="Cambria" panose="02040503050406030204" pitchFamily="18" charset="0"/>
-              <a:ea typeface="Arial Rounded MT Bold" charset="0"/>
-              <a:cs typeface="Arial Rounded MT Bold" charset="0"/>
-            </a:endParaRPr>
           </a:p>
         </p:txBody>
       </p:sp>
@@ -8140,18 +8008,13 @@
           <a:p>
             <a:pPr algn="ctr"/>
             <a:r>
-              <a:rPr lang="fr-FR" sz="600" i="1" noProof="1" smtClean="0">
+              <a:rPr lang="fr-FR" sz="600" i="1" noProof="1">
                 <a:latin typeface="Cambria" panose="02040503050406030204" pitchFamily="18" charset="0"/>
                 <a:ea typeface="Arial Rounded MT Bold" charset="0"/>
                 <a:cs typeface="Arial Rounded MT Bold" charset="0"/>
               </a:rPr>
               <a:t>plugin</a:t>
             </a:r>
-            <a:endParaRPr lang="fr-FR" sz="600" i="1" noProof="1">
-              <a:latin typeface="Cambria" panose="02040503050406030204" pitchFamily="18" charset="0"/>
-              <a:ea typeface="Arial Rounded MT Bold" charset="0"/>
-              <a:cs typeface="Arial Rounded MT Bold" charset="0"/>
-            </a:endParaRPr>
           </a:p>
         </p:txBody>
       </p:sp>
@@ -8198,18 +8061,13 @@
           <a:p>
             <a:pPr algn="ctr"/>
             <a:r>
-              <a:rPr lang="fr-FR" sz="600" b="1" noProof="1" smtClean="0">
+              <a:rPr lang="fr-FR" sz="600" b="1" noProof="1">
                 <a:latin typeface="Consolas" panose="020B0609020204030204" pitchFamily="49" charset="0"/>
                 <a:ea typeface="Arial Rounded MT Bold" charset="0"/>
                 <a:cs typeface="Consolas" panose="020B0609020204030204" pitchFamily="49" charset="0"/>
               </a:rPr>
               <a:t>merge</a:t>
             </a:r>
-            <a:endParaRPr lang="fr-FR" sz="600" b="1" noProof="1">
-              <a:latin typeface="Consolas" panose="020B0609020204030204" pitchFamily="49" charset="0"/>
-              <a:ea typeface="Arial Rounded MT Bold" charset="0"/>
-              <a:cs typeface="Consolas" panose="020B0609020204030204" pitchFamily="49" charset="0"/>
-            </a:endParaRPr>
           </a:p>
         </p:txBody>
       </p:sp>
@@ -8256,7 +8114,7 @@
           <a:p>
             <a:pPr algn="ctr"/>
             <a:r>
-              <a:rPr lang="fr-FR" sz="600" b="1" noProof="1" smtClean="0">
+              <a:rPr lang="fr-FR" sz="600" b="1" noProof="1">
                 <a:latin typeface="Consolas" panose="020B0609020204030204" pitchFamily="49" charset="0"/>
                 <a:ea typeface="Arial Rounded MT Bold" charset="0"/>
                 <a:cs typeface="Consolas" panose="020B0609020204030204" pitchFamily="49" charset="0"/>
@@ -8314,18 +8172,13 @@
           <a:p>
             <a:pPr algn="ctr"/>
             <a:r>
-              <a:rPr lang="fr-FR" sz="600" i="1" noProof="1" smtClean="0">
+              <a:rPr lang="fr-FR" sz="600" i="1" noProof="1">
                 <a:latin typeface="Cambria" panose="02040503050406030204" pitchFamily="18" charset="0"/>
                 <a:ea typeface="Arial Rounded MT Bold" charset="0"/>
                 <a:cs typeface="Arial Rounded MT Bold" charset="0"/>
               </a:rPr>
               <a:t>plugin</a:t>
             </a:r>
-            <a:endParaRPr lang="fr-FR" sz="600" i="1" noProof="1">
-              <a:latin typeface="Cambria" panose="02040503050406030204" pitchFamily="18" charset="0"/>
-              <a:ea typeface="Arial Rounded MT Bold" charset="0"/>
-              <a:cs typeface="Arial Rounded MT Bold" charset="0"/>
-            </a:endParaRPr>
           </a:p>
         </p:txBody>
       </p:sp>
@@ -8372,7 +8225,7 @@
           <a:p>
             <a:pPr algn="ctr"/>
             <a:r>
-              <a:rPr lang="fr-FR" sz="600" b="1" noProof="1" smtClean="0">
+              <a:rPr lang="fr-FR" sz="600" b="1" noProof="1">
                 <a:latin typeface="Consolas" panose="020B0609020204030204" pitchFamily="49" charset="0"/>
                 <a:ea typeface="Arial Rounded MT Bold" charset="0"/>
                 <a:cs typeface="Consolas" panose="020B0609020204030204" pitchFamily="49" charset="0"/>
@@ -8430,7 +8283,7 @@
           <a:p>
             <a:pPr algn="ctr"/>
             <a:r>
-              <a:rPr lang="fr-FR" sz="600" b="1" noProof="1" smtClean="0">
+              <a:rPr lang="fr-FR" sz="600" b="1" noProof="1">
                 <a:latin typeface="Consolas" panose="020B0609020204030204" pitchFamily="49" charset="0"/>
                 <a:ea typeface="Arial Rounded MT Bold" charset="0"/>
                 <a:cs typeface="Consolas" panose="020B0609020204030204" pitchFamily="49" charset="0"/>
@@ -8488,18 +8341,13 @@
           <a:p>
             <a:pPr algn="ctr"/>
             <a:r>
-              <a:rPr lang="fr-FR" sz="600" i="1" noProof="1" smtClean="0">
+              <a:rPr lang="fr-FR" sz="600" i="1" noProof="1">
                 <a:latin typeface="Cambria" panose="02040503050406030204" pitchFamily="18" charset="0"/>
                 <a:ea typeface="Arial Rounded MT Bold" charset="0"/>
                 <a:cs typeface="Arial Rounded MT Bold" charset="0"/>
               </a:rPr>
               <a:t>output</a:t>
             </a:r>
-            <a:endParaRPr lang="fr-FR" sz="600" i="1" noProof="1">
-              <a:latin typeface="Cambria" panose="02040503050406030204" pitchFamily="18" charset="0"/>
-              <a:ea typeface="Arial Rounded MT Bold" charset="0"/>
-              <a:cs typeface="Arial Rounded MT Bold" charset="0"/>
-            </a:endParaRPr>
           </a:p>
         </p:txBody>
       </p:sp>
@@ -8870,7 +8718,7 @@
           <a:p>
             <a:pPr algn="ctr"/>
             <a:r>
-              <a:rPr lang="fr-FR" sz="600" b="1" noProof="1" smtClean="0">
+              <a:rPr lang="fr-FR" sz="600" b="1" noProof="1">
                 <a:solidFill>
                   <a:schemeClr val="tx1"/>
                 </a:solidFill>
@@ -8880,14 +8728,6 @@
               </a:rPr>
               <a:t>tsp</a:t>
             </a:r>
-            <a:endParaRPr lang="fr-FR" sz="600" b="1" noProof="1">
-              <a:solidFill>
-                <a:schemeClr val="tx1"/>
-              </a:solidFill>
-              <a:latin typeface="Cambria" panose="02040503050406030204" pitchFamily="18" charset="0"/>
-              <a:ea typeface="Arial Rounded MT Bold" charset="0"/>
-              <a:cs typeface="Arial Rounded MT Bold" charset="0"/>
-            </a:endParaRPr>
           </a:p>
         </p:txBody>
       </p:sp>
@@ -8934,18 +8774,13 @@
           <a:p>
             <a:pPr algn="ctr"/>
             <a:r>
-              <a:rPr lang="fr-FR" sz="600" i="1" noProof="1" smtClean="0">
+              <a:rPr lang="fr-FR" sz="600" i="1" noProof="1">
                 <a:latin typeface="Cambria" panose="02040503050406030204" pitchFamily="18" charset="0"/>
                 <a:ea typeface="Arial Rounded MT Bold" charset="0"/>
                 <a:cs typeface="Arial Rounded MT Bold" charset="0"/>
               </a:rPr>
               <a:t>input</a:t>
             </a:r>
-            <a:endParaRPr lang="fr-FR" sz="600" i="1" noProof="1">
-              <a:latin typeface="Cambria" panose="02040503050406030204" pitchFamily="18" charset="0"/>
-              <a:ea typeface="Arial Rounded MT Bold" charset="0"/>
-              <a:cs typeface="Arial Rounded MT Bold" charset="0"/>
-            </a:endParaRPr>
           </a:p>
         </p:txBody>
       </p:sp>
@@ -8992,18 +8827,13 @@
           <a:p>
             <a:pPr algn="ctr"/>
             <a:r>
-              <a:rPr lang="fr-FR" sz="600" i="1" noProof="1" smtClean="0">
+              <a:rPr lang="fr-FR" sz="600" i="1" noProof="1">
                 <a:latin typeface="Cambria" panose="02040503050406030204" pitchFamily="18" charset="0"/>
                 <a:ea typeface="Arial Rounded MT Bold" charset="0"/>
                 <a:cs typeface="Arial Rounded MT Bold" charset="0"/>
               </a:rPr>
               <a:t>plugin</a:t>
             </a:r>
-            <a:endParaRPr lang="fr-FR" sz="600" i="1" noProof="1">
-              <a:latin typeface="Cambria" panose="02040503050406030204" pitchFamily="18" charset="0"/>
-              <a:ea typeface="Arial Rounded MT Bold" charset="0"/>
-              <a:cs typeface="Arial Rounded MT Bold" charset="0"/>
-            </a:endParaRPr>
           </a:p>
         </p:txBody>
       </p:sp>
@@ -9050,18 +8880,13 @@
           <a:p>
             <a:pPr algn="ctr"/>
             <a:r>
-              <a:rPr lang="fr-FR" sz="600" i="1" noProof="1" smtClean="0">
+              <a:rPr lang="fr-FR" sz="600" i="1" noProof="1">
                 <a:latin typeface="Cambria" panose="02040503050406030204" pitchFamily="18" charset="0"/>
                 <a:ea typeface="Arial Rounded MT Bold" charset="0"/>
                 <a:cs typeface="Arial Rounded MT Bold" charset="0"/>
               </a:rPr>
               <a:t>plugin</a:t>
             </a:r>
-            <a:endParaRPr lang="fr-FR" sz="600" i="1" noProof="1">
-              <a:latin typeface="Cambria" panose="02040503050406030204" pitchFamily="18" charset="0"/>
-              <a:ea typeface="Arial Rounded MT Bold" charset="0"/>
-              <a:cs typeface="Arial Rounded MT Bold" charset="0"/>
-            </a:endParaRPr>
           </a:p>
         </p:txBody>
       </p:sp>
@@ -9108,7 +8933,7 @@
           <a:p>
             <a:pPr algn="ctr"/>
             <a:r>
-              <a:rPr lang="fr-FR" sz="600" b="1" noProof="1" smtClean="0">
+              <a:rPr lang="fr-FR" sz="600" b="1" noProof="1">
                 <a:latin typeface="Consolas" panose="020B0609020204030204" pitchFamily="49" charset="0"/>
                 <a:ea typeface="Arial Rounded MT Bold" charset="0"/>
                 <a:cs typeface="Consolas" panose="020B0609020204030204" pitchFamily="49" charset="0"/>
@@ -9330,7 +9155,7 @@
           <a:p>
             <a:pPr algn="ctr"/>
             <a:r>
-              <a:rPr lang="fr-FR" sz="600" b="1" noProof="1" smtClean="0">
+              <a:rPr lang="fr-FR" sz="600" b="1" noProof="1">
                 <a:solidFill>
                   <a:schemeClr val="tx1"/>
                 </a:solidFill>
@@ -9340,14 +9165,6 @@
               </a:rPr>
               <a:t>tsp</a:t>
             </a:r>
-            <a:endParaRPr lang="fr-FR" sz="600" b="1" noProof="1">
-              <a:solidFill>
-                <a:schemeClr val="tx1"/>
-              </a:solidFill>
-              <a:latin typeface="Cambria" panose="02040503050406030204" pitchFamily="18" charset="0"/>
-              <a:ea typeface="Arial Rounded MT Bold" charset="0"/>
-              <a:cs typeface="Arial Rounded MT Bold" charset="0"/>
-            </a:endParaRPr>
           </a:p>
         </p:txBody>
       </p:sp>
@@ -9394,18 +9211,13 @@
           <a:p>
             <a:pPr algn="ctr"/>
             <a:r>
-              <a:rPr lang="fr-FR" sz="600" i="1" noProof="1" smtClean="0">
+              <a:rPr lang="fr-FR" sz="600" i="1" noProof="1">
                 <a:latin typeface="Cambria" panose="02040503050406030204" pitchFamily="18" charset="0"/>
                 <a:ea typeface="Arial Rounded MT Bold" charset="0"/>
                 <a:cs typeface="Arial Rounded MT Bold" charset="0"/>
               </a:rPr>
               <a:t>input</a:t>
             </a:r>
-            <a:endParaRPr lang="fr-FR" sz="600" i="1" noProof="1">
-              <a:latin typeface="Cambria" panose="02040503050406030204" pitchFamily="18" charset="0"/>
-              <a:ea typeface="Arial Rounded MT Bold" charset="0"/>
-              <a:cs typeface="Arial Rounded MT Bold" charset="0"/>
-            </a:endParaRPr>
           </a:p>
         </p:txBody>
       </p:sp>
@@ -9452,18 +9264,13 @@
           <a:p>
             <a:pPr algn="ctr"/>
             <a:r>
-              <a:rPr lang="fr-FR" sz="600" i="1" noProof="1" smtClean="0">
+              <a:rPr lang="fr-FR" sz="600" i="1" noProof="1">
                 <a:latin typeface="Cambria" panose="02040503050406030204" pitchFamily="18" charset="0"/>
                 <a:ea typeface="Arial Rounded MT Bold" charset="0"/>
                 <a:cs typeface="Arial Rounded MT Bold" charset="0"/>
               </a:rPr>
               <a:t>plugin</a:t>
             </a:r>
-            <a:endParaRPr lang="fr-FR" sz="600" i="1" noProof="1">
-              <a:latin typeface="Cambria" panose="02040503050406030204" pitchFamily="18" charset="0"/>
-              <a:ea typeface="Arial Rounded MT Bold" charset="0"/>
-              <a:cs typeface="Arial Rounded MT Bold" charset="0"/>
-            </a:endParaRPr>
           </a:p>
         </p:txBody>
       </p:sp>
@@ -9510,18 +9317,13 @@
           <a:p>
             <a:pPr algn="ctr"/>
             <a:r>
-              <a:rPr lang="fr-FR" sz="600" i="1" noProof="1" smtClean="0">
+              <a:rPr lang="fr-FR" sz="600" i="1" noProof="1">
                 <a:latin typeface="Cambria" panose="02040503050406030204" pitchFamily="18" charset="0"/>
                 <a:ea typeface="Arial Rounded MT Bold" charset="0"/>
                 <a:cs typeface="Arial Rounded MT Bold" charset="0"/>
               </a:rPr>
               <a:t>plugin</a:t>
             </a:r>
-            <a:endParaRPr lang="fr-FR" sz="600" i="1" noProof="1">
-              <a:latin typeface="Cambria" panose="02040503050406030204" pitchFamily="18" charset="0"/>
-              <a:ea typeface="Arial Rounded MT Bold" charset="0"/>
-              <a:cs typeface="Arial Rounded MT Bold" charset="0"/>
-            </a:endParaRPr>
           </a:p>
         </p:txBody>
       </p:sp>
@@ -9568,7 +9370,7 @@
           <a:p>
             <a:pPr algn="ctr"/>
             <a:r>
-              <a:rPr lang="fr-FR" sz="600" b="1" noProof="1" smtClean="0">
+              <a:rPr lang="fr-FR" sz="600" b="1" noProof="1">
                 <a:latin typeface="Consolas" panose="020B0609020204030204" pitchFamily="49" charset="0"/>
                 <a:ea typeface="Arial Rounded MT Bold" charset="0"/>
                 <a:cs typeface="Consolas" panose="020B0609020204030204" pitchFamily="49" charset="0"/>
@@ -9804,18 +9606,13 @@
           <a:lstStyle/>
           <a:p>
             <a:r>
-              <a:rPr lang="fr-FR" sz="600" noProof="1" smtClean="0">
+              <a:rPr lang="fr-FR" sz="600" noProof="1">
                 <a:latin typeface="Cambria" panose="02040503050406030204" pitchFamily="18" charset="0"/>
                 <a:ea typeface="Arial Rounded MT Bold" charset="0"/>
                 <a:cs typeface="Arial Rounded MT Bold" charset="0"/>
               </a:rPr>
               <a:t>input TS 1</a:t>
             </a:r>
-            <a:endParaRPr lang="fr-FR" sz="600" noProof="1">
-              <a:latin typeface="Cambria" panose="02040503050406030204" pitchFamily="18" charset="0"/>
-              <a:ea typeface="Arial Rounded MT Bold" charset="0"/>
-              <a:cs typeface="Arial Rounded MT Bold" charset="0"/>
-            </a:endParaRPr>
           </a:p>
         </p:txBody>
       </p:sp>
@@ -9881,18 +9678,13 @@
           <a:lstStyle/>
           <a:p>
             <a:r>
-              <a:rPr lang="fr-FR" sz="600" noProof="1" smtClean="0">
+              <a:rPr lang="fr-FR" sz="600" noProof="1">
                 <a:latin typeface="Cambria" panose="02040503050406030204" pitchFamily="18" charset="0"/>
                 <a:ea typeface="Arial Rounded MT Bold" charset="0"/>
                 <a:cs typeface="Arial Rounded MT Bold" charset="0"/>
               </a:rPr>
               <a:t>input TS 3</a:t>
             </a:r>
-            <a:endParaRPr lang="fr-FR" sz="600" noProof="1">
-              <a:latin typeface="Cambria" panose="02040503050406030204" pitchFamily="18" charset="0"/>
-              <a:ea typeface="Arial Rounded MT Bold" charset="0"/>
-              <a:cs typeface="Arial Rounded MT Bold" charset="0"/>
-            </a:endParaRPr>
           </a:p>
         </p:txBody>
       </p:sp>
@@ -9944,7 +9736,7 @@
           <a:p>
             <a:pPr algn="ctr"/>
             <a:r>
-              <a:rPr lang="fr-FR" sz="600" b="1" noProof="1" smtClean="0">
+              <a:rPr lang="fr-FR" sz="600" b="1" noProof="1">
                 <a:solidFill>
                   <a:schemeClr val="tx1"/>
                 </a:solidFill>
@@ -9954,14 +9746,6 @@
               </a:rPr>
               <a:t>tsp</a:t>
             </a:r>
-            <a:endParaRPr lang="fr-FR" sz="600" b="1" noProof="1">
-              <a:solidFill>
-                <a:schemeClr val="tx1"/>
-              </a:solidFill>
-              <a:latin typeface="Cambria" panose="02040503050406030204" pitchFamily="18" charset="0"/>
-              <a:ea typeface="Arial Rounded MT Bold" charset="0"/>
-              <a:cs typeface="Arial Rounded MT Bold" charset="0"/>
-            </a:endParaRPr>
           </a:p>
         </p:txBody>
       </p:sp>
@@ -10008,7 +9792,7 @@
           <a:p>
             <a:pPr algn="ctr"/>
             <a:r>
-              <a:rPr lang="fr-FR" sz="600" b="1" noProof="1" smtClean="0">
+              <a:rPr lang="fr-FR" sz="600" b="1" noProof="1">
                 <a:latin typeface="Consolas" panose="020B0609020204030204" pitchFamily="49" charset="0"/>
                 <a:ea typeface="Arial Rounded MT Bold" charset="0"/>
                 <a:cs typeface="Consolas" panose="020B0609020204030204" pitchFamily="49" charset="0"/>
@@ -10066,18 +9850,13 @@
           <a:p>
             <a:pPr algn="ctr"/>
             <a:r>
-              <a:rPr lang="fr-FR" sz="600" i="1" noProof="1" smtClean="0">
+              <a:rPr lang="fr-FR" sz="600" i="1" noProof="1">
                 <a:latin typeface="Cambria" panose="02040503050406030204" pitchFamily="18" charset="0"/>
                 <a:ea typeface="Arial Rounded MT Bold" charset="0"/>
                 <a:cs typeface="Arial Rounded MT Bold" charset="0"/>
               </a:rPr>
               <a:t>plugin</a:t>
             </a:r>
-            <a:endParaRPr lang="fr-FR" sz="600" i="1" noProof="1">
-              <a:latin typeface="Cambria" panose="02040503050406030204" pitchFamily="18" charset="0"/>
-              <a:ea typeface="Arial Rounded MT Bold" charset="0"/>
-              <a:cs typeface="Arial Rounded MT Bold" charset="0"/>
-            </a:endParaRPr>
           </a:p>
         </p:txBody>
       </p:sp>
@@ -10124,18 +9903,13 @@
           <a:p>
             <a:pPr algn="ctr"/>
             <a:r>
-              <a:rPr lang="fr-FR" sz="600" i="1" noProof="1" smtClean="0">
+              <a:rPr lang="fr-FR" sz="600" i="1" noProof="1">
                 <a:latin typeface="Cambria" panose="02040503050406030204" pitchFamily="18" charset="0"/>
                 <a:ea typeface="Arial Rounded MT Bold" charset="0"/>
                 <a:cs typeface="Arial Rounded MT Bold" charset="0"/>
               </a:rPr>
               <a:t>plugin</a:t>
             </a:r>
-            <a:endParaRPr lang="fr-FR" sz="600" i="1" noProof="1">
-              <a:latin typeface="Cambria" panose="02040503050406030204" pitchFamily="18" charset="0"/>
-              <a:ea typeface="Arial Rounded MT Bold" charset="0"/>
-              <a:cs typeface="Arial Rounded MT Bold" charset="0"/>
-            </a:endParaRPr>
           </a:p>
         </p:txBody>
       </p:sp>
@@ -10182,18 +9956,13 @@
           <a:p>
             <a:pPr algn="ctr"/>
             <a:r>
-              <a:rPr lang="fr-FR" sz="600" i="1" noProof="1" smtClean="0">
+              <a:rPr lang="fr-FR" sz="600" i="1" noProof="1">
                 <a:latin typeface="Cambria" panose="02040503050406030204" pitchFamily="18" charset="0"/>
                 <a:ea typeface="Arial Rounded MT Bold" charset="0"/>
                 <a:cs typeface="Arial Rounded MT Bold" charset="0"/>
               </a:rPr>
               <a:t>output</a:t>
             </a:r>
-            <a:endParaRPr lang="fr-FR" sz="600" i="1" noProof="1">
-              <a:latin typeface="Cambria" panose="02040503050406030204" pitchFamily="18" charset="0"/>
-              <a:ea typeface="Arial Rounded MT Bold" charset="0"/>
-              <a:cs typeface="Arial Rounded MT Bold" charset="0"/>
-            </a:endParaRPr>
           </a:p>
         </p:txBody>
       </p:sp>
@@ -10404,7 +10173,7 @@
           <a:p>
             <a:pPr algn="ctr"/>
             <a:r>
-              <a:rPr lang="fr-FR" sz="600" b="1" noProof="1" smtClean="0">
+              <a:rPr lang="fr-FR" sz="600" b="1" noProof="1">
                 <a:solidFill>
                   <a:schemeClr val="tx1"/>
                 </a:solidFill>
@@ -10414,14 +10183,6 @@
               </a:rPr>
               <a:t>tsp</a:t>
             </a:r>
-            <a:endParaRPr lang="fr-FR" sz="600" b="1" noProof="1">
-              <a:solidFill>
-                <a:schemeClr val="tx1"/>
-              </a:solidFill>
-              <a:latin typeface="Cambria" panose="02040503050406030204" pitchFamily="18" charset="0"/>
-              <a:ea typeface="Arial Rounded MT Bold" charset="0"/>
-              <a:cs typeface="Arial Rounded MT Bold" charset="0"/>
-            </a:endParaRPr>
           </a:p>
         </p:txBody>
       </p:sp>
@@ -10468,7 +10229,7 @@
           <a:p>
             <a:pPr algn="ctr"/>
             <a:r>
-              <a:rPr lang="fr-FR" sz="600" b="1" noProof="1" smtClean="0">
+              <a:rPr lang="fr-FR" sz="600" b="1" noProof="1">
                 <a:latin typeface="Consolas" panose="020B0609020204030204" pitchFamily="49" charset="0"/>
                 <a:ea typeface="Arial Rounded MT Bold" charset="0"/>
                 <a:cs typeface="Consolas" panose="020B0609020204030204" pitchFamily="49" charset="0"/>
@@ -10526,18 +10287,13 @@
           <a:p>
             <a:pPr algn="ctr"/>
             <a:r>
-              <a:rPr lang="fr-FR" sz="600" i="1" noProof="1" smtClean="0">
+              <a:rPr lang="fr-FR" sz="600" i="1" noProof="1">
                 <a:latin typeface="Cambria" panose="02040503050406030204" pitchFamily="18" charset="0"/>
                 <a:ea typeface="Arial Rounded MT Bold" charset="0"/>
                 <a:cs typeface="Arial Rounded MT Bold" charset="0"/>
               </a:rPr>
               <a:t>plugin</a:t>
             </a:r>
-            <a:endParaRPr lang="fr-FR" sz="600" i="1" noProof="1">
-              <a:latin typeface="Cambria" panose="02040503050406030204" pitchFamily="18" charset="0"/>
-              <a:ea typeface="Arial Rounded MT Bold" charset="0"/>
-              <a:cs typeface="Arial Rounded MT Bold" charset="0"/>
-            </a:endParaRPr>
           </a:p>
         </p:txBody>
       </p:sp>
@@ -10584,18 +10340,13 @@
           <a:p>
             <a:pPr algn="ctr"/>
             <a:r>
-              <a:rPr lang="fr-FR" sz="600" i="1" noProof="1" smtClean="0">
+              <a:rPr lang="fr-FR" sz="600" i="1" noProof="1">
                 <a:latin typeface="Cambria" panose="02040503050406030204" pitchFamily="18" charset="0"/>
                 <a:ea typeface="Arial Rounded MT Bold" charset="0"/>
                 <a:cs typeface="Arial Rounded MT Bold" charset="0"/>
               </a:rPr>
               <a:t>plugin</a:t>
             </a:r>
-            <a:endParaRPr lang="fr-FR" sz="600" i="1" noProof="1">
-              <a:latin typeface="Cambria" panose="02040503050406030204" pitchFamily="18" charset="0"/>
-              <a:ea typeface="Arial Rounded MT Bold" charset="0"/>
-              <a:cs typeface="Arial Rounded MT Bold" charset="0"/>
-            </a:endParaRPr>
           </a:p>
         </p:txBody>
       </p:sp>
@@ -10642,18 +10393,13 @@
           <a:p>
             <a:pPr algn="ctr"/>
             <a:r>
-              <a:rPr lang="fr-FR" sz="600" i="1" noProof="1" smtClean="0">
+              <a:rPr lang="fr-FR" sz="600" i="1" noProof="1">
                 <a:latin typeface="Cambria" panose="02040503050406030204" pitchFamily="18" charset="0"/>
                 <a:ea typeface="Arial Rounded MT Bold" charset="0"/>
                 <a:cs typeface="Arial Rounded MT Bold" charset="0"/>
               </a:rPr>
               <a:t>output</a:t>
             </a:r>
-            <a:endParaRPr lang="fr-FR" sz="600" i="1" noProof="1">
-              <a:latin typeface="Cambria" panose="02040503050406030204" pitchFamily="18" charset="0"/>
-              <a:ea typeface="Arial Rounded MT Bold" charset="0"/>
-              <a:cs typeface="Arial Rounded MT Bold" charset="0"/>
-            </a:endParaRPr>
           </a:p>
         </p:txBody>
       </p:sp>
@@ -10839,18 +10585,13 @@
           <a:lstStyle/>
           <a:p>
             <a:r>
-              <a:rPr lang="fr-FR" sz="600" noProof="1" smtClean="0">
+              <a:rPr lang="fr-FR" sz="600" noProof="1">
                 <a:latin typeface="Cambria" panose="02040503050406030204" pitchFamily="18" charset="0"/>
                 <a:ea typeface="Arial Rounded MT Bold" charset="0"/>
                 <a:cs typeface="Arial Rounded MT Bold" charset="0"/>
               </a:rPr>
               <a:t>output TS 1</a:t>
             </a:r>
-            <a:endParaRPr lang="fr-FR" sz="600" noProof="1">
-              <a:latin typeface="Cambria" panose="02040503050406030204" pitchFamily="18" charset="0"/>
-              <a:ea typeface="Arial Rounded MT Bold" charset="0"/>
-              <a:cs typeface="Arial Rounded MT Bold" charset="0"/>
-            </a:endParaRPr>
           </a:p>
         </p:txBody>
       </p:sp>
@@ -10916,18 +10657,13 @@
           <a:lstStyle/>
           <a:p>
             <a:r>
-              <a:rPr lang="fr-FR" sz="600" noProof="1" smtClean="0">
+              <a:rPr lang="fr-FR" sz="600" noProof="1">
                 <a:latin typeface="Cambria" panose="02040503050406030204" pitchFamily="18" charset="0"/>
                 <a:ea typeface="Arial Rounded MT Bold" charset="0"/>
                 <a:cs typeface="Arial Rounded MT Bold" charset="0"/>
               </a:rPr>
               <a:t>output TS 3</a:t>
             </a:r>
-            <a:endParaRPr lang="fr-FR" sz="600" noProof="1">
-              <a:latin typeface="Cambria" panose="02040503050406030204" pitchFamily="18" charset="0"/>
-              <a:ea typeface="Arial Rounded MT Bold" charset="0"/>
-              <a:cs typeface="Arial Rounded MT Bold" charset="0"/>
-            </a:endParaRPr>
           </a:p>
         </p:txBody>
       </p:sp>
@@ -11034,18 +10770,13 @@
           <a:lstStyle/>
           <a:p>
             <a:r>
-              <a:rPr lang="fr-FR" sz="700" noProof="1" smtClean="0">
+              <a:rPr lang="fr-FR" sz="700" noProof="1">
                 <a:latin typeface="Cambria" panose="02040503050406030204" pitchFamily="18" charset="0"/>
                 <a:ea typeface="Arial Rounded MT Bold" charset="0"/>
                 <a:cs typeface="Arial Rounded MT Bold" charset="0"/>
               </a:rPr>
               <a:t>TSDuck</a:t>
             </a:r>
-            <a:endParaRPr lang="fr-FR" sz="700" noProof="1">
-              <a:latin typeface="Cambria" panose="02040503050406030204" pitchFamily="18" charset="0"/>
-              <a:ea typeface="Arial Rounded MT Bold" charset="0"/>
-              <a:cs typeface="Arial Rounded MT Bold" charset="0"/>
-            </a:endParaRPr>
           </a:p>
         </p:txBody>
       </p:sp>
@@ -11054,7 +10785,7 @@
           <p:cNvPr id="240" name="Picture 7" descr="D:\Devel\tsduck\images\tsduck-48.png">
             <a:extLst>
               <a:ext uri="{FF2B5EF4-FFF2-40B4-BE49-F238E27FC236}">
-                <a16:creationId xmlns:a16="http://schemas.microsoft.com/office/drawing/2014/main" xmlns="" id="{7EBDB59B-A971-2145-8D90-DA0176A2FB18}"/>
+                <a16:creationId xmlns:a16="http://schemas.microsoft.com/office/drawing/2014/main" id="{7EBDB59B-A971-2145-8D90-DA0176A2FB18}"/>
               </a:ext>
             </a:extLst>
           </p:cNvPr>
@@ -11101,7 +10832,7 @@
           <p:cNvPr id="243" name="ZoneTexte 242">
             <a:extLst>
               <a:ext uri="{FF2B5EF4-FFF2-40B4-BE49-F238E27FC236}">
-                <a16:creationId xmlns:a16="http://schemas.microsoft.com/office/drawing/2014/main" xmlns="" id="{24E2D4AE-DD52-8240-8AF5-E8D191EF58B2}"/>
+                <a16:creationId xmlns:a16="http://schemas.microsoft.com/office/drawing/2014/main" id="{24E2D4AE-DD52-8240-8AF5-E8D191EF58B2}"/>
               </a:ext>
             </a:extLst>
           </p:cNvPr>
@@ -11125,18 +10856,13 @@
           <a:lstStyle/>
           <a:p>
             <a:r>
-              <a:rPr lang="fr-FR" sz="800" noProof="1" smtClean="0">
+              <a:rPr lang="fr-FR" sz="800" noProof="1">
                 <a:latin typeface="Cambria" panose="02040503050406030204" pitchFamily="18" charset="0"/>
                 <a:ea typeface="Arial Rounded MT Bold" charset="0"/>
                 <a:cs typeface="Arial Rounded MT Bold" charset="0"/>
               </a:rPr>
               <a:t>TSDuck</a:t>
             </a:r>
-            <a:endParaRPr lang="fr-FR" sz="800" noProof="1">
-              <a:latin typeface="Cambria" panose="02040503050406030204" pitchFamily="18" charset="0"/>
-              <a:ea typeface="Arial Rounded MT Bold" charset="0"/>
-              <a:cs typeface="Arial Rounded MT Bold" charset="0"/>
-            </a:endParaRPr>
           </a:p>
         </p:txBody>
       </p:sp>
@@ -11145,7 +10871,7 @@
           <p:cNvPr id="244" name="Rectangle à coins arrondis 243">
             <a:extLst>
               <a:ext uri="{FF2B5EF4-FFF2-40B4-BE49-F238E27FC236}">
-                <a16:creationId xmlns:a16="http://schemas.microsoft.com/office/drawing/2014/main" xmlns="" id="{DFD7C87C-57E7-3942-AEE8-76374267556C}"/>
+                <a16:creationId xmlns:a16="http://schemas.microsoft.com/office/drawing/2014/main" id="{DFD7C87C-57E7-3942-AEE8-76374267556C}"/>
               </a:ext>
             </a:extLst>
           </p:cNvPr>
@@ -11194,7 +10920,7 @@
           <a:p>
             <a:pPr algn="ctr"/>
             <a:r>
-              <a:rPr lang="fr-FR" sz="900" b="1" noProof="1" smtClean="0">
+              <a:rPr lang="fr-FR" sz="900" b="1" noProof="1">
                 <a:solidFill>
                   <a:schemeClr val="tx1"/>
                 </a:solidFill>
@@ -11220,7 +10946,7 @@
           <p:cNvPr id="245" name="Rectangle à coins arrondis 244">
             <a:extLst>
               <a:ext uri="{FF2B5EF4-FFF2-40B4-BE49-F238E27FC236}">
-                <a16:creationId xmlns:a16="http://schemas.microsoft.com/office/drawing/2014/main" xmlns="" id="{6AF3952C-6E42-9F4C-BCAC-CA6D7682F478}"/>
+                <a16:creationId xmlns:a16="http://schemas.microsoft.com/office/drawing/2014/main" id="{6AF3952C-6E42-9F4C-BCAC-CA6D7682F478}"/>
               </a:ext>
             </a:extLst>
           </p:cNvPr>
@@ -11264,7 +10990,7 @@
           <a:p>
             <a:pPr algn="ctr"/>
             <a:r>
-              <a:rPr lang="fr-FR" sz="800" b="1" noProof="1" smtClean="0">
+              <a:rPr lang="fr-FR" sz="800" b="1" noProof="1">
                 <a:latin typeface="Consolas" panose="020B0609020204030204" pitchFamily="49" charset="0"/>
                 <a:ea typeface="Arial Rounded MT Bold" charset="0"/>
                 <a:cs typeface="Consolas" panose="020B0609020204030204" pitchFamily="49" charset="0"/>
@@ -11284,7 +11010,7 @@
           <p:cNvPr id="246" name="Rectangle à coins arrondis 245">
             <a:extLst>
               <a:ext uri="{FF2B5EF4-FFF2-40B4-BE49-F238E27FC236}">
-                <a16:creationId xmlns:a16="http://schemas.microsoft.com/office/drawing/2014/main" xmlns="" id="{401C1769-9E94-FE4E-B77C-858A4DB570E4}"/>
+                <a16:creationId xmlns:a16="http://schemas.microsoft.com/office/drawing/2014/main" id="{401C1769-9E94-FE4E-B77C-858A4DB570E4}"/>
               </a:ext>
             </a:extLst>
           </p:cNvPr>
@@ -11328,18 +11054,13 @@
           <a:p>
             <a:pPr algn="ctr"/>
             <a:r>
-              <a:rPr lang="fr-FR" sz="800" i="1" noProof="1" smtClean="0">
+              <a:rPr lang="fr-FR" sz="800" i="1" noProof="1">
                 <a:latin typeface="Cambria" panose="02040503050406030204" pitchFamily="18" charset="0"/>
                 <a:ea typeface="Arial Rounded MT Bold" charset="0"/>
                 <a:cs typeface="Arial Rounded MT Bold" charset="0"/>
               </a:rPr>
               <a:t>plugin</a:t>
             </a:r>
-            <a:endParaRPr lang="fr-FR" sz="800" i="1" noProof="1">
-              <a:latin typeface="Cambria" panose="02040503050406030204" pitchFamily="18" charset="0"/>
-              <a:ea typeface="Arial Rounded MT Bold" charset="0"/>
-              <a:cs typeface="Arial Rounded MT Bold" charset="0"/>
-            </a:endParaRPr>
           </a:p>
         </p:txBody>
       </p:sp>
@@ -11348,7 +11069,7 @@
           <p:cNvPr id="247" name="Rectangle à coins arrondis 246">
             <a:extLst>
               <a:ext uri="{FF2B5EF4-FFF2-40B4-BE49-F238E27FC236}">
-                <a16:creationId xmlns:a16="http://schemas.microsoft.com/office/drawing/2014/main" xmlns="" id="{288599FE-0002-E442-862B-6641BE5360ED}"/>
+                <a16:creationId xmlns:a16="http://schemas.microsoft.com/office/drawing/2014/main" id="{288599FE-0002-E442-862B-6641BE5360ED}"/>
               </a:ext>
             </a:extLst>
           </p:cNvPr>
@@ -11392,18 +11113,13 @@
           <a:p>
             <a:pPr algn="ctr"/>
             <a:r>
-              <a:rPr lang="fr-FR" sz="800" i="1" noProof="1" smtClean="0">
+              <a:rPr lang="fr-FR" sz="800" i="1" noProof="1">
                 <a:latin typeface="Cambria" panose="02040503050406030204" pitchFamily="18" charset="0"/>
                 <a:ea typeface="Arial Rounded MT Bold" charset="0"/>
                 <a:cs typeface="Arial Rounded MT Bold" charset="0"/>
               </a:rPr>
               <a:t>output</a:t>
             </a:r>
-            <a:endParaRPr lang="fr-FR" sz="800" i="1" noProof="1">
-              <a:latin typeface="Cambria" panose="02040503050406030204" pitchFamily="18" charset="0"/>
-              <a:ea typeface="Arial Rounded MT Bold" charset="0"/>
-              <a:cs typeface="Arial Rounded MT Bold" charset="0"/>
-            </a:endParaRPr>
           </a:p>
         </p:txBody>
       </p:sp>
@@ -11412,7 +11128,7 @@
           <p:cNvPr id="248" name="Connecteur droit avec flèche 247">
             <a:extLst>
               <a:ext uri="{FF2B5EF4-FFF2-40B4-BE49-F238E27FC236}">
-                <a16:creationId xmlns:a16="http://schemas.microsoft.com/office/drawing/2014/main" xmlns="" id="{358A55EA-8299-5243-966D-73C91238E7E1}"/>
+                <a16:creationId xmlns:a16="http://schemas.microsoft.com/office/drawing/2014/main" id="{358A55EA-8299-5243-966D-73C91238E7E1}"/>
               </a:ext>
             </a:extLst>
           </p:cNvPr>
@@ -11458,7 +11174,7 @@
           <p:cNvPr id="249" name="Connecteur droit avec flèche 248">
             <a:extLst>
               <a:ext uri="{FF2B5EF4-FFF2-40B4-BE49-F238E27FC236}">
-                <a16:creationId xmlns:a16="http://schemas.microsoft.com/office/drawing/2014/main" xmlns="" id="{81727CF6-61E7-1248-B379-326132500770}"/>
+                <a16:creationId xmlns:a16="http://schemas.microsoft.com/office/drawing/2014/main" id="{81727CF6-61E7-1248-B379-326132500770}"/>
               </a:ext>
             </a:extLst>
           </p:cNvPr>
@@ -11504,7 +11220,7 @@
           <p:cNvPr id="250" name="ZoneTexte 249">
             <a:extLst>
               <a:ext uri="{FF2B5EF4-FFF2-40B4-BE49-F238E27FC236}">
-                <a16:creationId xmlns:a16="http://schemas.microsoft.com/office/drawing/2014/main" xmlns="" id="{E144A86D-7BE6-D740-8D8A-3812CEE2D089}"/>
+                <a16:creationId xmlns:a16="http://schemas.microsoft.com/office/drawing/2014/main" id="{E144A86D-7BE6-D740-8D8A-3812CEE2D089}"/>
               </a:ext>
             </a:extLst>
           </p:cNvPr>
@@ -11528,18 +11244,13 @@
           <a:lstStyle/>
           <a:p>
             <a:r>
-              <a:rPr lang="fr-FR" sz="800" noProof="1" smtClean="0">
+              <a:rPr lang="fr-FR" sz="800" noProof="1">
                 <a:latin typeface="Cambria" panose="02040503050406030204" pitchFamily="18" charset="0"/>
                 <a:ea typeface="Arial Rounded MT Bold" charset="0"/>
                 <a:cs typeface="Arial Rounded MT Bold" charset="0"/>
               </a:rPr>
               <a:t>output TS</a:t>
             </a:r>
-            <a:endParaRPr lang="fr-FR" sz="800" noProof="1">
-              <a:latin typeface="Cambria" panose="02040503050406030204" pitchFamily="18" charset="0"/>
-              <a:ea typeface="Arial Rounded MT Bold" charset="0"/>
-              <a:cs typeface="Arial Rounded MT Bold" charset="0"/>
-            </a:endParaRPr>
           </a:p>
         </p:txBody>
       </p:sp>
@@ -11548,7 +11259,7 @@
           <p:cNvPr id="251" name="Connecteur droit avec flèche 250">
             <a:extLst>
               <a:ext uri="{FF2B5EF4-FFF2-40B4-BE49-F238E27FC236}">
-                <a16:creationId xmlns:a16="http://schemas.microsoft.com/office/drawing/2014/main" xmlns="" id="{C4931B87-DB8F-CF42-825C-39B52224539D}"/>
+                <a16:creationId xmlns:a16="http://schemas.microsoft.com/office/drawing/2014/main" id="{C4931B87-DB8F-CF42-825C-39B52224539D}"/>
               </a:ext>
             </a:extLst>
           </p:cNvPr>
@@ -11593,7 +11304,7 @@
           <p:cNvPr id="252" name="Rectangle à coins arrondis 251">
             <a:extLst>
               <a:ext uri="{FF2B5EF4-FFF2-40B4-BE49-F238E27FC236}">
-                <a16:creationId xmlns:a16="http://schemas.microsoft.com/office/drawing/2014/main" xmlns="" id="{F16D29F8-F334-CB4D-BFD1-BD53652E3698}"/>
+                <a16:creationId xmlns:a16="http://schemas.microsoft.com/office/drawing/2014/main" id="{F16D29F8-F334-CB4D-BFD1-BD53652E3698}"/>
               </a:ext>
             </a:extLst>
           </p:cNvPr>
@@ -11642,7 +11353,7 @@
           <a:p>
             <a:pPr algn="ctr"/>
             <a:r>
-              <a:rPr lang="fr-FR" sz="800" noProof="1" smtClean="0">
+              <a:rPr lang="fr-FR" sz="800" noProof="1">
                 <a:solidFill>
                   <a:schemeClr val="tx1"/>
                 </a:solidFill>
@@ -11656,7 +11367,7 @@
           <a:p>
             <a:pPr algn="ctr"/>
             <a:r>
-              <a:rPr lang="fr-FR" sz="800" noProof="1" smtClean="0">
+              <a:rPr lang="fr-FR" sz="800" noProof="1">
                 <a:solidFill>
                   <a:schemeClr val="tx1"/>
                 </a:solidFill>
@@ -11666,14 +11377,6 @@
               </a:rPr>
               <a:t>tuner 1</a:t>
             </a:r>
-            <a:endParaRPr lang="fr-FR" sz="800" noProof="1">
-              <a:solidFill>
-                <a:schemeClr val="tx1"/>
-              </a:solidFill>
-              <a:latin typeface="Cambria" panose="02040503050406030204" pitchFamily="18" charset="0"/>
-              <a:ea typeface="Arial Rounded MT Bold" charset="0"/>
-              <a:cs typeface="Arial Rounded MT Bold" charset="0"/>
-            </a:endParaRPr>
           </a:p>
         </p:txBody>
       </p:sp>
@@ -11682,7 +11385,7 @@
           <p:cNvPr id="253" name="Connecteur droit 252">
             <a:extLst>
               <a:ext uri="{FF2B5EF4-FFF2-40B4-BE49-F238E27FC236}">
-                <a16:creationId xmlns:a16="http://schemas.microsoft.com/office/drawing/2014/main" xmlns="" id="{21FEE28B-F787-BA47-B678-2E1BC9B22353}"/>
+                <a16:creationId xmlns:a16="http://schemas.microsoft.com/office/drawing/2014/main" id="{21FEE28B-F787-BA47-B678-2E1BC9B22353}"/>
               </a:ext>
             </a:extLst>
           </p:cNvPr>
@@ -11725,7 +11428,7 @@
           <p:cNvPr id="254" name="Picture 3">
             <a:extLst>
               <a:ext uri="{FF2B5EF4-FFF2-40B4-BE49-F238E27FC236}">
-                <a16:creationId xmlns:a16="http://schemas.microsoft.com/office/drawing/2014/main" xmlns="" id="{8B89C201-BA7A-3547-9956-97C9C5593DB9}"/>
+                <a16:creationId xmlns:a16="http://schemas.microsoft.com/office/drawing/2014/main" id="{8B89C201-BA7A-3547-9956-97C9C5593DB9}"/>
               </a:ext>
             </a:extLst>
           </p:cNvPr>
@@ -11795,7 +11498,7 @@
           <p:cNvPr id="255" name="Rectangle à coins arrondis 254">
             <a:extLst>
               <a:ext uri="{FF2B5EF4-FFF2-40B4-BE49-F238E27FC236}">
-                <a16:creationId xmlns:a16="http://schemas.microsoft.com/office/drawing/2014/main" xmlns="" id="{23928D21-4F50-394F-A465-8160CD1E1038}"/>
+                <a16:creationId xmlns:a16="http://schemas.microsoft.com/office/drawing/2014/main" id="{23928D21-4F50-394F-A465-8160CD1E1038}"/>
               </a:ext>
             </a:extLst>
           </p:cNvPr>
@@ -11844,7 +11547,7 @@
           <a:p>
             <a:pPr algn="ctr"/>
             <a:r>
-              <a:rPr lang="fr-FR" sz="900" b="1" noProof="1" smtClean="0">
+              <a:rPr lang="fr-FR" sz="900" b="1" noProof="1">
                 <a:solidFill>
                   <a:schemeClr val="tx1"/>
                 </a:solidFill>
@@ -11854,14 +11557,6 @@
               </a:rPr>
               <a:t>tsswitch</a:t>
             </a:r>
-            <a:endParaRPr lang="fr-FR" sz="900" b="1" noProof="1">
-              <a:solidFill>
-                <a:schemeClr val="tx1"/>
-              </a:solidFill>
-              <a:latin typeface="Cambria" panose="02040503050406030204" pitchFamily="18" charset="0"/>
-              <a:ea typeface="Arial Rounded MT Bold" charset="0"/>
-              <a:cs typeface="Arial Rounded MT Bold" charset="0"/>
-            </a:endParaRPr>
           </a:p>
         </p:txBody>
       </p:sp>
@@ -11870,7 +11565,7 @@
           <p:cNvPr id="256" name="Rectangle à coins arrondis 255">
             <a:extLst>
               <a:ext uri="{FF2B5EF4-FFF2-40B4-BE49-F238E27FC236}">
-                <a16:creationId xmlns:a16="http://schemas.microsoft.com/office/drawing/2014/main" xmlns="" id="{D36A8FDC-F1BD-EC40-8248-6B52204EA4FB}"/>
+                <a16:creationId xmlns:a16="http://schemas.microsoft.com/office/drawing/2014/main" id="{D36A8FDC-F1BD-EC40-8248-6B52204EA4FB}"/>
               </a:ext>
             </a:extLst>
           </p:cNvPr>
@@ -11914,16 +11609,12 @@
           <a:p>
             <a:pPr algn="ctr"/>
             <a:r>
-              <a:rPr lang="fr-FR" sz="800" b="1" noProof="1" smtClean="0">
+              <a:rPr lang="fr-FR" sz="800" b="1" noProof="1">
                 <a:latin typeface="Consolas" panose="020B0609020204030204" pitchFamily="49" charset="0"/>
                 <a:cs typeface="Consolas" panose="020B0609020204030204" pitchFamily="49" charset="0"/>
               </a:rPr>
               <a:t>fork</a:t>
             </a:r>
-            <a:endParaRPr lang="fr-FR" sz="800" b="1" noProof="1">
-              <a:latin typeface="Consolas" panose="020B0609020204030204" pitchFamily="49" charset="0"/>
-              <a:cs typeface="Consolas" panose="020B0609020204030204" pitchFamily="49" charset="0"/>
-            </a:endParaRPr>
           </a:p>
         </p:txBody>
       </p:sp>
@@ -11932,7 +11623,7 @@
           <p:cNvPr id="257" name="Rectangle à coins arrondis 256">
             <a:extLst>
               <a:ext uri="{FF2B5EF4-FFF2-40B4-BE49-F238E27FC236}">
-                <a16:creationId xmlns:a16="http://schemas.microsoft.com/office/drawing/2014/main" xmlns="" id="{2E1B18C1-9894-1F42-B531-FA72F788D06A}"/>
+                <a16:creationId xmlns:a16="http://schemas.microsoft.com/office/drawing/2014/main" id="{2E1B18C1-9894-1F42-B531-FA72F788D06A}"/>
               </a:ext>
             </a:extLst>
           </p:cNvPr>
@@ -11976,7 +11667,7 @@
           <a:p>
             <a:pPr algn="ctr"/>
             <a:r>
-              <a:rPr lang="fr-FR" sz="800" b="1" noProof="1" smtClean="0">
+              <a:rPr lang="fr-FR" sz="800" b="1" noProof="1">
                 <a:latin typeface="Consolas" panose="020B0609020204030204" pitchFamily="49" charset="0"/>
                 <a:ea typeface="Arial Rounded MT Bold" charset="0"/>
                 <a:cs typeface="Consolas" panose="020B0609020204030204" pitchFamily="49" charset="0"/>
@@ -11996,7 +11687,7 @@
           <p:cNvPr id="258" name="Connecteur droit avec flèche 78">
             <a:extLst>
               <a:ext uri="{FF2B5EF4-FFF2-40B4-BE49-F238E27FC236}">
-                <a16:creationId xmlns:a16="http://schemas.microsoft.com/office/drawing/2014/main" xmlns="" id="{B29DF2C1-5270-904D-B642-F5752B62DDF8}"/>
+                <a16:creationId xmlns:a16="http://schemas.microsoft.com/office/drawing/2014/main" id="{B29DF2C1-5270-904D-B642-F5752B62DDF8}"/>
               </a:ext>
             </a:extLst>
           </p:cNvPr>
@@ -12045,7 +11736,7 @@
           <p:cNvPr id="259" name="Connecteur droit avec flèche 258">
             <a:extLst>
               <a:ext uri="{FF2B5EF4-FFF2-40B4-BE49-F238E27FC236}">
-                <a16:creationId xmlns:a16="http://schemas.microsoft.com/office/drawing/2014/main" xmlns="" id="{7BFD1D0D-2F24-5140-A7A1-15162A534CF0}"/>
+                <a16:creationId xmlns:a16="http://schemas.microsoft.com/office/drawing/2014/main" id="{7BFD1D0D-2F24-5140-A7A1-15162A534CF0}"/>
               </a:ext>
             </a:extLst>
           </p:cNvPr>
@@ -12092,7 +11783,7 @@
           <p:cNvPr id="262" name="Rectangle à coins arrondis 261">
             <a:extLst>
               <a:ext uri="{FF2B5EF4-FFF2-40B4-BE49-F238E27FC236}">
-                <a16:creationId xmlns:a16="http://schemas.microsoft.com/office/drawing/2014/main" xmlns="" id="{FC5A53AA-03C5-6740-AAB7-22C581F93311}"/>
+                <a16:creationId xmlns:a16="http://schemas.microsoft.com/office/drawing/2014/main" id="{FC5A53AA-03C5-6740-AAB7-22C581F93311}"/>
               </a:ext>
             </a:extLst>
           </p:cNvPr>
@@ -12136,16 +11827,12 @@
           <a:p>
             <a:pPr algn="ctr"/>
             <a:r>
-              <a:rPr lang="fr-FR" sz="800" b="1" noProof="1" smtClean="0">
+              <a:rPr lang="fr-FR" sz="800" b="1" noProof="1">
                 <a:latin typeface="Consolas" panose="020B0609020204030204" pitchFamily="49" charset="0"/>
                 <a:cs typeface="Consolas" panose="020B0609020204030204" pitchFamily="49" charset="0"/>
               </a:rPr>
               <a:t>ip</a:t>
             </a:r>
-            <a:endParaRPr lang="fr-FR" sz="800" b="1" noProof="1">
-              <a:latin typeface="Consolas" panose="020B0609020204030204" pitchFamily="49" charset="0"/>
-              <a:cs typeface="Consolas" panose="020B0609020204030204" pitchFamily="49" charset="0"/>
-            </a:endParaRPr>
           </a:p>
         </p:txBody>
       </p:sp>
@@ -12154,7 +11841,7 @@
           <p:cNvPr id="263" name="Rectangle à coins arrondis 262">
             <a:extLst>
               <a:ext uri="{FF2B5EF4-FFF2-40B4-BE49-F238E27FC236}">
-                <a16:creationId xmlns:a16="http://schemas.microsoft.com/office/drawing/2014/main" xmlns="" id="{C892A677-4DD7-9D44-A35F-E07C3734C7D0}"/>
+                <a16:creationId xmlns:a16="http://schemas.microsoft.com/office/drawing/2014/main" id="{C892A677-4DD7-9D44-A35F-E07C3734C7D0}"/>
               </a:ext>
             </a:extLst>
           </p:cNvPr>
@@ -12198,16 +11885,12 @@
           <a:p>
             <a:pPr algn="ctr"/>
             <a:r>
-              <a:rPr lang="fr-FR" sz="800" b="1" noProof="1" smtClean="0">
+              <a:rPr lang="fr-FR" sz="800" b="1" noProof="1">
                 <a:latin typeface="Consolas" panose="020B0609020204030204" pitchFamily="49" charset="0"/>
                 <a:cs typeface="Consolas" panose="020B0609020204030204" pitchFamily="49" charset="0"/>
               </a:rPr>
               <a:t>http</a:t>
             </a:r>
-            <a:endParaRPr lang="fr-FR" sz="800" b="1" noProof="1">
-              <a:latin typeface="Consolas" panose="020B0609020204030204" pitchFamily="49" charset="0"/>
-              <a:cs typeface="Consolas" panose="020B0609020204030204" pitchFamily="49" charset="0"/>
-            </a:endParaRPr>
           </a:p>
         </p:txBody>
       </p:sp>
@@ -12216,7 +11899,7 @@
           <p:cNvPr id="264" name="Rectangle à coins arrondis 263">
             <a:extLst>
               <a:ext uri="{FF2B5EF4-FFF2-40B4-BE49-F238E27FC236}">
-                <a16:creationId xmlns:a16="http://schemas.microsoft.com/office/drawing/2014/main" xmlns="" id="{055106AB-BE5F-E244-93DF-730F424CE9E2}"/>
+                <a16:creationId xmlns:a16="http://schemas.microsoft.com/office/drawing/2014/main" id="{055106AB-BE5F-E244-93DF-730F424CE9E2}"/>
               </a:ext>
             </a:extLst>
           </p:cNvPr>
@@ -12260,16 +11943,12 @@
           <a:p>
             <a:pPr algn="ctr"/>
             <a:r>
-              <a:rPr lang="fr-FR" sz="800" b="1" noProof="1" smtClean="0">
+              <a:rPr lang="fr-FR" sz="800" b="1" noProof="1">
                 <a:latin typeface="Consolas" panose="020B0609020204030204" pitchFamily="49" charset="0"/>
                 <a:cs typeface="Consolas" panose="020B0609020204030204" pitchFamily="49" charset="0"/>
               </a:rPr>
               <a:t>fork</a:t>
             </a:r>
-            <a:endParaRPr lang="fr-FR" sz="800" b="1" noProof="1">
-              <a:latin typeface="Consolas" panose="020B0609020204030204" pitchFamily="49" charset="0"/>
-              <a:cs typeface="Consolas" panose="020B0609020204030204" pitchFamily="49" charset="0"/>
-            </a:endParaRPr>
           </a:p>
         </p:txBody>
       </p:sp>
@@ -12278,7 +11957,7 @@
           <p:cNvPr id="265" name="Connecteur droit avec flèche 78">
             <a:extLst>
               <a:ext uri="{FF2B5EF4-FFF2-40B4-BE49-F238E27FC236}">
-                <a16:creationId xmlns:a16="http://schemas.microsoft.com/office/drawing/2014/main" xmlns="" id="{CE59BDD5-42FC-2347-A97B-6EF1AF2CD76E}"/>
+                <a16:creationId xmlns:a16="http://schemas.microsoft.com/office/drawing/2014/main" id="{CE59BDD5-42FC-2347-A97B-6EF1AF2CD76E}"/>
               </a:ext>
             </a:extLst>
           </p:cNvPr>
@@ -12326,7 +12005,7 @@
           <p:cNvPr id="266" name="Connecteur droit avec flèche 78">
             <a:extLst>
               <a:ext uri="{FF2B5EF4-FFF2-40B4-BE49-F238E27FC236}">
-                <a16:creationId xmlns:a16="http://schemas.microsoft.com/office/drawing/2014/main" xmlns="" id="{B20FFC8F-9BC4-2E4A-A8EE-7F654C8D18B6}"/>
+                <a16:creationId xmlns:a16="http://schemas.microsoft.com/office/drawing/2014/main" id="{B20FFC8F-9BC4-2E4A-A8EE-7F654C8D18B6}"/>
               </a:ext>
             </a:extLst>
           </p:cNvPr>
@@ -12375,7 +12054,7 @@
           <p:cNvPr id="267" name="Connecteur droit avec flèche 78">
             <a:extLst>
               <a:ext uri="{FF2B5EF4-FFF2-40B4-BE49-F238E27FC236}">
-                <a16:creationId xmlns:a16="http://schemas.microsoft.com/office/drawing/2014/main" xmlns="" id="{FCD708BB-A040-F54D-A04F-BF29BBC34A9B}"/>
+                <a16:creationId xmlns:a16="http://schemas.microsoft.com/office/drawing/2014/main" id="{FCD708BB-A040-F54D-A04F-BF29BBC34A9B}"/>
               </a:ext>
             </a:extLst>
           </p:cNvPr>
@@ -12424,7 +12103,7 @@
           <p:cNvPr id="268" name="Connecteur droit avec flèche 102">
             <a:extLst>
               <a:ext uri="{FF2B5EF4-FFF2-40B4-BE49-F238E27FC236}">
-                <a16:creationId xmlns:a16="http://schemas.microsoft.com/office/drawing/2014/main" xmlns="" id="{F68601FD-3B24-E84E-8512-8F12BDD6F447}"/>
+                <a16:creationId xmlns:a16="http://schemas.microsoft.com/office/drawing/2014/main" id="{F68601FD-3B24-E84E-8512-8F12BDD6F447}"/>
               </a:ext>
             </a:extLst>
           </p:cNvPr>
@@ -12471,7 +12150,7 @@
           <p:cNvPr id="269" name="Rectangle à coins arrondis 268">
             <a:extLst>
               <a:ext uri="{FF2B5EF4-FFF2-40B4-BE49-F238E27FC236}">
-                <a16:creationId xmlns:a16="http://schemas.microsoft.com/office/drawing/2014/main" xmlns="" id="{207176EF-D58B-9F42-B51F-EDF84066C434}"/>
+                <a16:creationId xmlns:a16="http://schemas.microsoft.com/office/drawing/2014/main" id="{207176EF-D58B-9F42-B51F-EDF84066C434}"/>
               </a:ext>
             </a:extLst>
           </p:cNvPr>
@@ -12520,7 +12199,7 @@
           <a:p>
             <a:pPr algn="ctr"/>
             <a:r>
-              <a:rPr lang="fr-FR" sz="900" b="1" noProof="1" smtClean="0">
+              <a:rPr lang="fr-FR" sz="900" b="1" noProof="1">
                 <a:solidFill>
                   <a:schemeClr val="tx1"/>
                 </a:solidFill>
@@ -12546,7 +12225,7 @@
           <p:cNvPr id="270" name="Rectangle à coins arrondis 269">
             <a:extLst>
               <a:ext uri="{FF2B5EF4-FFF2-40B4-BE49-F238E27FC236}">
-                <a16:creationId xmlns:a16="http://schemas.microsoft.com/office/drawing/2014/main" xmlns="" id="{0EBD748A-8AD9-2C46-89B4-4F6A71D46447}"/>
+                <a16:creationId xmlns:a16="http://schemas.microsoft.com/office/drawing/2014/main" id="{0EBD748A-8AD9-2C46-89B4-4F6A71D46447}"/>
               </a:ext>
             </a:extLst>
           </p:cNvPr>
@@ -12590,16 +12269,12 @@
           <a:p>
             <a:pPr algn="ctr"/>
             <a:r>
-              <a:rPr lang="fr-FR" sz="800" b="1" noProof="1" smtClean="0">
+              <a:rPr lang="fr-FR" sz="800" b="1" noProof="1">
                 <a:latin typeface="Consolas" panose="020B0609020204030204" pitchFamily="49" charset="0"/>
                 <a:cs typeface="Consolas" panose="020B0609020204030204" pitchFamily="49" charset="0"/>
               </a:rPr>
               <a:t>dvb</a:t>
             </a:r>
-            <a:endParaRPr lang="fr-FR" sz="800" b="1" noProof="1">
-              <a:latin typeface="Consolas" panose="020B0609020204030204" pitchFamily="49" charset="0"/>
-              <a:cs typeface="Consolas" panose="020B0609020204030204" pitchFamily="49" charset="0"/>
-            </a:endParaRPr>
           </a:p>
         </p:txBody>
       </p:sp>
@@ -12608,7 +12283,7 @@
           <p:cNvPr id="271" name="Rectangle à coins arrondis 270">
             <a:extLst>
               <a:ext uri="{FF2B5EF4-FFF2-40B4-BE49-F238E27FC236}">
-                <a16:creationId xmlns:a16="http://schemas.microsoft.com/office/drawing/2014/main" xmlns="" id="{FF06C02C-F215-8D4F-A8E5-8095AD1B4B48}"/>
+                <a16:creationId xmlns:a16="http://schemas.microsoft.com/office/drawing/2014/main" id="{FF06C02C-F215-8D4F-A8E5-8095AD1B4B48}"/>
               </a:ext>
             </a:extLst>
           </p:cNvPr>
@@ -12652,16 +12327,12 @@
           <a:p>
             <a:pPr algn="ctr"/>
             <a:r>
-              <a:rPr lang="fr-FR" sz="800" b="1" noProof="1" smtClean="0">
+              <a:rPr lang="fr-FR" sz="800" b="1" noProof="1">
                 <a:latin typeface="Consolas" panose="020B0609020204030204" pitchFamily="49" charset="0"/>
                 <a:cs typeface="Consolas" panose="020B0609020204030204" pitchFamily="49" charset="0"/>
               </a:rPr>
               <a:t>zap</a:t>
             </a:r>
-            <a:endParaRPr lang="fr-FR" sz="800" b="1" noProof="1">
-              <a:latin typeface="Consolas" panose="020B0609020204030204" pitchFamily="49" charset="0"/>
-              <a:cs typeface="Consolas" panose="020B0609020204030204" pitchFamily="49" charset="0"/>
-            </a:endParaRPr>
           </a:p>
         </p:txBody>
       </p:sp>
@@ -12670,7 +12341,7 @@
           <p:cNvPr id="272" name="Rectangle à coins arrondis 271">
             <a:extLst>
               <a:ext uri="{FF2B5EF4-FFF2-40B4-BE49-F238E27FC236}">
-                <a16:creationId xmlns:a16="http://schemas.microsoft.com/office/drawing/2014/main" xmlns="" id="{DC06761C-E5D6-8C40-8FE7-6EAC716FC474}"/>
+                <a16:creationId xmlns:a16="http://schemas.microsoft.com/office/drawing/2014/main" id="{DC06761C-E5D6-8C40-8FE7-6EAC716FC474}"/>
               </a:ext>
             </a:extLst>
           </p:cNvPr>
@@ -12714,7 +12385,7 @@
           <a:p>
             <a:pPr algn="ctr"/>
             <a:r>
-              <a:rPr lang="fr-FR" sz="800" b="1" noProof="1" smtClean="0">
+              <a:rPr lang="fr-FR" sz="800" b="1" noProof="1">
                 <a:latin typeface="Consolas" panose="020B0609020204030204" pitchFamily="49" charset="0"/>
                 <a:ea typeface="Arial Rounded MT Bold" charset="0"/>
                 <a:cs typeface="Consolas" panose="020B0609020204030204" pitchFamily="49" charset="0"/>
@@ -12734,7 +12405,7 @@
           <p:cNvPr id="273" name="Connecteur droit avec flèche 272">
             <a:extLst>
               <a:ext uri="{FF2B5EF4-FFF2-40B4-BE49-F238E27FC236}">
-                <a16:creationId xmlns:a16="http://schemas.microsoft.com/office/drawing/2014/main" xmlns="" id="{917022DD-9C4E-8C4F-8EF4-DC025172FC05}"/>
+                <a16:creationId xmlns:a16="http://schemas.microsoft.com/office/drawing/2014/main" id="{917022DD-9C4E-8C4F-8EF4-DC025172FC05}"/>
               </a:ext>
             </a:extLst>
           </p:cNvPr>
@@ -12780,7 +12451,7 @@
           <p:cNvPr id="274" name="Connecteur droit avec flèche 273">
             <a:extLst>
               <a:ext uri="{FF2B5EF4-FFF2-40B4-BE49-F238E27FC236}">
-                <a16:creationId xmlns:a16="http://schemas.microsoft.com/office/drawing/2014/main" xmlns="" id="{C8A7163D-1B73-8544-BEB6-5055C4559C5C}"/>
+                <a16:creationId xmlns:a16="http://schemas.microsoft.com/office/drawing/2014/main" id="{C8A7163D-1B73-8544-BEB6-5055C4559C5C}"/>
               </a:ext>
             </a:extLst>
           </p:cNvPr>
@@ -12826,7 +12497,7 @@
           <p:cNvPr id="275" name="Connecteur droit avec flèche 274">
             <a:extLst>
               <a:ext uri="{FF2B5EF4-FFF2-40B4-BE49-F238E27FC236}">
-                <a16:creationId xmlns:a16="http://schemas.microsoft.com/office/drawing/2014/main" xmlns="" id="{0EB21763-B322-DA48-835F-2AC58953056D}"/>
+                <a16:creationId xmlns:a16="http://schemas.microsoft.com/office/drawing/2014/main" id="{0EB21763-B322-DA48-835F-2AC58953056D}"/>
               </a:ext>
             </a:extLst>
           </p:cNvPr>
@@ -12873,7 +12544,7 @@
           <p:cNvPr id="276" name="ZoneTexte 275">
             <a:extLst>
               <a:ext uri="{FF2B5EF4-FFF2-40B4-BE49-F238E27FC236}">
-                <a16:creationId xmlns:a16="http://schemas.microsoft.com/office/drawing/2014/main" xmlns="" id="{9C7431C8-D75F-5142-A1EB-8230494FC409}"/>
+                <a16:creationId xmlns:a16="http://schemas.microsoft.com/office/drawing/2014/main" id="{9C7431C8-D75F-5142-A1EB-8230494FC409}"/>
               </a:ext>
             </a:extLst>
           </p:cNvPr>
@@ -12897,18 +12568,13 @@
           <a:lstStyle/>
           <a:p>
             <a:r>
-              <a:rPr lang="fr-FR" sz="800" noProof="1" smtClean="0">
+              <a:rPr lang="fr-FR" sz="800" noProof="1">
                 <a:latin typeface="Cambria" panose="02040503050406030204" pitchFamily="18" charset="0"/>
                 <a:ea typeface="Arial Rounded MT Bold" charset="0"/>
                 <a:cs typeface="Arial Rounded MT Bold" charset="0"/>
               </a:rPr>
               <a:t>input TS 1</a:t>
             </a:r>
-            <a:endParaRPr lang="fr-FR" sz="800" noProof="1">
-              <a:latin typeface="Cambria" panose="02040503050406030204" pitchFamily="18" charset="0"/>
-              <a:ea typeface="Arial Rounded MT Bold" charset="0"/>
-              <a:cs typeface="Arial Rounded MT Bold" charset="0"/>
-            </a:endParaRPr>
           </a:p>
         </p:txBody>
       </p:sp>
@@ -12917,7 +12583,7 @@
           <p:cNvPr id="277" name="Connecteur droit avec flèche 276">
             <a:extLst>
               <a:ext uri="{FF2B5EF4-FFF2-40B4-BE49-F238E27FC236}">
-                <a16:creationId xmlns:a16="http://schemas.microsoft.com/office/drawing/2014/main" xmlns="" id="{51025ACC-3151-1E4B-AB8E-659FC8729762}"/>
+                <a16:creationId xmlns:a16="http://schemas.microsoft.com/office/drawing/2014/main" id="{51025ACC-3151-1E4B-AB8E-659FC8729762}"/>
               </a:ext>
             </a:extLst>
           </p:cNvPr>
@@ -12964,7 +12630,7 @@
           <p:cNvPr id="278" name="Connecteur droit avec flèche 120">
             <a:extLst>
               <a:ext uri="{FF2B5EF4-FFF2-40B4-BE49-F238E27FC236}">
-                <a16:creationId xmlns:a16="http://schemas.microsoft.com/office/drawing/2014/main" xmlns="" id="{906459B5-8582-FB4E-8E54-AFC7005D5446}"/>
+                <a16:creationId xmlns:a16="http://schemas.microsoft.com/office/drawing/2014/main" id="{906459B5-8582-FB4E-8E54-AFC7005D5446}"/>
               </a:ext>
             </a:extLst>
           </p:cNvPr>
@@ -13013,7 +12679,7 @@
           <p:cNvPr id="279" name="ZoneTexte 278">
             <a:extLst>
               <a:ext uri="{FF2B5EF4-FFF2-40B4-BE49-F238E27FC236}">
-                <a16:creationId xmlns:a16="http://schemas.microsoft.com/office/drawing/2014/main" xmlns="" id="{CA252A1D-16B0-9A4A-89F5-1189E8A73A99}"/>
+                <a16:creationId xmlns:a16="http://schemas.microsoft.com/office/drawing/2014/main" id="{CA252A1D-16B0-9A4A-89F5-1189E8A73A99}"/>
               </a:ext>
             </a:extLst>
           </p:cNvPr>
@@ -13037,18 +12703,13 @@
           <a:lstStyle/>
           <a:p>
             <a:r>
-              <a:rPr lang="fr-FR" sz="800" noProof="1" smtClean="0">
+              <a:rPr lang="fr-FR" sz="800" noProof="1">
                 <a:latin typeface="Cambria" panose="02040503050406030204" pitchFamily="18" charset="0"/>
                 <a:ea typeface="Arial Rounded MT Bold" charset="0"/>
                 <a:cs typeface="Arial Rounded MT Bold" charset="0"/>
               </a:rPr>
               <a:t>input TS 2</a:t>
             </a:r>
-            <a:endParaRPr lang="fr-FR" sz="800" noProof="1">
-              <a:latin typeface="Cambria" panose="02040503050406030204" pitchFamily="18" charset="0"/>
-              <a:ea typeface="Arial Rounded MT Bold" charset="0"/>
-              <a:cs typeface="Arial Rounded MT Bold" charset="0"/>
-            </a:endParaRPr>
           </a:p>
         </p:txBody>
       </p:sp>
@@ -13057,7 +12718,7 @@
           <p:cNvPr id="280" name="ZoneTexte 279">
             <a:extLst>
               <a:ext uri="{FF2B5EF4-FFF2-40B4-BE49-F238E27FC236}">
-                <a16:creationId xmlns:a16="http://schemas.microsoft.com/office/drawing/2014/main" xmlns="" id="{CD80FC3C-1E7A-C341-AB6B-3F80A5F70604}"/>
+                <a16:creationId xmlns:a16="http://schemas.microsoft.com/office/drawing/2014/main" id="{CD80FC3C-1E7A-C341-AB6B-3F80A5F70604}"/>
               </a:ext>
             </a:extLst>
           </p:cNvPr>
@@ -13081,18 +12742,13 @@
           <a:lstStyle/>
           <a:p>
             <a:r>
-              <a:rPr lang="fr-FR" sz="800" noProof="1" smtClean="0">
+              <a:rPr lang="fr-FR" sz="800" noProof="1">
                 <a:latin typeface="Cambria" panose="02040503050406030204" pitchFamily="18" charset="0"/>
                 <a:ea typeface="Arial Rounded MT Bold" charset="0"/>
                 <a:cs typeface="Arial Rounded MT Bold" charset="0"/>
               </a:rPr>
               <a:t>input TS 3</a:t>
             </a:r>
-            <a:endParaRPr lang="fr-FR" sz="800" noProof="1">
-              <a:latin typeface="Cambria" panose="02040503050406030204" pitchFamily="18" charset="0"/>
-              <a:ea typeface="Arial Rounded MT Bold" charset="0"/>
-              <a:cs typeface="Arial Rounded MT Bold" charset="0"/>
-            </a:endParaRPr>
           </a:p>
         </p:txBody>
       </p:sp>
@@ -13101,7 +12757,7 @@
           <p:cNvPr id="281" name="Rectangle à coins arrondis 280">
             <a:extLst>
               <a:ext uri="{FF2B5EF4-FFF2-40B4-BE49-F238E27FC236}">
-                <a16:creationId xmlns:a16="http://schemas.microsoft.com/office/drawing/2014/main" xmlns="" id="{0E47B07A-E542-E94F-B3E2-4F4ABA87F78E}"/>
+                <a16:creationId xmlns:a16="http://schemas.microsoft.com/office/drawing/2014/main" id="{0E47B07A-E542-E94F-B3E2-4F4ABA87F78E}"/>
               </a:ext>
             </a:extLst>
           </p:cNvPr>
@@ -13150,7 +12806,7 @@
           <a:p>
             <a:pPr algn="ctr"/>
             <a:r>
-              <a:rPr lang="fr-FR" sz="800" noProof="1" smtClean="0">
+              <a:rPr lang="fr-FR" sz="800" noProof="1">
                 <a:solidFill>
                   <a:schemeClr val="tx1"/>
                 </a:solidFill>
@@ -13160,14 +12816,6 @@
               </a:rPr>
               <a:t>Remote control</a:t>
             </a:r>
-            <a:endParaRPr lang="fr-FR" sz="800" noProof="1">
-              <a:solidFill>
-                <a:schemeClr val="tx1"/>
-              </a:solidFill>
-              <a:latin typeface="Cambria" panose="02040503050406030204" pitchFamily="18" charset="0"/>
-              <a:ea typeface="Arial Rounded MT Bold" charset="0"/>
-              <a:cs typeface="Arial Rounded MT Bold" charset="0"/>
-            </a:endParaRPr>
           </a:p>
         </p:txBody>
       </p:sp>
@@ -13176,7 +12824,7 @@
           <p:cNvPr id="282" name="Connecteur droit avec flèche 179">
             <a:extLst>
               <a:ext uri="{FF2B5EF4-FFF2-40B4-BE49-F238E27FC236}">
-                <a16:creationId xmlns:a16="http://schemas.microsoft.com/office/drawing/2014/main" xmlns="" id="{790BDF13-B28F-4A4B-8464-24DEEE7A347F}"/>
+                <a16:creationId xmlns:a16="http://schemas.microsoft.com/office/drawing/2014/main" id="{790BDF13-B28F-4A4B-8464-24DEEE7A347F}"/>
               </a:ext>
             </a:extLst>
           </p:cNvPr>
@@ -13223,7 +12871,7 @@
           <p:cNvPr id="283" name="ZoneTexte 282">
             <a:extLst>
               <a:ext uri="{FF2B5EF4-FFF2-40B4-BE49-F238E27FC236}">
-                <a16:creationId xmlns:a16="http://schemas.microsoft.com/office/drawing/2014/main" xmlns="" id="{0A8106A8-EA81-3B49-833A-1C0B7A03B6C3}"/>
+                <a16:creationId xmlns:a16="http://schemas.microsoft.com/office/drawing/2014/main" id="{0A8106A8-EA81-3B49-833A-1C0B7A03B6C3}"/>
               </a:ext>
             </a:extLst>
           </p:cNvPr>
@@ -13247,7 +12895,7 @@
           <a:lstStyle/>
           <a:p>
             <a:r>
-              <a:rPr lang="fr-FR" sz="800" noProof="1" smtClean="0">
+              <a:rPr lang="fr-FR" sz="800" noProof="1">
                 <a:latin typeface="Cambria" panose="02040503050406030204" pitchFamily="18" charset="0"/>
                 <a:ea typeface="Arial Rounded MT Bold" charset="0"/>
                 <a:cs typeface="Arial Rounded MT Bold" charset="0"/>
@@ -13256,7 +12904,7 @@
             </a:r>
           </a:p>
           <a:p>
-            <a:endParaRPr lang="fr-FR" sz="800" noProof="1" smtClean="0">
+            <a:endParaRPr lang="fr-FR" sz="800" noProof="1">
               <a:latin typeface="Cambria" panose="02040503050406030204" pitchFamily="18" charset="0"/>
               <a:ea typeface="Arial Rounded MT Bold" charset="0"/>
               <a:cs typeface="Arial Rounded MT Bold" charset="0"/>
@@ -13264,7 +12912,7 @@
           </a:p>
           <a:p>
             <a:r>
-              <a:rPr lang="fr-FR" sz="800" noProof="1" smtClean="0">
+              <a:rPr lang="fr-FR" sz="800" noProof="1">
                 <a:latin typeface="Consolas" panose="020B0609020204030204" pitchFamily="49" charset="0"/>
                 <a:ea typeface="Arial Rounded MT Bold" charset="0"/>
                 <a:cs typeface="Consolas" panose="020B0609020204030204" pitchFamily="49" charset="0"/>
@@ -13274,7 +12922,7 @@
           </a:p>
           <a:p>
             <a:r>
-              <a:rPr lang="fr-FR" sz="800" noProof="1" smtClean="0">
+              <a:rPr lang="fr-FR" sz="800" noProof="1">
                 <a:latin typeface="Consolas" panose="020B0609020204030204" pitchFamily="49" charset="0"/>
                 <a:ea typeface="Arial Rounded MT Bold" charset="0"/>
                 <a:cs typeface="Consolas" panose="020B0609020204030204" pitchFamily="49" charset="0"/>
@@ -13284,7 +12932,7 @@
           </a:p>
           <a:p>
             <a:r>
-              <a:rPr lang="fr-FR" sz="800" noProof="1" smtClean="0">
+              <a:rPr lang="fr-FR" sz="800" noProof="1">
                 <a:latin typeface="Consolas" panose="020B0609020204030204" pitchFamily="49" charset="0"/>
                 <a:ea typeface="Arial Rounded MT Bold" charset="0"/>
                 <a:cs typeface="Consolas" panose="020B0609020204030204" pitchFamily="49" charset="0"/>
@@ -13294,18 +12942,13 @@
           </a:p>
           <a:p>
             <a:r>
-              <a:rPr lang="fr-FR" sz="800" noProof="1" smtClean="0">
+              <a:rPr lang="fr-FR" sz="800" noProof="1">
                 <a:latin typeface="Consolas" panose="020B0609020204030204" pitchFamily="49" charset="0"/>
                 <a:ea typeface="Arial Rounded MT Bold" charset="0"/>
                 <a:cs typeface="Consolas" panose="020B0609020204030204" pitchFamily="49" charset="0"/>
               </a:rPr>
               <a:t>"3"</a:t>
             </a:r>
-            <a:endParaRPr lang="fr-FR" sz="800" noProof="1">
-              <a:latin typeface="Consolas" panose="020B0609020204030204" pitchFamily="49" charset="0"/>
-              <a:ea typeface="Arial Rounded MT Bold" charset="0"/>
-              <a:cs typeface="Consolas" panose="020B0609020204030204" pitchFamily="49" charset="0"/>
-            </a:endParaRPr>
           </a:p>
         </p:txBody>
       </p:sp>
@@ -13314,7 +12957,7 @@
           <p:cNvPr id="158" name="Rectangle à coins arrondis 157">
             <a:extLst>
               <a:ext uri="{FF2B5EF4-FFF2-40B4-BE49-F238E27FC236}">
-                <a16:creationId xmlns:a16="http://schemas.microsoft.com/office/drawing/2014/main" xmlns="" id="{F16D29F8-F334-CB4D-BFD1-BD53652E3698}"/>
+                <a16:creationId xmlns:a16="http://schemas.microsoft.com/office/drawing/2014/main" id="{F16D29F8-F334-CB4D-BFD1-BD53652E3698}"/>
               </a:ext>
             </a:extLst>
           </p:cNvPr>
@@ -13363,7 +13006,7 @@
           <a:p>
             <a:pPr algn="ctr"/>
             <a:r>
-              <a:rPr lang="fr-FR" sz="800" noProof="1" smtClean="0">
+              <a:rPr lang="fr-FR" sz="800" noProof="1">
                 <a:solidFill>
                   <a:schemeClr val="tx1"/>
                 </a:solidFill>
@@ -13377,7 +13020,7 @@
           <a:p>
             <a:pPr algn="ctr"/>
             <a:r>
-              <a:rPr lang="fr-FR" sz="800" noProof="1" smtClean="0">
+              <a:rPr lang="fr-FR" sz="800" noProof="1">
                 <a:solidFill>
                   <a:schemeClr val="tx1"/>
                 </a:solidFill>
@@ -13387,14 +13030,6 @@
               </a:rPr>
               <a:t>tuner 0</a:t>
             </a:r>
-            <a:endParaRPr lang="fr-FR" sz="800" noProof="1">
-              <a:solidFill>
-                <a:schemeClr val="tx1"/>
-              </a:solidFill>
-              <a:latin typeface="Cambria" panose="02040503050406030204" pitchFamily="18" charset="0"/>
-              <a:ea typeface="Arial Rounded MT Bold" charset="0"/>
-              <a:cs typeface="Arial Rounded MT Bold" charset="0"/>
-            </a:endParaRPr>
           </a:p>
         </p:txBody>
       </p:sp>
@@ -13403,7 +13038,7 @@
           <p:cNvPr id="159" name="Connecteur droit 158">
             <a:extLst>
               <a:ext uri="{FF2B5EF4-FFF2-40B4-BE49-F238E27FC236}">
-                <a16:creationId xmlns:a16="http://schemas.microsoft.com/office/drawing/2014/main" xmlns="" id="{21FEE28B-F787-BA47-B678-2E1BC9B22353}"/>
+                <a16:creationId xmlns:a16="http://schemas.microsoft.com/office/drawing/2014/main" id="{21FEE28B-F787-BA47-B678-2E1BC9B22353}"/>
               </a:ext>
             </a:extLst>
           </p:cNvPr>
@@ -13446,7 +13081,7 @@
           <p:cNvPr id="160" name="Picture 3">
             <a:extLst>
               <a:ext uri="{FF2B5EF4-FFF2-40B4-BE49-F238E27FC236}">
-                <a16:creationId xmlns:a16="http://schemas.microsoft.com/office/drawing/2014/main" xmlns="" id="{8B89C201-BA7A-3547-9956-97C9C5593DB9}"/>
+                <a16:creationId xmlns:a16="http://schemas.microsoft.com/office/drawing/2014/main" id="{8B89C201-BA7A-3547-9956-97C9C5593DB9}"/>
               </a:ext>
             </a:extLst>
           </p:cNvPr>
@@ -13516,7 +13151,7 @@
           <p:cNvPr id="162" name="Rectangle à coins arrondis 161">
             <a:extLst>
               <a:ext uri="{FF2B5EF4-FFF2-40B4-BE49-F238E27FC236}">
-                <a16:creationId xmlns:a16="http://schemas.microsoft.com/office/drawing/2014/main" xmlns="" id="{207176EF-D58B-9F42-B51F-EDF84066C434}"/>
+                <a16:creationId xmlns:a16="http://schemas.microsoft.com/office/drawing/2014/main" id="{207176EF-D58B-9F42-B51F-EDF84066C434}"/>
               </a:ext>
             </a:extLst>
           </p:cNvPr>
@@ -13565,7 +13200,7 @@
           <a:p>
             <a:pPr algn="ctr"/>
             <a:r>
-              <a:rPr lang="fr-FR" sz="900" b="1" noProof="1" smtClean="0">
+              <a:rPr lang="fr-FR" sz="900" b="1" noProof="1">
                 <a:solidFill>
                   <a:schemeClr val="tx1"/>
                 </a:solidFill>
@@ -13591,7 +13226,7 @@
           <p:cNvPr id="163" name="Rectangle à coins arrondis 162">
             <a:extLst>
               <a:ext uri="{FF2B5EF4-FFF2-40B4-BE49-F238E27FC236}">
-                <a16:creationId xmlns:a16="http://schemas.microsoft.com/office/drawing/2014/main" xmlns="" id="{0EBD748A-8AD9-2C46-89B4-4F6A71D46447}"/>
+                <a16:creationId xmlns:a16="http://schemas.microsoft.com/office/drawing/2014/main" id="{0EBD748A-8AD9-2C46-89B4-4F6A71D46447}"/>
               </a:ext>
             </a:extLst>
           </p:cNvPr>
@@ -13635,16 +13270,12 @@
           <a:p>
             <a:pPr algn="ctr"/>
             <a:r>
-              <a:rPr lang="fr-FR" sz="800" b="1" noProof="1" smtClean="0">
+              <a:rPr lang="fr-FR" sz="800" b="1" noProof="1">
                 <a:latin typeface="Consolas" panose="020B0609020204030204" pitchFamily="49" charset="0"/>
                 <a:cs typeface="Consolas" panose="020B0609020204030204" pitchFamily="49" charset="0"/>
               </a:rPr>
               <a:t>dvb</a:t>
             </a:r>
-            <a:endParaRPr lang="fr-FR" sz="800" b="1" noProof="1">
-              <a:latin typeface="Consolas" panose="020B0609020204030204" pitchFamily="49" charset="0"/>
-              <a:cs typeface="Consolas" panose="020B0609020204030204" pitchFamily="49" charset="0"/>
-            </a:endParaRPr>
           </a:p>
         </p:txBody>
       </p:sp>
@@ -13653,7 +13284,7 @@
           <p:cNvPr id="164" name="Rectangle à coins arrondis 163">
             <a:extLst>
               <a:ext uri="{FF2B5EF4-FFF2-40B4-BE49-F238E27FC236}">
-                <a16:creationId xmlns:a16="http://schemas.microsoft.com/office/drawing/2014/main" xmlns="" id="{FF06C02C-F215-8D4F-A8E5-8095AD1B4B48}"/>
+                <a16:creationId xmlns:a16="http://schemas.microsoft.com/office/drawing/2014/main" id="{FF06C02C-F215-8D4F-A8E5-8095AD1B4B48}"/>
               </a:ext>
             </a:extLst>
           </p:cNvPr>
@@ -13697,16 +13328,12 @@
           <a:p>
             <a:pPr algn="ctr"/>
             <a:r>
-              <a:rPr lang="fr-FR" sz="800" b="1" noProof="1" smtClean="0">
+              <a:rPr lang="fr-FR" sz="800" b="1" noProof="1">
                 <a:latin typeface="Consolas" panose="020B0609020204030204" pitchFamily="49" charset="0"/>
                 <a:cs typeface="Consolas" panose="020B0609020204030204" pitchFamily="49" charset="0"/>
               </a:rPr>
               <a:t>zap</a:t>
             </a:r>
-            <a:endParaRPr lang="fr-FR" sz="800" b="1" noProof="1">
-              <a:latin typeface="Consolas" panose="020B0609020204030204" pitchFamily="49" charset="0"/>
-              <a:cs typeface="Consolas" panose="020B0609020204030204" pitchFamily="49" charset="0"/>
-            </a:endParaRPr>
           </a:p>
         </p:txBody>
       </p:sp>
@@ -13715,7 +13342,7 @@
           <p:cNvPr id="165" name="Rectangle à coins arrondis 164">
             <a:extLst>
               <a:ext uri="{FF2B5EF4-FFF2-40B4-BE49-F238E27FC236}">
-                <a16:creationId xmlns:a16="http://schemas.microsoft.com/office/drawing/2014/main" xmlns="" id="{DC06761C-E5D6-8C40-8FE7-6EAC716FC474}"/>
+                <a16:creationId xmlns:a16="http://schemas.microsoft.com/office/drawing/2014/main" id="{DC06761C-E5D6-8C40-8FE7-6EAC716FC474}"/>
               </a:ext>
             </a:extLst>
           </p:cNvPr>
@@ -13759,7 +13386,7 @@
           <a:p>
             <a:pPr algn="ctr"/>
             <a:r>
-              <a:rPr lang="fr-FR" sz="800" b="1" noProof="1" smtClean="0">
+              <a:rPr lang="fr-FR" sz="800" b="1" noProof="1">
                 <a:latin typeface="Consolas" panose="020B0609020204030204" pitchFamily="49" charset="0"/>
                 <a:ea typeface="Arial Rounded MT Bold" charset="0"/>
                 <a:cs typeface="Consolas" panose="020B0609020204030204" pitchFamily="49" charset="0"/>
@@ -13779,7 +13406,7 @@
           <p:cNvPr id="166" name="Connecteur droit avec flèche 165">
             <a:extLst>
               <a:ext uri="{FF2B5EF4-FFF2-40B4-BE49-F238E27FC236}">
-                <a16:creationId xmlns:a16="http://schemas.microsoft.com/office/drawing/2014/main" xmlns="" id="{917022DD-9C4E-8C4F-8EF4-DC025172FC05}"/>
+                <a16:creationId xmlns:a16="http://schemas.microsoft.com/office/drawing/2014/main" id="{917022DD-9C4E-8C4F-8EF4-DC025172FC05}"/>
               </a:ext>
             </a:extLst>
           </p:cNvPr>
@@ -13825,7 +13452,7 @@
           <p:cNvPr id="167" name="Connecteur droit avec flèche 166">
             <a:extLst>
               <a:ext uri="{FF2B5EF4-FFF2-40B4-BE49-F238E27FC236}">
-                <a16:creationId xmlns:a16="http://schemas.microsoft.com/office/drawing/2014/main" xmlns="" id="{C8A7163D-1B73-8544-BEB6-5055C4559C5C}"/>
+                <a16:creationId xmlns:a16="http://schemas.microsoft.com/office/drawing/2014/main" id="{C8A7163D-1B73-8544-BEB6-5055C4559C5C}"/>
               </a:ext>
             </a:extLst>
           </p:cNvPr>
@@ -13871,7 +13498,7 @@
           <p:cNvPr id="168" name="Connecteur droit avec flèche 167">
             <a:extLst>
               <a:ext uri="{FF2B5EF4-FFF2-40B4-BE49-F238E27FC236}">
-                <a16:creationId xmlns:a16="http://schemas.microsoft.com/office/drawing/2014/main" xmlns="" id="{0EB21763-B322-DA48-835F-2AC58953056D}"/>
+                <a16:creationId xmlns:a16="http://schemas.microsoft.com/office/drawing/2014/main" id="{0EB21763-B322-DA48-835F-2AC58953056D}"/>
               </a:ext>
             </a:extLst>
           </p:cNvPr>
@@ -13918,7 +13545,7 @@
           <p:cNvPr id="169" name="Connecteur droit avec flèche 168">
             <a:extLst>
               <a:ext uri="{FF2B5EF4-FFF2-40B4-BE49-F238E27FC236}">
-                <a16:creationId xmlns:a16="http://schemas.microsoft.com/office/drawing/2014/main" xmlns="" id="{51025ACC-3151-1E4B-AB8E-659FC8729762}"/>
+                <a16:creationId xmlns:a16="http://schemas.microsoft.com/office/drawing/2014/main" id="{51025ACC-3151-1E4B-AB8E-659FC8729762}"/>
               </a:ext>
             </a:extLst>
           </p:cNvPr>
@@ -13965,7 +13592,7 @@
           <p:cNvPr id="172" name="ZoneTexte 171">
             <a:extLst>
               <a:ext uri="{FF2B5EF4-FFF2-40B4-BE49-F238E27FC236}">
-                <a16:creationId xmlns:a16="http://schemas.microsoft.com/office/drawing/2014/main" xmlns="" id="{CD80FC3C-1E7A-C341-AB6B-3F80A5F70604}"/>
+                <a16:creationId xmlns:a16="http://schemas.microsoft.com/office/drawing/2014/main" id="{CD80FC3C-1E7A-C341-AB6B-3F80A5F70604}"/>
               </a:ext>
             </a:extLst>
           </p:cNvPr>
@@ -13989,18 +13616,13 @@
           <a:lstStyle/>
           <a:p>
             <a:r>
-              <a:rPr lang="fr-FR" sz="800" noProof="1" smtClean="0">
+              <a:rPr lang="fr-FR" sz="800" noProof="1">
                 <a:latin typeface="Cambria" panose="02040503050406030204" pitchFamily="18" charset="0"/>
                 <a:ea typeface="Arial Rounded MT Bold" charset="0"/>
                 <a:cs typeface="Arial Rounded MT Bold" charset="0"/>
               </a:rPr>
               <a:t>input TS 0</a:t>
             </a:r>
-            <a:endParaRPr lang="fr-FR" sz="800" noProof="1">
-              <a:latin typeface="Cambria" panose="02040503050406030204" pitchFamily="18" charset="0"/>
-              <a:ea typeface="Arial Rounded MT Bold" charset="0"/>
-              <a:cs typeface="Arial Rounded MT Bold" charset="0"/>
-            </a:endParaRPr>
           </a:p>
         </p:txBody>
       </p:sp>
@@ -14215,14 +13837,6 @@
                 </a:rPr>
                 <a:t>Operating System</a:t>
               </a:r>
-              <a:endParaRPr lang="fr-FR" sz="600" b="1" noProof="1">
-                <a:solidFill>
-                  <a:schemeClr val="tx1"/>
-                </a:solidFill>
-                <a:latin typeface="Cambria" panose="02040503050406030204" pitchFamily="18" charset="0"/>
-                <a:ea typeface="Arial Rounded MT Bold" charset="0"/>
-                <a:cs typeface="Arial Rounded MT Bold" charset="0"/>
-              </a:endParaRPr>
             </a:p>
           </p:txBody>
         </p:sp>
@@ -14278,11 +13892,6 @@
                 </a:rPr>
                 <a:t>Windows</a:t>
               </a:r>
-              <a:endParaRPr lang="fr-FR" sz="600" b="1" noProof="1">
-                <a:latin typeface="Cambria" panose="02040503050406030204" pitchFamily="18" charset="0"/>
-                <a:ea typeface="Arial Rounded MT Bold" charset="0"/>
-                <a:cs typeface="Arial Rounded MT Bold" charset="0"/>
-              </a:endParaRPr>
             </a:p>
           </p:txBody>
         </p:sp>
@@ -14350,18 +13959,13 @@
             <a:lstStyle/>
             <a:p>
               <a:r>
-                <a:rPr lang="fr-FR" sz="700" noProof="1" smtClean="0">
+                <a:rPr lang="fr-FR" sz="700" noProof="1">
                   <a:latin typeface="Cambria" panose="02040503050406030204" pitchFamily="18" charset="0"/>
                   <a:ea typeface="Arial Rounded MT Bold" charset="0"/>
                   <a:cs typeface="Arial Rounded MT Bold" charset="0"/>
                 </a:rPr>
                 <a:t>TSDuck</a:t>
               </a:r>
-              <a:endParaRPr lang="fr-FR" sz="700" noProof="1">
-                <a:latin typeface="Cambria" panose="02040503050406030204" pitchFamily="18" charset="0"/>
-                <a:ea typeface="Arial Rounded MT Bold" charset="0"/>
-                <a:cs typeface="Arial Rounded MT Bold" charset="0"/>
-              </a:endParaRPr>
             </a:p>
           </p:txBody>
         </p:sp>
@@ -14412,7 +14016,7 @@
             <a:lstStyle/>
             <a:p>
               <a:r>
-                <a:rPr lang="fr-FR" sz="600" b="1" noProof="1" smtClean="0">
+                <a:rPr lang="fr-FR" sz="600" b="1" noProof="1">
                   <a:solidFill>
                     <a:schemeClr val="tx1"/>
                   </a:solidFill>
@@ -14422,14 +14026,6 @@
                 </a:rPr>
                 <a:t>TSDuck library</a:t>
               </a:r>
-              <a:endParaRPr lang="fr-FR" sz="600" b="1" noProof="1">
-                <a:solidFill>
-                  <a:schemeClr val="tx1"/>
-                </a:solidFill>
-                <a:latin typeface="Cambria" panose="02040503050406030204" pitchFamily="18" charset="0"/>
-                <a:ea typeface="Arial Rounded MT Bold" charset="0"/>
-                <a:cs typeface="Arial Rounded MT Bold" charset="0"/>
-              </a:endParaRPr>
             </a:p>
           </p:txBody>
         </p:sp>
@@ -14476,18 +14072,13 @@
             <a:p>
               <a:pPr algn="ctr"/>
               <a:r>
-                <a:rPr lang="fr-FR" sz="600" b="1" noProof="1" smtClean="0">
+                <a:rPr lang="fr-FR" sz="600" b="1" noProof="1">
                   <a:latin typeface="Cambria" panose="02040503050406030204" pitchFamily="18" charset="0"/>
                   <a:ea typeface="Arial Rounded MT Bold" charset="0"/>
                   <a:cs typeface="Arial Rounded MT Bold" charset="0"/>
                 </a:rPr>
                 <a:t>C++ utilities</a:t>
               </a:r>
-              <a:endParaRPr lang="fr-FR" sz="600" b="1" noProof="1">
-                <a:latin typeface="Cambria" panose="02040503050406030204" pitchFamily="18" charset="0"/>
-                <a:ea typeface="Arial Rounded MT Bold" charset="0"/>
-                <a:cs typeface="Arial Rounded MT Bold" charset="0"/>
-              </a:endParaRPr>
             </a:p>
           </p:txBody>
         </p:sp>
@@ -14543,11 +14134,6 @@
                 </a:rPr>
                 <a:t>Linux</a:t>
               </a:r>
-              <a:endParaRPr lang="fr-FR" sz="600" b="1" noProof="1">
-                <a:latin typeface="Cambria" panose="02040503050406030204" pitchFamily="18" charset="0"/>
-                <a:ea typeface="Arial Rounded MT Bold" charset="0"/>
-                <a:cs typeface="Arial Rounded MT Bold" charset="0"/>
-              </a:endParaRPr>
             </a:p>
           </p:txBody>
         </p:sp>
@@ -14603,11 +14189,6 @@
                 </a:rPr>
                 <a:t>macOS</a:t>
               </a:r>
-              <a:endParaRPr lang="fr-FR" sz="600" b="1" noProof="1">
-                <a:latin typeface="Cambria" panose="02040503050406030204" pitchFamily="18" charset="0"/>
-                <a:ea typeface="Arial Rounded MT Bold" charset="0"/>
-                <a:cs typeface="Arial Rounded MT Bold" charset="0"/>
-              </a:endParaRPr>
             </a:p>
           </p:txBody>
         </p:sp>
@@ -14658,7 +14239,7 @@
             <a:lstStyle/>
             <a:p>
               <a:r>
-                <a:rPr lang="fr-FR" sz="600" b="1" noProof="1" smtClean="0">
+                <a:rPr lang="fr-FR" sz="600" b="1" noProof="1">
                   <a:solidFill>
                     <a:schemeClr val="tx1"/>
                   </a:solidFill>
@@ -14668,14 +14249,6 @@
                 </a:rPr>
                 <a:t>TSDuck plugins</a:t>
               </a:r>
-              <a:endParaRPr lang="fr-FR" sz="600" b="1" noProof="1">
-                <a:solidFill>
-                  <a:schemeClr val="tx1"/>
-                </a:solidFill>
-                <a:latin typeface="Cambria" panose="02040503050406030204" pitchFamily="18" charset="0"/>
-                <a:ea typeface="Arial Rounded MT Bold" charset="0"/>
-                <a:cs typeface="Arial Rounded MT Bold" charset="0"/>
-              </a:endParaRPr>
             </a:p>
           </p:txBody>
         </p:sp>
@@ -14722,18 +14295,13 @@
             <a:p>
               <a:pPr algn="ctr"/>
               <a:r>
-                <a:rPr lang="fr-FR" sz="600" b="1" noProof="1" smtClean="0">
+                <a:rPr lang="fr-FR" sz="600" b="1" noProof="1">
                   <a:latin typeface="Cambria" panose="02040503050406030204" pitchFamily="18" charset="0"/>
                   <a:ea typeface="Arial Rounded MT Bold" charset="0"/>
                   <a:cs typeface="Arial Rounded MT Bold" charset="0"/>
                 </a:rPr>
                 <a:t>TS processing</a:t>
               </a:r>
-              <a:endParaRPr lang="fr-FR" sz="600" b="1" noProof="1">
-                <a:latin typeface="Cambria" panose="02040503050406030204" pitchFamily="18" charset="0"/>
-                <a:ea typeface="Arial Rounded MT Bold" charset="0"/>
-                <a:cs typeface="Arial Rounded MT Bold" charset="0"/>
-              </a:endParaRPr>
             </a:p>
           </p:txBody>
         </p:sp>
@@ -14780,18 +14348,13 @@
             <a:p>
               <a:pPr algn="ctr"/>
               <a:r>
-                <a:rPr lang="fr-FR" sz="600" b="1" noProof="1" smtClean="0">
+                <a:rPr lang="fr-FR" sz="600" b="1" noProof="1">
                   <a:latin typeface="Cambria" panose="02040503050406030204" pitchFamily="18" charset="0"/>
                   <a:ea typeface="Arial Rounded MT Bold" charset="0"/>
                   <a:cs typeface="Arial Rounded MT Bold" charset="0"/>
                 </a:rPr>
                 <a:t>TS input &amp; output</a:t>
               </a:r>
-              <a:endParaRPr lang="fr-FR" sz="600" b="1" noProof="1">
-                <a:latin typeface="Cambria" panose="02040503050406030204" pitchFamily="18" charset="0"/>
-                <a:ea typeface="Arial Rounded MT Bold" charset="0"/>
-                <a:cs typeface="Arial Rounded MT Bold" charset="0"/>
-              </a:endParaRPr>
             </a:p>
           </p:txBody>
         </p:sp>
@@ -14842,7 +14405,7 @@
             <a:lstStyle/>
             <a:p>
               <a:r>
-                <a:rPr lang="fr-FR" sz="600" b="1" noProof="1" smtClean="0">
+                <a:rPr lang="fr-FR" sz="600" b="1" noProof="1">
                   <a:solidFill>
                     <a:schemeClr val="tx1"/>
                   </a:solidFill>
@@ -14852,14 +14415,6 @@
                 </a:rPr>
                 <a:t>TSDuck commands</a:t>
               </a:r>
-              <a:endParaRPr lang="fr-FR" sz="600" b="1" noProof="1">
-                <a:solidFill>
-                  <a:schemeClr val="tx1"/>
-                </a:solidFill>
-                <a:latin typeface="Cambria" panose="02040503050406030204" pitchFamily="18" charset="0"/>
-                <a:ea typeface="Arial Rounded MT Bold" charset="0"/>
-                <a:cs typeface="Arial Rounded MT Bold" charset="0"/>
-              </a:endParaRPr>
             </a:p>
           </p:txBody>
         </p:sp>
@@ -14906,7 +14461,7 @@
             <a:p>
               <a:pPr algn="ctr"/>
               <a:r>
-                <a:rPr lang="fr-FR" sz="600" b="1" noProof="1" smtClean="0">
+                <a:rPr lang="fr-FR" sz="600" b="1" noProof="1">
                   <a:latin typeface="Cambria" panose="02040503050406030204" pitchFamily="18" charset="0"/>
                   <a:ea typeface="Arial Rounded MT Bold" charset="0"/>
                   <a:cs typeface="Arial Rounded MT Bold" charset="0"/>
@@ -14914,7 +14469,7 @@
                 <a:t>other </a:t>
               </a:r>
               <a:r>
-                <a:rPr lang="fr-FR" sz="600" b="1" noProof="1" smtClean="0">
+                <a:rPr lang="fr-FR" sz="600" b="1" noProof="1">
                   <a:latin typeface="Consolas" panose="020B0609020204030204" pitchFamily="49" charset="0"/>
                   <a:ea typeface="Arial Rounded MT Bold" charset="0"/>
                   <a:cs typeface="Consolas" panose="020B0609020204030204" pitchFamily="49" charset="0"/>
@@ -14922,18 +14477,13 @@
                 <a:t>ts</a:t>
               </a:r>
               <a:r>
-                <a:rPr lang="fr-FR" sz="600" b="1" noProof="1" smtClean="0">
+                <a:rPr lang="fr-FR" sz="600" b="1" noProof="1">
                   <a:latin typeface="Cambria" panose="02040503050406030204" pitchFamily="18" charset="0"/>
                   <a:ea typeface="Arial Rounded MT Bold" charset="0"/>
                   <a:cs typeface="Arial Rounded MT Bold" charset="0"/>
                 </a:rPr>
                 <a:t> commands</a:t>
               </a:r>
-              <a:endParaRPr lang="fr-FR" sz="600" b="1" noProof="1">
-                <a:latin typeface="Cambria" panose="02040503050406030204" pitchFamily="18" charset="0"/>
-                <a:ea typeface="Arial Rounded MT Bold" charset="0"/>
-                <a:cs typeface="Arial Rounded MT Bold" charset="0"/>
-              </a:endParaRPr>
             </a:p>
           </p:txBody>
         </p:sp>
@@ -15130,18 +14680,13 @@
             <a:p>
               <a:pPr algn="ctr"/>
               <a:r>
-                <a:rPr lang="fr-FR" sz="600" b="1" noProof="1" smtClean="0">
+                <a:rPr lang="fr-FR" sz="600" b="1" noProof="1">
                   <a:latin typeface="Consolas" panose="020B0609020204030204" pitchFamily="49" charset="0"/>
                   <a:ea typeface="Arial Rounded MT Bold" charset="0"/>
                   <a:cs typeface="Consolas" panose="020B0609020204030204" pitchFamily="49" charset="0"/>
                 </a:rPr>
                 <a:t>tsp</a:t>
               </a:r>
-              <a:endParaRPr lang="fr-FR" sz="600" b="1" noProof="1">
-                <a:latin typeface="Consolas" panose="020B0609020204030204" pitchFamily="49" charset="0"/>
-                <a:ea typeface="Arial Rounded MT Bold" charset="0"/>
-                <a:cs typeface="Consolas" panose="020B0609020204030204" pitchFamily="49" charset="0"/>
-              </a:endParaRPr>
             </a:p>
           </p:txBody>
         </p:sp>
@@ -15188,18 +14733,13 @@
             <a:p>
               <a:pPr algn="ctr"/>
               <a:r>
-                <a:rPr lang="fr-FR" sz="600" b="1" noProof="1" smtClean="0">
+                <a:rPr lang="fr-FR" sz="600" b="1" noProof="1">
                   <a:latin typeface="Consolas" panose="020B0609020204030204" pitchFamily="49" charset="0"/>
                   <a:ea typeface="Arial Rounded MT Bold" charset="0"/>
                   <a:cs typeface="Consolas" panose="020B0609020204030204" pitchFamily="49" charset="0"/>
                 </a:rPr>
                 <a:t>tsswitch</a:t>
               </a:r>
-              <a:endParaRPr lang="fr-FR" sz="600" b="1" noProof="1">
-                <a:latin typeface="Consolas" panose="020B0609020204030204" pitchFamily="49" charset="0"/>
-                <a:ea typeface="Arial Rounded MT Bold" charset="0"/>
-                <a:cs typeface="Consolas" panose="020B0609020204030204" pitchFamily="49" charset="0"/>
-              </a:endParaRPr>
             </a:p>
           </p:txBody>
         </p:sp>
@@ -15249,7 +14789,7 @@
             <a:lstStyle/>
             <a:p>
               <a:r>
-                <a:rPr lang="fr-FR" sz="600" b="1" noProof="1" smtClean="0">
+                <a:rPr lang="fr-FR" sz="600" b="1" noProof="1">
                   <a:solidFill>
                     <a:schemeClr val="tx1"/>
                   </a:solidFill>
@@ -15259,14 +14799,6 @@
                 </a:rPr>
                 <a:t>DVB tuning framework</a:t>
               </a:r>
-              <a:endParaRPr lang="fr-FR" sz="600" b="1" noProof="1">
-                <a:solidFill>
-                  <a:schemeClr val="tx1"/>
-                </a:solidFill>
-                <a:latin typeface="Cambria" panose="02040503050406030204" pitchFamily="18" charset="0"/>
-                <a:ea typeface="Arial Rounded MT Bold" charset="0"/>
-                <a:cs typeface="Arial Rounded MT Bold" charset="0"/>
-              </a:endParaRPr>
             </a:p>
           </p:txBody>
         </p:sp>
@@ -15322,11 +14854,6 @@
                 </a:rPr>
                 <a:t>DirectShow (Windows)</a:t>
               </a:r>
-              <a:endParaRPr lang="fr-FR" sz="600" b="1" noProof="1">
-                <a:latin typeface="Cambria" panose="02040503050406030204" pitchFamily="18" charset="0"/>
-                <a:ea typeface="Arial Rounded MT Bold" charset="0"/>
-                <a:cs typeface="Arial Rounded MT Bold" charset="0"/>
-              </a:endParaRPr>
             </a:p>
           </p:txBody>
         </p:sp>
@@ -15382,11 +14909,6 @@
                 </a:rPr>
                 <a:t>Linux TV</a:t>
               </a:r>
-              <a:endParaRPr lang="fr-FR" sz="600" b="1" noProof="1">
-                <a:latin typeface="Cambria" panose="02040503050406030204" pitchFamily="18" charset="0"/>
-                <a:ea typeface="Arial Rounded MT Bold" charset="0"/>
-                <a:cs typeface="Arial Rounded MT Bold" charset="0"/>
-              </a:endParaRPr>
             </a:p>
           </p:txBody>
         </p:sp>
@@ -15470,18 +14992,13 @@
             <a:p>
               <a:pPr algn="ctr"/>
               <a:r>
-                <a:rPr lang="fr-FR" sz="600" b="1" noProof="1" smtClean="0">
+                <a:rPr lang="fr-FR" sz="600" b="1" noProof="1">
                   <a:latin typeface="Cambria" panose="02040503050406030204" pitchFamily="18" charset="0"/>
                   <a:ea typeface="Arial Rounded MT Bold" charset="0"/>
                   <a:cs typeface="Arial Rounded MT Bold" charset="0"/>
                 </a:rPr>
                 <a:t>MPEG, DVB, DTV</a:t>
               </a:r>
-              <a:endParaRPr lang="fr-FR" sz="600" b="1" noProof="1">
-                <a:latin typeface="Cambria" panose="02040503050406030204" pitchFamily="18" charset="0"/>
-                <a:ea typeface="Arial Rounded MT Bold" charset="0"/>
-                <a:cs typeface="Arial Rounded MT Bold" charset="0"/>
-              </a:endParaRPr>
             </a:p>
           </p:txBody>
         </p:sp>
@@ -15528,18 +15045,13 @@
             <a:p>
               <a:pPr algn="ctr"/>
               <a:r>
-                <a:rPr lang="fr-FR" sz="600" b="1" noProof="1" smtClean="0">
+                <a:rPr lang="fr-FR" sz="600" b="1" noProof="1">
                   <a:latin typeface="Cambria" panose="02040503050406030204" pitchFamily="18" charset="0"/>
                   <a:ea typeface="Arial Rounded MT Bold" charset="0"/>
                   <a:cs typeface="Arial Rounded MT Bold" charset="0"/>
                 </a:rPr>
                 <a:t>OS abstraction</a:t>
               </a:r>
-              <a:endParaRPr lang="fr-FR" sz="600" b="1" noProof="1">
-                <a:latin typeface="Cambria" panose="02040503050406030204" pitchFamily="18" charset="0"/>
-                <a:ea typeface="Arial Rounded MT Bold" charset="0"/>
-                <a:cs typeface="Arial Rounded MT Bold" charset="0"/>
-              </a:endParaRPr>
             </a:p>
           </p:txBody>
         </p:sp>
@@ -15673,11 +15185,6 @@
                 </a:rPr>
                 <a:t>tsanalyze</a:t>
               </a:r>
-              <a:endParaRPr lang="fr-FR" sz="600" b="1" noProof="1">
-                <a:latin typeface="Consolas" panose="020B0609020204030204" pitchFamily="49" charset="0"/>
-                <a:ea typeface="Arial Rounded MT Bold" charset="0"/>
-                <a:cs typeface="Consolas" panose="020B0609020204030204" pitchFamily="49" charset="0"/>
-              </a:endParaRPr>
             </a:p>
           </p:txBody>
         </p:sp>
@@ -15727,7 +15234,7 @@
             <a:lstStyle/>
             <a:p>
               <a:r>
-                <a:rPr lang="fr-FR" sz="600" b="1" noProof="1" smtClean="0">
+                <a:rPr lang="fr-FR" sz="600" b="1" noProof="1">
                   <a:solidFill>
                     <a:schemeClr val="tx1"/>
                   </a:solidFill>
@@ -15737,14 +15244,6 @@
                 </a:rPr>
                 <a:t>3rd-party plugins</a:t>
               </a:r>
-              <a:endParaRPr lang="fr-FR" sz="600" b="1" noProof="1">
-                <a:solidFill>
-                  <a:schemeClr val="tx1"/>
-                </a:solidFill>
-                <a:latin typeface="Cambria" panose="02040503050406030204" pitchFamily="18" charset="0"/>
-                <a:ea typeface="Arial Rounded MT Bold" charset="0"/>
-                <a:cs typeface="Arial Rounded MT Bold" charset="0"/>
-              </a:endParaRPr>
             </a:p>
           </p:txBody>
         </p:sp>
@@ -15857,6 +15356,1502 @@
     <p:extLst>
       <p:ext uri="{BB962C8B-B14F-4D97-AF65-F5344CB8AC3E}">
         <p14:creationId xmlns:p14="http://schemas.microsoft.com/office/powerpoint/2010/main" val="4239256438"/>
+      </p:ext>
+    </p:extLst>
+  </p:cSld>
+  <p:clrMapOvr>
+    <a:masterClrMapping/>
+  </p:clrMapOvr>
+</p:sld>
+</file>
+
+<file path=ppt/slides/slide4.xml><?xml version="1.0" encoding="utf-8"?>
+<p:sld xmlns:a="http://schemas.openxmlformats.org/drawingml/2006/main" xmlns:r="http://schemas.openxmlformats.org/officeDocument/2006/relationships" xmlns:p="http://schemas.openxmlformats.org/presentationml/2006/main">
+  <p:cSld>
+    <p:spTree>
+      <p:nvGrpSpPr>
+        <p:cNvPr id="1" name=""/>
+        <p:cNvGrpSpPr/>
+        <p:nvPr/>
+      </p:nvGrpSpPr>
+      <p:grpSpPr>
+        <a:xfrm>
+          <a:off x="0" y="0"/>
+          <a:ext cx="0" cy="0"/>
+          <a:chOff x="0" y="0"/>
+          <a:chExt cx="0" cy="0"/>
+        </a:xfrm>
+      </p:grpSpPr>
+      <p:sp>
+        <p:nvSpPr>
+          <p:cNvPr id="4" name="Rectangle à coins arrondis 40"/>
+          <p:cNvSpPr/>
+          <p:nvPr/>
+        </p:nvSpPr>
+        <p:spPr>
+          <a:xfrm>
+            <a:off x="909444" y="1458555"/>
+            <a:ext cx="2448000" cy="540000"/>
+          </a:xfrm>
+          <a:prstGeom prst="roundRect">
+            <a:avLst/>
+          </a:prstGeom>
+          <a:solidFill>
+            <a:schemeClr val="accent6">
+              <a:lumMod val="40000"/>
+              <a:lumOff val="60000"/>
+            </a:schemeClr>
+          </a:solidFill>
+          <a:ln w="28575">
+            <a:solidFill>
+              <a:srgbClr val="1F8A4C"/>
+            </a:solidFill>
+          </a:ln>
+        </p:spPr>
+        <p:style>
+          <a:lnRef idx="2">
+            <a:schemeClr val="accent1">
+              <a:shade val="50000"/>
+            </a:schemeClr>
+          </a:lnRef>
+          <a:fillRef idx="1">
+            <a:schemeClr val="accent1"/>
+          </a:fillRef>
+          <a:effectRef idx="0">
+            <a:schemeClr val="accent1"/>
+          </a:effectRef>
+          <a:fontRef idx="minor">
+            <a:schemeClr val="lt1"/>
+          </a:fontRef>
+        </p:style>
+        <p:txBody>
+          <a:bodyPr lIns="36000" rIns="36000" rtlCol="0" anchor="ctr"/>
+          <a:lstStyle/>
+          <a:p>
+            <a:pPr algn="ctr"/>
+            <a:r>
+              <a:rPr lang="fr-FR" sz="900" noProof="1">
+                <a:solidFill>
+                  <a:schemeClr val="tx1"/>
+                </a:solidFill>
+                <a:latin typeface="Cambria" panose="02040503050406030204" pitchFamily="18" charset="0"/>
+                <a:ea typeface="Arial Rounded MT Bold" charset="0"/>
+                <a:cs typeface="Arial Rounded MT Bold" charset="0"/>
+              </a:rPr>
+              <a:t>Microsoft Network Provider</a:t>
+            </a:r>
+          </a:p>
+          <a:p>
+            <a:pPr algn="ctr"/>
+            <a:r>
+              <a:rPr lang="fr-FR" sz="900" noProof="1">
+                <a:solidFill>
+                  <a:schemeClr val="tx1"/>
+                </a:solidFill>
+                <a:latin typeface="Consolas" panose="020B0609020204030204" pitchFamily="49" charset="0"/>
+                <a:ea typeface="Arial Rounded MT Bold" charset="0"/>
+                <a:cs typeface="Arial Rounded MT Bold" charset="0"/>
+              </a:rPr>
+              <a:t>CLSID_NetworkProvider</a:t>
+            </a:r>
+          </a:p>
+        </p:txBody>
+      </p:sp>
+      <p:sp>
+        <p:nvSpPr>
+          <p:cNvPr id="3" name="Rectangle à coins arrondis 40"/>
+          <p:cNvSpPr/>
+          <p:nvPr/>
+        </p:nvSpPr>
+        <p:spPr>
+          <a:xfrm>
+            <a:off x="909444" y="2322266"/>
+            <a:ext cx="2448000" cy="540000"/>
+          </a:xfrm>
+          <a:prstGeom prst="roundRect">
+            <a:avLst/>
+          </a:prstGeom>
+          <a:solidFill>
+            <a:schemeClr val="accent6">
+              <a:lumMod val="40000"/>
+              <a:lumOff val="60000"/>
+            </a:schemeClr>
+          </a:solidFill>
+          <a:ln w="28575">
+            <a:solidFill>
+              <a:srgbClr val="1F8A4C"/>
+            </a:solidFill>
+          </a:ln>
+        </p:spPr>
+        <p:style>
+          <a:lnRef idx="2">
+            <a:schemeClr val="accent1">
+              <a:shade val="50000"/>
+            </a:schemeClr>
+          </a:lnRef>
+          <a:fillRef idx="1">
+            <a:schemeClr val="accent1"/>
+          </a:fillRef>
+          <a:effectRef idx="0">
+            <a:schemeClr val="accent1"/>
+          </a:effectRef>
+          <a:fontRef idx="minor">
+            <a:schemeClr val="lt1"/>
+          </a:fontRef>
+        </p:style>
+        <p:txBody>
+          <a:bodyPr lIns="36000" rIns="36000" rtlCol="0" anchor="ctr"/>
+          <a:lstStyle/>
+          <a:p>
+            <a:pPr algn="ctr"/>
+            <a:r>
+              <a:rPr lang="fr-FR" sz="900" noProof="1">
+                <a:solidFill>
+                  <a:schemeClr val="tx1"/>
+                </a:solidFill>
+                <a:latin typeface="Cambria" panose="02040503050406030204" pitchFamily="18" charset="0"/>
+                <a:ea typeface="Arial Rounded MT Bold" charset="0"/>
+                <a:cs typeface="Arial Rounded MT Bold" charset="0"/>
+              </a:rPr>
+              <a:t>Tuner Filter</a:t>
+            </a:r>
+          </a:p>
+          <a:p>
+            <a:pPr algn="ctr"/>
+            <a:r>
+              <a:rPr lang="fr-FR" sz="900" noProof="1">
+                <a:solidFill>
+                  <a:schemeClr val="tx1"/>
+                </a:solidFill>
+                <a:latin typeface="Cambria" panose="02040503050406030204" pitchFamily="18" charset="0"/>
+                <a:ea typeface="Arial Rounded MT Bold" charset="0"/>
+                <a:cs typeface="Arial Rounded MT Bold" charset="0"/>
+              </a:rPr>
+              <a:t>proprietary, enumerate all </a:t>
+            </a:r>
+            <a:r>
+              <a:rPr lang="fr-FR" sz="900" noProof="1">
+                <a:solidFill>
+                  <a:schemeClr val="tx1"/>
+                </a:solidFill>
+                <a:latin typeface="Consolas" panose="020B0609020204030204" pitchFamily="49" charset="0"/>
+                <a:ea typeface="Arial Rounded MT Bold" charset="0"/>
+                <a:cs typeface="Arial Rounded MT Bold" charset="0"/>
+              </a:rPr>
+              <a:t>KSCATEGORY_BDA_NETWORK_TUNER</a:t>
+            </a:r>
+          </a:p>
+        </p:txBody>
+      </p:sp>
+      <p:cxnSp>
+        <p:nvCxnSpPr>
+          <p:cNvPr id="5" name="Straight Arrow Connector 4"/>
+          <p:cNvCxnSpPr>
+            <a:stCxn id="4" idx="2"/>
+            <a:endCxn id="3" idx="0"/>
+          </p:cNvCxnSpPr>
+          <p:nvPr/>
+        </p:nvCxnSpPr>
+        <p:spPr>
+          <a:xfrm>
+            <a:off x="2133444" y="1998555"/>
+            <a:ext cx="0" cy="323711"/>
+          </a:xfrm>
+          <a:prstGeom prst="straightConnector1">
+            <a:avLst/>
+          </a:prstGeom>
+          <a:solidFill>
+            <a:schemeClr val="accent6">
+              <a:lumMod val="40000"/>
+              <a:lumOff val="60000"/>
+            </a:schemeClr>
+          </a:solidFill>
+          <a:ln w="28575">
+            <a:solidFill>
+              <a:srgbClr val="1F8A4C"/>
+            </a:solidFill>
+            <a:tailEnd type="triangle"/>
+          </a:ln>
+        </p:spPr>
+        <p:style>
+          <a:lnRef idx="2">
+            <a:schemeClr val="accent1">
+              <a:shade val="50000"/>
+            </a:schemeClr>
+          </a:lnRef>
+          <a:fillRef idx="1">
+            <a:schemeClr val="accent1"/>
+          </a:fillRef>
+          <a:effectRef idx="0">
+            <a:schemeClr val="accent1"/>
+          </a:effectRef>
+          <a:fontRef idx="minor">
+            <a:schemeClr val="lt1"/>
+          </a:fontRef>
+        </p:style>
+      </p:cxnSp>
+      <p:sp>
+        <p:nvSpPr>
+          <p:cNvPr id="6" name="Rectangle à coins arrondis 40"/>
+          <p:cNvSpPr/>
+          <p:nvPr/>
+        </p:nvSpPr>
+        <p:spPr>
+          <a:xfrm>
+            <a:off x="909444" y="3189787"/>
+            <a:ext cx="2448000" cy="540000"/>
+          </a:xfrm>
+          <a:prstGeom prst="roundRect">
+            <a:avLst/>
+          </a:prstGeom>
+          <a:solidFill>
+            <a:schemeClr val="accent6">
+              <a:lumMod val="40000"/>
+              <a:lumOff val="60000"/>
+            </a:schemeClr>
+          </a:solidFill>
+          <a:ln w="28575">
+            <a:solidFill>
+              <a:srgbClr val="1F8A4C"/>
+            </a:solidFill>
+            <a:prstDash val="dash"/>
+          </a:ln>
+        </p:spPr>
+        <p:style>
+          <a:lnRef idx="2">
+            <a:schemeClr val="accent1">
+              <a:shade val="50000"/>
+            </a:schemeClr>
+          </a:lnRef>
+          <a:fillRef idx="1">
+            <a:schemeClr val="accent1"/>
+          </a:fillRef>
+          <a:effectRef idx="0">
+            <a:schemeClr val="accent1"/>
+          </a:effectRef>
+          <a:fontRef idx="minor">
+            <a:schemeClr val="lt1"/>
+          </a:fontRef>
+        </p:style>
+        <p:txBody>
+          <a:bodyPr lIns="36000" rIns="36000" rtlCol="0" anchor="ctr"/>
+          <a:lstStyle/>
+          <a:p>
+            <a:pPr algn="ctr"/>
+            <a:r>
+              <a:rPr lang="fr-FR" sz="900" noProof="1">
+                <a:solidFill>
+                  <a:schemeClr val="tx1"/>
+                </a:solidFill>
+                <a:latin typeface="Cambria" panose="02040503050406030204" pitchFamily="18" charset="0"/>
+                <a:ea typeface="Arial Rounded MT Bold" charset="0"/>
+                <a:cs typeface="Arial Rounded MT Bold" charset="0"/>
+              </a:rPr>
+              <a:t>Receiver / Capture Filter</a:t>
+            </a:r>
+          </a:p>
+          <a:p>
+            <a:pPr algn="ctr"/>
+            <a:r>
+              <a:rPr lang="fr-FR" sz="900" noProof="1">
+                <a:solidFill>
+                  <a:schemeClr val="tx1"/>
+                </a:solidFill>
+                <a:latin typeface="Cambria" panose="02040503050406030204" pitchFamily="18" charset="0"/>
+                <a:ea typeface="Arial Rounded MT Bold" charset="0"/>
+                <a:cs typeface="Arial Rounded MT Bold" charset="0"/>
+              </a:rPr>
+              <a:t>optional, proprietary, enumerate all</a:t>
+            </a:r>
+          </a:p>
+          <a:p>
+            <a:pPr algn="ctr"/>
+            <a:r>
+              <a:rPr lang="fr-FR" sz="900" noProof="1">
+                <a:solidFill>
+                  <a:schemeClr val="tx1"/>
+                </a:solidFill>
+                <a:latin typeface="Consolas" panose="020B0609020204030204" pitchFamily="49" charset="0"/>
+                <a:ea typeface="Arial Rounded MT Bold" charset="0"/>
+                <a:cs typeface="Arial Rounded MT Bold" charset="0"/>
+              </a:rPr>
+              <a:t>KSCATEGORY_BDA_RECEIVER_COMPONENT</a:t>
+            </a:r>
+          </a:p>
+        </p:txBody>
+      </p:sp>
+      <p:cxnSp>
+        <p:nvCxnSpPr>
+          <p:cNvPr id="7" name="Straight Arrow Connector 6"/>
+          <p:cNvCxnSpPr>
+            <a:stCxn id="3" idx="2"/>
+            <a:endCxn id="6" idx="0"/>
+          </p:cNvCxnSpPr>
+          <p:nvPr/>
+        </p:nvCxnSpPr>
+        <p:spPr>
+          <a:xfrm>
+            <a:off x="2133444" y="2862266"/>
+            <a:ext cx="0" cy="327521"/>
+          </a:xfrm>
+          <a:prstGeom prst="straightConnector1">
+            <a:avLst/>
+          </a:prstGeom>
+          <a:solidFill>
+            <a:schemeClr val="accent6">
+              <a:lumMod val="40000"/>
+              <a:lumOff val="60000"/>
+            </a:schemeClr>
+          </a:solidFill>
+          <a:ln w="28575">
+            <a:solidFill>
+              <a:srgbClr val="1F8A4C"/>
+            </a:solidFill>
+            <a:tailEnd type="triangle"/>
+          </a:ln>
+        </p:spPr>
+        <p:style>
+          <a:lnRef idx="2">
+            <a:schemeClr val="accent1">
+              <a:shade val="50000"/>
+            </a:schemeClr>
+          </a:lnRef>
+          <a:fillRef idx="1">
+            <a:schemeClr val="accent1"/>
+          </a:fillRef>
+          <a:effectRef idx="0">
+            <a:schemeClr val="accent1"/>
+          </a:effectRef>
+          <a:fontRef idx="minor">
+            <a:schemeClr val="lt1"/>
+          </a:fontRef>
+        </p:style>
+      </p:cxnSp>
+      <p:sp>
+        <p:nvSpPr>
+          <p:cNvPr id="11" name="Rectangle à coins arrondis 40"/>
+          <p:cNvSpPr/>
+          <p:nvPr/>
+        </p:nvSpPr>
+        <p:spPr>
+          <a:xfrm>
+            <a:off x="909444" y="4057308"/>
+            <a:ext cx="2448000" cy="540000"/>
+          </a:xfrm>
+          <a:custGeom>
+            <a:avLst/>
+            <a:gdLst>
+              <a:gd name="connsiteX0" fmla="*/ 0 w 1987061"/>
+              <a:gd name="connsiteY0" fmla="*/ 62890 h 377331"/>
+              <a:gd name="connsiteX1" fmla="*/ 62890 w 1987061"/>
+              <a:gd name="connsiteY1" fmla="*/ 0 h 377331"/>
+              <a:gd name="connsiteX2" fmla="*/ 1924171 w 1987061"/>
+              <a:gd name="connsiteY2" fmla="*/ 0 h 377331"/>
+              <a:gd name="connsiteX3" fmla="*/ 1987061 w 1987061"/>
+              <a:gd name="connsiteY3" fmla="*/ 62890 h 377331"/>
+              <a:gd name="connsiteX4" fmla="*/ 1987061 w 1987061"/>
+              <a:gd name="connsiteY4" fmla="*/ 314441 h 377331"/>
+              <a:gd name="connsiteX5" fmla="*/ 1924171 w 1987061"/>
+              <a:gd name="connsiteY5" fmla="*/ 377331 h 377331"/>
+              <a:gd name="connsiteX6" fmla="*/ 62890 w 1987061"/>
+              <a:gd name="connsiteY6" fmla="*/ 377331 h 377331"/>
+              <a:gd name="connsiteX7" fmla="*/ 0 w 1987061"/>
+              <a:gd name="connsiteY7" fmla="*/ 314441 h 377331"/>
+              <a:gd name="connsiteX8" fmla="*/ 0 w 1987061"/>
+              <a:gd name="connsiteY8" fmla="*/ 62890 h 377331"/>
+              <a:gd name="connsiteX0" fmla="*/ 0 w 1987061"/>
+              <a:gd name="connsiteY0" fmla="*/ 62890 h 377331"/>
+              <a:gd name="connsiteX1" fmla="*/ 62890 w 1987061"/>
+              <a:gd name="connsiteY1" fmla="*/ 0 h 377331"/>
+              <a:gd name="connsiteX2" fmla="*/ 1924171 w 1987061"/>
+              <a:gd name="connsiteY2" fmla="*/ 0 h 377331"/>
+              <a:gd name="connsiteX3" fmla="*/ 1987061 w 1987061"/>
+              <a:gd name="connsiteY3" fmla="*/ 62890 h 377331"/>
+              <a:gd name="connsiteX4" fmla="*/ 1987061 w 1987061"/>
+              <a:gd name="connsiteY4" fmla="*/ 314441 h 377331"/>
+              <a:gd name="connsiteX5" fmla="*/ 1924171 w 1987061"/>
+              <a:gd name="connsiteY5" fmla="*/ 377331 h 377331"/>
+              <a:gd name="connsiteX6" fmla="*/ 472590 w 1987061"/>
+              <a:gd name="connsiteY6" fmla="*/ 374741 h 377331"/>
+              <a:gd name="connsiteX7" fmla="*/ 62890 w 1987061"/>
+              <a:gd name="connsiteY7" fmla="*/ 377331 h 377331"/>
+              <a:gd name="connsiteX8" fmla="*/ 0 w 1987061"/>
+              <a:gd name="connsiteY8" fmla="*/ 314441 h 377331"/>
+              <a:gd name="connsiteX9" fmla="*/ 0 w 1987061"/>
+              <a:gd name="connsiteY9" fmla="*/ 62890 h 377331"/>
+              <a:gd name="connsiteX0" fmla="*/ 0 w 1987061"/>
+              <a:gd name="connsiteY0" fmla="*/ 62890 h 377331"/>
+              <a:gd name="connsiteX1" fmla="*/ 62890 w 1987061"/>
+              <a:gd name="connsiteY1" fmla="*/ 0 h 377331"/>
+              <a:gd name="connsiteX2" fmla="*/ 1924171 w 1987061"/>
+              <a:gd name="connsiteY2" fmla="*/ 0 h 377331"/>
+              <a:gd name="connsiteX3" fmla="*/ 1987061 w 1987061"/>
+              <a:gd name="connsiteY3" fmla="*/ 62890 h 377331"/>
+              <a:gd name="connsiteX4" fmla="*/ 1987061 w 1987061"/>
+              <a:gd name="connsiteY4" fmla="*/ 314441 h 377331"/>
+              <a:gd name="connsiteX5" fmla="*/ 1924171 w 1987061"/>
+              <a:gd name="connsiteY5" fmla="*/ 377331 h 377331"/>
+              <a:gd name="connsiteX6" fmla="*/ 1367940 w 1987061"/>
+              <a:gd name="connsiteY6" fmla="*/ 374741 h 377331"/>
+              <a:gd name="connsiteX7" fmla="*/ 472590 w 1987061"/>
+              <a:gd name="connsiteY7" fmla="*/ 374741 h 377331"/>
+              <a:gd name="connsiteX8" fmla="*/ 62890 w 1987061"/>
+              <a:gd name="connsiteY8" fmla="*/ 377331 h 377331"/>
+              <a:gd name="connsiteX9" fmla="*/ 0 w 1987061"/>
+              <a:gd name="connsiteY9" fmla="*/ 314441 h 377331"/>
+              <a:gd name="connsiteX10" fmla="*/ 0 w 1987061"/>
+              <a:gd name="connsiteY10" fmla="*/ 62890 h 377331"/>
+              <a:gd name="connsiteX0" fmla="*/ 0 w 1987061"/>
+              <a:gd name="connsiteY0" fmla="*/ 69149 h 383590"/>
+              <a:gd name="connsiteX1" fmla="*/ 62890 w 1987061"/>
+              <a:gd name="connsiteY1" fmla="*/ 6259 h 383590"/>
+              <a:gd name="connsiteX2" fmla="*/ 996465 w 1987061"/>
+              <a:gd name="connsiteY2" fmla="*/ 0 h 383590"/>
+              <a:gd name="connsiteX3" fmla="*/ 1924171 w 1987061"/>
+              <a:gd name="connsiteY3" fmla="*/ 6259 h 383590"/>
+              <a:gd name="connsiteX4" fmla="*/ 1987061 w 1987061"/>
+              <a:gd name="connsiteY4" fmla="*/ 69149 h 383590"/>
+              <a:gd name="connsiteX5" fmla="*/ 1987061 w 1987061"/>
+              <a:gd name="connsiteY5" fmla="*/ 320700 h 383590"/>
+              <a:gd name="connsiteX6" fmla="*/ 1924171 w 1987061"/>
+              <a:gd name="connsiteY6" fmla="*/ 383590 h 383590"/>
+              <a:gd name="connsiteX7" fmla="*/ 1367940 w 1987061"/>
+              <a:gd name="connsiteY7" fmla="*/ 381000 h 383590"/>
+              <a:gd name="connsiteX8" fmla="*/ 472590 w 1987061"/>
+              <a:gd name="connsiteY8" fmla="*/ 381000 h 383590"/>
+              <a:gd name="connsiteX9" fmla="*/ 62890 w 1987061"/>
+              <a:gd name="connsiteY9" fmla="*/ 383590 h 383590"/>
+              <a:gd name="connsiteX10" fmla="*/ 0 w 1987061"/>
+              <a:gd name="connsiteY10" fmla="*/ 320700 h 383590"/>
+              <a:gd name="connsiteX11" fmla="*/ 0 w 1987061"/>
+              <a:gd name="connsiteY11" fmla="*/ 69149 h 383590"/>
+              <a:gd name="connsiteX0" fmla="*/ 0 w 1987061"/>
+              <a:gd name="connsiteY0" fmla="*/ 69149 h 390525"/>
+              <a:gd name="connsiteX1" fmla="*/ 62890 w 1987061"/>
+              <a:gd name="connsiteY1" fmla="*/ 6259 h 390525"/>
+              <a:gd name="connsiteX2" fmla="*/ 996465 w 1987061"/>
+              <a:gd name="connsiteY2" fmla="*/ 0 h 390525"/>
+              <a:gd name="connsiteX3" fmla="*/ 1924171 w 1987061"/>
+              <a:gd name="connsiteY3" fmla="*/ 6259 h 390525"/>
+              <a:gd name="connsiteX4" fmla="*/ 1987061 w 1987061"/>
+              <a:gd name="connsiteY4" fmla="*/ 69149 h 390525"/>
+              <a:gd name="connsiteX5" fmla="*/ 1987061 w 1987061"/>
+              <a:gd name="connsiteY5" fmla="*/ 320700 h 390525"/>
+              <a:gd name="connsiteX6" fmla="*/ 1924171 w 1987061"/>
+              <a:gd name="connsiteY6" fmla="*/ 383590 h 390525"/>
+              <a:gd name="connsiteX7" fmla="*/ 1367940 w 1987061"/>
+              <a:gd name="connsiteY7" fmla="*/ 381000 h 390525"/>
+              <a:gd name="connsiteX8" fmla="*/ 624990 w 1987061"/>
+              <a:gd name="connsiteY8" fmla="*/ 390525 h 390525"/>
+              <a:gd name="connsiteX9" fmla="*/ 62890 w 1987061"/>
+              <a:gd name="connsiteY9" fmla="*/ 383590 h 390525"/>
+              <a:gd name="connsiteX10" fmla="*/ 0 w 1987061"/>
+              <a:gd name="connsiteY10" fmla="*/ 320700 h 390525"/>
+              <a:gd name="connsiteX11" fmla="*/ 0 w 1987061"/>
+              <a:gd name="connsiteY11" fmla="*/ 69149 h 390525"/>
+            </a:gdLst>
+            <a:ahLst/>
+            <a:cxnLst>
+              <a:cxn ang="0">
+                <a:pos x="connsiteX0" y="connsiteY0"/>
+              </a:cxn>
+              <a:cxn ang="0">
+                <a:pos x="connsiteX1" y="connsiteY1"/>
+              </a:cxn>
+              <a:cxn ang="0">
+                <a:pos x="connsiteX2" y="connsiteY2"/>
+              </a:cxn>
+              <a:cxn ang="0">
+                <a:pos x="connsiteX3" y="connsiteY3"/>
+              </a:cxn>
+              <a:cxn ang="0">
+                <a:pos x="connsiteX4" y="connsiteY4"/>
+              </a:cxn>
+              <a:cxn ang="0">
+                <a:pos x="connsiteX5" y="connsiteY5"/>
+              </a:cxn>
+              <a:cxn ang="0">
+                <a:pos x="connsiteX6" y="connsiteY6"/>
+              </a:cxn>
+              <a:cxn ang="0">
+                <a:pos x="connsiteX7" y="connsiteY7"/>
+              </a:cxn>
+              <a:cxn ang="0">
+                <a:pos x="connsiteX8" y="connsiteY8"/>
+              </a:cxn>
+              <a:cxn ang="0">
+                <a:pos x="connsiteX9" y="connsiteY9"/>
+              </a:cxn>
+              <a:cxn ang="0">
+                <a:pos x="connsiteX10" y="connsiteY10"/>
+              </a:cxn>
+              <a:cxn ang="0">
+                <a:pos x="connsiteX11" y="connsiteY11"/>
+              </a:cxn>
+            </a:cxnLst>
+            <a:rect l="l" t="t" r="r" b="b"/>
+            <a:pathLst>
+              <a:path w="1987061" h="390525">
+                <a:moveTo>
+                  <a:pt x="0" y="69149"/>
+                </a:moveTo>
+                <a:cubicBezTo>
+                  <a:pt x="0" y="34416"/>
+                  <a:pt x="28157" y="6259"/>
+                  <a:pt x="62890" y="6259"/>
+                </a:cubicBezTo>
+                <a:lnTo>
+                  <a:pt x="996465" y="0"/>
+                </a:lnTo>
+                <a:lnTo>
+                  <a:pt x="1924171" y="6259"/>
+                </a:lnTo>
+                <a:cubicBezTo>
+                  <a:pt x="1958904" y="6259"/>
+                  <a:pt x="1987061" y="34416"/>
+                  <a:pt x="1987061" y="69149"/>
+                </a:cubicBezTo>
+                <a:lnTo>
+                  <a:pt x="1987061" y="320700"/>
+                </a:lnTo>
+                <a:cubicBezTo>
+                  <a:pt x="1987061" y="355433"/>
+                  <a:pt x="1958904" y="383590"/>
+                  <a:pt x="1924171" y="383590"/>
+                </a:cubicBezTo>
+                <a:lnTo>
+                  <a:pt x="1367940" y="381000"/>
+                </a:lnTo>
+                <a:lnTo>
+                  <a:pt x="624990" y="390525"/>
+                </a:lnTo>
+                <a:lnTo>
+                  <a:pt x="62890" y="383590"/>
+                </a:lnTo>
+                <a:cubicBezTo>
+                  <a:pt x="28157" y="383590"/>
+                  <a:pt x="0" y="355433"/>
+                  <a:pt x="0" y="320700"/>
+                </a:cubicBezTo>
+                <a:lnTo>
+                  <a:pt x="0" y="69149"/>
+                </a:lnTo>
+                <a:close/>
+              </a:path>
+            </a:pathLst>
+          </a:custGeom>
+          <a:solidFill>
+            <a:schemeClr val="accent6">
+              <a:lumMod val="40000"/>
+              <a:lumOff val="60000"/>
+            </a:schemeClr>
+          </a:solidFill>
+          <a:ln w="28575">
+            <a:solidFill>
+              <a:srgbClr val="1F8A4C"/>
+            </a:solidFill>
+          </a:ln>
+        </p:spPr>
+        <p:style>
+          <a:lnRef idx="2">
+            <a:schemeClr val="accent1">
+              <a:shade val="50000"/>
+            </a:schemeClr>
+          </a:lnRef>
+          <a:fillRef idx="1">
+            <a:schemeClr val="accent1"/>
+          </a:fillRef>
+          <a:effectRef idx="0">
+            <a:schemeClr val="accent1"/>
+          </a:effectRef>
+          <a:fontRef idx="minor">
+            <a:schemeClr val="lt1"/>
+          </a:fontRef>
+        </p:style>
+        <p:txBody>
+          <a:bodyPr lIns="36000" rIns="36000" rtlCol="0" anchor="ctr"/>
+          <a:lstStyle/>
+          <a:p>
+            <a:pPr algn="ctr"/>
+            <a:r>
+              <a:rPr lang="fr-FR" sz="900" noProof="1">
+                <a:solidFill>
+                  <a:schemeClr val="tx1"/>
+                </a:solidFill>
+                <a:latin typeface="Cambria" panose="02040503050406030204" pitchFamily="18" charset="0"/>
+                <a:ea typeface="Arial Rounded MT Bold" charset="0"/>
+                <a:cs typeface="Arial Rounded MT Bold" charset="0"/>
+              </a:rPr>
+              <a:t>Infinite Tee Filter</a:t>
+            </a:r>
+          </a:p>
+          <a:p>
+            <a:pPr algn="ctr"/>
+            <a:r>
+              <a:rPr lang="fr-FR" sz="900" noProof="1">
+                <a:solidFill>
+                  <a:schemeClr val="tx1"/>
+                </a:solidFill>
+                <a:latin typeface="Consolas" panose="020B0609020204030204" pitchFamily="49" charset="0"/>
+                <a:ea typeface="Arial Rounded MT Bold" charset="0"/>
+                <a:cs typeface="Arial Rounded MT Bold" charset="0"/>
+              </a:rPr>
+              <a:t>CLSID_InfTee</a:t>
+            </a:r>
+          </a:p>
+        </p:txBody>
+      </p:sp>
+      <p:sp>
+        <p:nvSpPr>
+          <p:cNvPr id="12" name="Rectangle à coins arrondis 40"/>
+          <p:cNvSpPr/>
+          <p:nvPr/>
+        </p:nvSpPr>
+        <p:spPr>
+          <a:xfrm>
+            <a:off x="4098679" y="1544209"/>
+            <a:ext cx="1987061" cy="377331"/>
+          </a:xfrm>
+          <a:prstGeom prst="roundRect">
+            <a:avLst/>
+          </a:prstGeom>
+          <a:solidFill>
+            <a:schemeClr val="accent6">
+              <a:lumMod val="40000"/>
+              <a:lumOff val="60000"/>
+            </a:schemeClr>
+          </a:solidFill>
+          <a:ln w="28575">
+            <a:solidFill>
+              <a:srgbClr val="1F8A4C"/>
+            </a:solidFill>
+          </a:ln>
+        </p:spPr>
+        <p:style>
+          <a:lnRef idx="2">
+            <a:schemeClr val="accent1">
+              <a:shade val="50000"/>
+            </a:schemeClr>
+          </a:lnRef>
+          <a:fillRef idx="1">
+            <a:schemeClr val="accent1"/>
+          </a:fillRef>
+          <a:effectRef idx="0">
+            <a:schemeClr val="accent1"/>
+          </a:effectRef>
+          <a:fontRef idx="minor">
+            <a:schemeClr val="lt1"/>
+          </a:fontRef>
+        </p:style>
+        <p:txBody>
+          <a:bodyPr lIns="36000" rIns="36000" rtlCol="0" anchor="ctr"/>
+          <a:lstStyle/>
+          <a:p>
+            <a:pPr algn="ctr"/>
+            <a:r>
+              <a:rPr lang="fr-FR" sz="900" noProof="1">
+                <a:solidFill>
+                  <a:schemeClr val="tx1"/>
+                </a:solidFill>
+                <a:latin typeface="Cambria" panose="02040503050406030204" pitchFamily="18" charset="0"/>
+                <a:ea typeface="Arial Rounded MT Bold" charset="0"/>
+                <a:cs typeface="Arial Rounded MT Bold" charset="0"/>
+              </a:rPr>
+              <a:t>Tuning Space</a:t>
+            </a:r>
+          </a:p>
+        </p:txBody>
+      </p:sp>
+      <p:cxnSp>
+        <p:nvCxnSpPr>
+          <p:cNvPr id="13" name="Straight Arrow Connector 12"/>
+          <p:cNvCxnSpPr>
+            <a:stCxn id="6" idx="2"/>
+            <a:endCxn id="11" idx="2"/>
+          </p:cNvCxnSpPr>
+          <p:nvPr/>
+        </p:nvCxnSpPr>
+        <p:spPr>
+          <a:xfrm>
+            <a:off x="2133444" y="3729787"/>
+            <a:ext cx="3615" cy="327521"/>
+          </a:xfrm>
+          <a:prstGeom prst="straightConnector1">
+            <a:avLst/>
+          </a:prstGeom>
+          <a:solidFill>
+            <a:schemeClr val="accent6">
+              <a:lumMod val="40000"/>
+              <a:lumOff val="60000"/>
+            </a:schemeClr>
+          </a:solidFill>
+          <a:ln w="28575">
+            <a:solidFill>
+              <a:srgbClr val="1F8A4C"/>
+            </a:solidFill>
+            <a:tailEnd type="triangle"/>
+          </a:ln>
+        </p:spPr>
+        <p:style>
+          <a:lnRef idx="2">
+            <a:schemeClr val="accent1">
+              <a:shade val="50000"/>
+            </a:schemeClr>
+          </a:lnRef>
+          <a:fillRef idx="1">
+            <a:schemeClr val="accent1"/>
+          </a:fillRef>
+          <a:effectRef idx="0">
+            <a:schemeClr val="accent1"/>
+          </a:effectRef>
+          <a:fontRef idx="minor">
+            <a:schemeClr val="lt1"/>
+          </a:fontRef>
+        </p:style>
+      </p:cxnSp>
+      <p:cxnSp>
+        <p:nvCxnSpPr>
+          <p:cNvPr id="16" name="Straight Arrow Connector 15"/>
+          <p:cNvCxnSpPr>
+            <a:stCxn id="12" idx="1"/>
+            <a:endCxn id="4" idx="3"/>
+          </p:cNvCxnSpPr>
+          <p:nvPr/>
+        </p:nvCxnSpPr>
+        <p:spPr>
+          <a:xfrm flipH="1" flipV="1">
+            <a:off x="3357444" y="1728555"/>
+            <a:ext cx="741235" cy="4320"/>
+          </a:xfrm>
+          <a:prstGeom prst="straightConnector1">
+            <a:avLst/>
+          </a:prstGeom>
+          <a:solidFill>
+            <a:schemeClr val="accent6">
+              <a:lumMod val="40000"/>
+              <a:lumOff val="60000"/>
+            </a:schemeClr>
+          </a:solidFill>
+          <a:ln w="28575">
+            <a:solidFill>
+              <a:srgbClr val="1F8A4C"/>
+            </a:solidFill>
+            <a:prstDash val="sysDot"/>
+            <a:tailEnd type="triangle"/>
+          </a:ln>
+        </p:spPr>
+        <p:style>
+          <a:lnRef idx="2">
+            <a:schemeClr val="accent1">
+              <a:shade val="50000"/>
+            </a:schemeClr>
+          </a:lnRef>
+          <a:fillRef idx="1">
+            <a:schemeClr val="accent1"/>
+          </a:fillRef>
+          <a:effectRef idx="0">
+            <a:schemeClr val="accent1"/>
+          </a:effectRef>
+          <a:fontRef idx="minor">
+            <a:schemeClr val="lt1"/>
+          </a:fontRef>
+        </p:style>
+      </p:cxnSp>
+      <p:sp>
+        <p:nvSpPr>
+          <p:cNvPr id="21" name="Rectangle à coins arrondis 40"/>
+          <p:cNvSpPr/>
+          <p:nvPr/>
+        </p:nvSpPr>
+        <p:spPr>
+          <a:xfrm>
+            <a:off x="1979776" y="4931015"/>
+            <a:ext cx="1233808" cy="377331"/>
+          </a:xfrm>
+          <a:prstGeom prst="roundRect">
+            <a:avLst/>
+          </a:prstGeom>
+          <a:solidFill>
+            <a:schemeClr val="accent6">
+              <a:lumMod val="40000"/>
+              <a:lumOff val="60000"/>
+            </a:schemeClr>
+          </a:solidFill>
+          <a:ln w="28575">
+            <a:solidFill>
+              <a:srgbClr val="1F8A4C"/>
+            </a:solidFill>
+          </a:ln>
+        </p:spPr>
+        <p:style>
+          <a:lnRef idx="2">
+            <a:schemeClr val="accent1">
+              <a:shade val="50000"/>
+            </a:schemeClr>
+          </a:lnRef>
+          <a:fillRef idx="1">
+            <a:schemeClr val="accent1"/>
+          </a:fillRef>
+          <a:effectRef idx="0">
+            <a:schemeClr val="accent1"/>
+          </a:effectRef>
+          <a:fontRef idx="minor">
+            <a:schemeClr val="lt1"/>
+          </a:fontRef>
+        </p:style>
+        <p:txBody>
+          <a:bodyPr lIns="36000" rIns="36000" rtlCol="0" anchor="ctr"/>
+          <a:lstStyle/>
+          <a:p>
+            <a:pPr algn="ctr"/>
+            <a:r>
+              <a:rPr lang="fr-FR" sz="900" noProof="1">
+                <a:solidFill>
+                  <a:schemeClr val="tx1"/>
+                </a:solidFill>
+                <a:latin typeface="Cambria" panose="02040503050406030204" pitchFamily="18" charset="0"/>
+                <a:ea typeface="Arial Rounded MT Bold" charset="0"/>
+                <a:cs typeface="Arial Rounded MT Bold" charset="0"/>
+              </a:rPr>
+              <a:t>Sink Filter</a:t>
+            </a:r>
+          </a:p>
+          <a:p>
+            <a:pPr algn="ctr"/>
+            <a:r>
+              <a:rPr lang="fr-FR" sz="900" noProof="1">
+                <a:solidFill>
+                  <a:schemeClr val="tx1"/>
+                </a:solidFill>
+                <a:latin typeface="Cambria" panose="02040503050406030204" pitchFamily="18" charset="0"/>
+                <a:ea typeface="Arial Rounded MT Bold" charset="0"/>
+                <a:cs typeface="Arial Rounded MT Bold" charset="0"/>
+              </a:rPr>
+              <a:t>(TSDuck)</a:t>
+            </a:r>
+          </a:p>
+        </p:txBody>
+      </p:sp>
+      <p:cxnSp>
+        <p:nvCxnSpPr>
+          <p:cNvPr id="22" name="Straight Arrow Connector 21"/>
+          <p:cNvCxnSpPr>
+            <a:stCxn id="11" idx="7"/>
+            <a:endCxn id="21" idx="0"/>
+          </p:cNvCxnSpPr>
+          <p:nvPr/>
+        </p:nvCxnSpPr>
+        <p:spPr>
+          <a:xfrm>
+            <a:off x="2594705" y="4584137"/>
+            <a:ext cx="1975" cy="346878"/>
+          </a:xfrm>
+          <a:prstGeom prst="straightConnector1">
+            <a:avLst/>
+          </a:prstGeom>
+          <a:solidFill>
+            <a:schemeClr val="accent6">
+              <a:lumMod val="40000"/>
+              <a:lumOff val="60000"/>
+            </a:schemeClr>
+          </a:solidFill>
+          <a:ln w="28575">
+            <a:solidFill>
+              <a:srgbClr val="1F8A4C"/>
+            </a:solidFill>
+            <a:tailEnd type="triangle"/>
+          </a:ln>
+        </p:spPr>
+        <p:style>
+          <a:lnRef idx="2">
+            <a:schemeClr val="accent1">
+              <a:shade val="50000"/>
+            </a:schemeClr>
+          </a:lnRef>
+          <a:fillRef idx="1">
+            <a:schemeClr val="accent1"/>
+          </a:fillRef>
+          <a:effectRef idx="0">
+            <a:schemeClr val="accent1"/>
+          </a:effectRef>
+          <a:fontRef idx="minor">
+            <a:schemeClr val="lt1"/>
+          </a:fontRef>
+        </p:style>
+      </p:cxnSp>
+      <p:sp>
+        <p:nvSpPr>
+          <p:cNvPr id="25" name="Rectangle à coins arrondis 40"/>
+          <p:cNvSpPr/>
+          <p:nvPr/>
+        </p:nvSpPr>
+        <p:spPr>
+          <a:xfrm>
+            <a:off x="458058" y="5617741"/>
+            <a:ext cx="2448000" cy="540000"/>
+          </a:xfrm>
+          <a:prstGeom prst="roundRect">
+            <a:avLst/>
+          </a:prstGeom>
+          <a:solidFill>
+            <a:schemeClr val="accent6">
+              <a:lumMod val="40000"/>
+              <a:lumOff val="60000"/>
+            </a:schemeClr>
+          </a:solidFill>
+          <a:ln w="28575">
+            <a:solidFill>
+              <a:srgbClr val="1F8A4C"/>
+            </a:solidFill>
+          </a:ln>
+        </p:spPr>
+        <p:style>
+          <a:lnRef idx="2">
+            <a:schemeClr val="accent1">
+              <a:shade val="50000"/>
+            </a:schemeClr>
+          </a:lnRef>
+          <a:fillRef idx="1">
+            <a:schemeClr val="accent1"/>
+          </a:fillRef>
+          <a:effectRef idx="0">
+            <a:schemeClr val="accent1"/>
+          </a:effectRef>
+          <a:fontRef idx="minor">
+            <a:schemeClr val="lt1"/>
+          </a:fontRef>
+        </p:style>
+        <p:txBody>
+          <a:bodyPr lIns="36000" rIns="36000" rtlCol="0" anchor="ctr"/>
+          <a:lstStyle/>
+          <a:p>
+            <a:pPr algn="ctr"/>
+            <a:r>
+              <a:rPr lang="fr-FR" sz="900" noProof="1">
+                <a:solidFill>
+                  <a:schemeClr val="tx1"/>
+                </a:solidFill>
+                <a:latin typeface="Cambria" panose="02040503050406030204" pitchFamily="18" charset="0"/>
+                <a:ea typeface="Arial Rounded MT Bold" charset="0"/>
+                <a:cs typeface="Arial Rounded MT Bold" charset="0"/>
+              </a:rPr>
+              <a:t>Demux Filter</a:t>
+            </a:r>
+          </a:p>
+          <a:p>
+            <a:pPr algn="ctr"/>
+            <a:r>
+              <a:rPr lang="fr-FR" sz="900" noProof="1">
+                <a:solidFill>
+                  <a:schemeClr val="tx1"/>
+                </a:solidFill>
+                <a:latin typeface="Consolas" panose="020B0609020204030204" pitchFamily="49" charset="0"/>
+                <a:ea typeface="Arial Rounded MT Bold" charset="0"/>
+                <a:cs typeface="Arial Rounded MT Bold" charset="0"/>
+              </a:rPr>
+              <a:t>CLSID_MPEG2Demultiplexer</a:t>
+            </a:r>
+          </a:p>
+        </p:txBody>
+      </p:sp>
+      <p:cxnSp>
+        <p:nvCxnSpPr>
+          <p:cNvPr id="26" name="Straight Arrow Connector 25"/>
+          <p:cNvCxnSpPr>
+            <a:stCxn id="11" idx="8"/>
+            <a:endCxn id="25" idx="0"/>
+          </p:cNvCxnSpPr>
+          <p:nvPr/>
+        </p:nvCxnSpPr>
+        <p:spPr>
+          <a:xfrm>
+            <a:off x="1679413" y="4597308"/>
+            <a:ext cx="2645" cy="1020433"/>
+          </a:xfrm>
+          <a:prstGeom prst="straightConnector1">
+            <a:avLst/>
+          </a:prstGeom>
+          <a:solidFill>
+            <a:schemeClr val="accent6">
+              <a:lumMod val="40000"/>
+              <a:lumOff val="60000"/>
+            </a:schemeClr>
+          </a:solidFill>
+          <a:ln w="28575">
+            <a:solidFill>
+              <a:srgbClr val="1F8A4C"/>
+            </a:solidFill>
+            <a:tailEnd type="triangle"/>
+          </a:ln>
+        </p:spPr>
+        <p:style>
+          <a:lnRef idx="2">
+            <a:schemeClr val="accent1">
+              <a:shade val="50000"/>
+            </a:schemeClr>
+          </a:lnRef>
+          <a:fillRef idx="1">
+            <a:schemeClr val="accent1"/>
+          </a:fillRef>
+          <a:effectRef idx="0">
+            <a:schemeClr val="accent1"/>
+          </a:effectRef>
+          <a:fontRef idx="minor">
+            <a:schemeClr val="lt1"/>
+          </a:fontRef>
+        </p:style>
+      </p:cxnSp>
+      <p:sp>
+        <p:nvSpPr>
+          <p:cNvPr id="30" name="Rectangle à coins arrondis 40"/>
+          <p:cNvSpPr/>
+          <p:nvPr/>
+        </p:nvSpPr>
+        <p:spPr>
+          <a:xfrm>
+            <a:off x="458058" y="6482833"/>
+            <a:ext cx="2448000" cy="540000"/>
+          </a:xfrm>
+          <a:prstGeom prst="roundRect">
+            <a:avLst/>
+          </a:prstGeom>
+          <a:solidFill>
+            <a:schemeClr val="accent6">
+              <a:lumMod val="40000"/>
+              <a:lumOff val="60000"/>
+            </a:schemeClr>
+          </a:solidFill>
+          <a:ln w="28575">
+            <a:solidFill>
+              <a:srgbClr val="1F8A4C"/>
+            </a:solidFill>
+          </a:ln>
+        </p:spPr>
+        <p:style>
+          <a:lnRef idx="2">
+            <a:schemeClr val="accent1">
+              <a:shade val="50000"/>
+            </a:schemeClr>
+          </a:lnRef>
+          <a:fillRef idx="1">
+            <a:schemeClr val="accent1"/>
+          </a:fillRef>
+          <a:effectRef idx="0">
+            <a:schemeClr val="accent1"/>
+          </a:effectRef>
+          <a:fontRef idx="minor">
+            <a:schemeClr val="lt1"/>
+          </a:fontRef>
+        </p:style>
+        <p:txBody>
+          <a:bodyPr lIns="36000" rIns="36000" rtlCol="0" anchor="ctr"/>
+          <a:lstStyle/>
+          <a:p>
+            <a:pPr algn="ctr"/>
+            <a:r>
+              <a:rPr lang="fr-FR" sz="900" noProof="1">
+                <a:solidFill>
+                  <a:schemeClr val="tx1"/>
+                </a:solidFill>
+                <a:latin typeface="Cambria" panose="02040503050406030204" pitchFamily="18" charset="0"/>
+                <a:ea typeface="Arial Rounded MT Bold" charset="0"/>
+                <a:cs typeface="Arial Rounded MT Bold" charset="0"/>
+              </a:rPr>
+              <a:t>Transport Information Filter (TIF)</a:t>
+            </a:r>
+          </a:p>
+          <a:p>
+            <a:pPr algn="ctr"/>
+            <a:r>
+              <a:rPr lang="fr-FR" sz="900" noProof="1">
+                <a:solidFill>
+                  <a:schemeClr val="tx1"/>
+                </a:solidFill>
+                <a:latin typeface="Cambria" panose="02040503050406030204" pitchFamily="18" charset="0"/>
+                <a:ea typeface="Arial Rounded MT Bold" charset="0"/>
+                <a:cs typeface="Arial Rounded MT Bold" charset="0"/>
+              </a:rPr>
+              <a:t>enumerate all</a:t>
+            </a:r>
+          </a:p>
+          <a:p>
+            <a:pPr algn="ctr"/>
+            <a:r>
+              <a:rPr lang="fr-FR" sz="900" noProof="1">
+                <a:solidFill>
+                  <a:schemeClr val="tx1"/>
+                </a:solidFill>
+                <a:latin typeface="Consolas" panose="020B0609020204030204" pitchFamily="49" charset="0"/>
+                <a:ea typeface="Arial Rounded MT Bold" charset="0"/>
+                <a:cs typeface="Arial Rounded MT Bold" charset="0"/>
+              </a:rPr>
+              <a:t>KSCATEGORY_BDA_TRANSPORT_INFORMATION</a:t>
+            </a:r>
+          </a:p>
+        </p:txBody>
+      </p:sp>
+      <p:cxnSp>
+        <p:nvCxnSpPr>
+          <p:cNvPr id="32" name="Straight Arrow Connector 31"/>
+          <p:cNvCxnSpPr>
+            <a:stCxn id="25" idx="2"/>
+            <a:endCxn id="30" idx="0"/>
+          </p:cNvCxnSpPr>
+          <p:nvPr/>
+        </p:nvCxnSpPr>
+        <p:spPr>
+          <a:xfrm>
+            <a:off x="1682058" y="6157741"/>
+            <a:ext cx="0" cy="325092"/>
+          </a:xfrm>
+          <a:prstGeom prst="straightConnector1">
+            <a:avLst/>
+          </a:prstGeom>
+          <a:solidFill>
+            <a:schemeClr val="accent6">
+              <a:lumMod val="40000"/>
+              <a:lumOff val="60000"/>
+            </a:schemeClr>
+          </a:solidFill>
+          <a:ln w="28575">
+            <a:solidFill>
+              <a:srgbClr val="1F8A4C"/>
+            </a:solidFill>
+            <a:tailEnd type="triangle"/>
+          </a:ln>
+        </p:spPr>
+        <p:style>
+          <a:lnRef idx="2">
+            <a:schemeClr val="accent1">
+              <a:shade val="50000"/>
+            </a:schemeClr>
+          </a:lnRef>
+          <a:fillRef idx="1">
+            <a:schemeClr val="accent1"/>
+          </a:fillRef>
+          <a:effectRef idx="0">
+            <a:schemeClr val="accent1"/>
+          </a:effectRef>
+          <a:fontRef idx="minor">
+            <a:schemeClr val="lt1"/>
+          </a:fontRef>
+        </p:style>
+      </p:cxnSp>
+      <p:sp>
+        <p:nvSpPr>
+          <p:cNvPr id="35" name="TextBox 34"/>
+          <p:cNvSpPr txBox="1"/>
+          <p:nvPr/>
+        </p:nvSpPr>
+        <p:spPr>
+          <a:xfrm>
+            <a:off x="3497519" y="1520058"/>
+            <a:ext cx="390525" cy="230832"/>
+          </a:xfrm>
+          <a:prstGeom prst="rect">
+            <a:avLst/>
+          </a:prstGeom>
+          <a:noFill/>
+        </p:spPr>
+        <p:txBody>
+          <a:bodyPr wrap="square" rtlCol="0">
+            <a:spAutoFit/>
+          </a:bodyPr>
+          <a:lstStyle/>
+          <a:p>
+            <a:r>
+              <a:rPr lang="fr-FR" sz="900" dirty="0">
+                <a:latin typeface="Cambria" panose="02040503050406030204" pitchFamily="18" charset="0"/>
+                <a:ea typeface="Cambria" panose="02040503050406030204" pitchFamily="18" charset="0"/>
+              </a:rPr>
+              <a:t>put</a:t>
+            </a:r>
+            <a:endParaRPr lang="en-US" sz="900" dirty="0">
+              <a:latin typeface="Cambria" panose="02040503050406030204" pitchFamily="18" charset="0"/>
+              <a:ea typeface="Cambria" panose="02040503050406030204" pitchFamily="18" charset="0"/>
+            </a:endParaRPr>
+          </a:p>
+        </p:txBody>
+      </p:sp>
+      <p:sp>
+        <p:nvSpPr>
+          <p:cNvPr id="52" name="Rectangle à coins arrondis 40"/>
+          <p:cNvSpPr/>
+          <p:nvPr/>
+        </p:nvSpPr>
+        <p:spPr>
+          <a:xfrm>
+            <a:off x="4098679" y="4921018"/>
+            <a:ext cx="1987061" cy="377331"/>
+          </a:xfrm>
+          <a:prstGeom prst="roundRect">
+            <a:avLst/>
+          </a:prstGeom>
+          <a:noFill/>
+          <a:ln w="28575">
+            <a:solidFill>
+              <a:schemeClr val="accent6">
+                <a:lumMod val="60000"/>
+                <a:lumOff val="40000"/>
+              </a:schemeClr>
+            </a:solidFill>
+          </a:ln>
+        </p:spPr>
+        <p:style>
+          <a:lnRef idx="2">
+            <a:schemeClr val="accent1">
+              <a:shade val="50000"/>
+            </a:schemeClr>
+          </a:lnRef>
+          <a:fillRef idx="1">
+            <a:schemeClr val="accent1"/>
+          </a:fillRef>
+          <a:effectRef idx="0">
+            <a:schemeClr val="accent1"/>
+          </a:effectRef>
+          <a:fontRef idx="minor">
+            <a:schemeClr val="lt1"/>
+          </a:fontRef>
+        </p:style>
+        <p:txBody>
+          <a:bodyPr lIns="36000" rIns="36000" rtlCol="0" anchor="ctr"/>
+          <a:lstStyle/>
+          <a:p>
+            <a:pPr algn="ctr"/>
+            <a:r>
+              <a:rPr lang="fr-FR" sz="900" noProof="1">
+                <a:solidFill>
+                  <a:schemeClr val="tx1"/>
+                </a:solidFill>
+                <a:latin typeface="Consolas" panose="020B0609020204030204" pitchFamily="49" charset="0"/>
+                <a:ea typeface="Arial Rounded MT Bold" charset="0"/>
+                <a:cs typeface="Arial Rounded MT Bold" charset="0"/>
+              </a:rPr>
+              <a:t>ts::Tuner</a:t>
+            </a:r>
+            <a:r>
+              <a:rPr lang="fr-FR" sz="900" noProof="1">
+                <a:solidFill>
+                  <a:schemeClr val="tx1"/>
+                </a:solidFill>
+                <a:latin typeface="Cambria" panose="02040503050406030204" pitchFamily="18" charset="0"/>
+                <a:ea typeface="Arial Rounded MT Bold" charset="0"/>
+                <a:cs typeface="Arial Rounded MT Bold" charset="0"/>
+              </a:rPr>
+              <a:t> class</a:t>
+            </a:r>
+          </a:p>
+        </p:txBody>
+      </p:sp>
+      <p:cxnSp>
+        <p:nvCxnSpPr>
+          <p:cNvPr id="53" name="Straight Arrow Connector 52"/>
+          <p:cNvCxnSpPr>
+            <a:stCxn id="21" idx="3"/>
+            <a:endCxn id="52" idx="1"/>
+          </p:cNvCxnSpPr>
+          <p:nvPr/>
+        </p:nvCxnSpPr>
+        <p:spPr>
+          <a:xfrm flipV="1">
+            <a:off x="3213584" y="5109684"/>
+            <a:ext cx="885095" cy="9997"/>
+          </a:xfrm>
+          <a:prstGeom prst="straightConnector1">
+            <a:avLst/>
+          </a:prstGeom>
+          <a:solidFill>
+            <a:schemeClr val="accent6">
+              <a:lumMod val="40000"/>
+              <a:lumOff val="60000"/>
+            </a:schemeClr>
+          </a:solidFill>
+          <a:ln w="28575">
+            <a:solidFill>
+              <a:srgbClr val="1F8A4C"/>
+            </a:solidFill>
+            <a:prstDash val="sysDot"/>
+            <a:tailEnd type="triangle"/>
+          </a:ln>
+        </p:spPr>
+        <p:style>
+          <a:lnRef idx="2">
+            <a:schemeClr val="accent1">
+              <a:shade val="50000"/>
+            </a:schemeClr>
+          </a:lnRef>
+          <a:fillRef idx="1">
+            <a:schemeClr val="accent1"/>
+          </a:fillRef>
+          <a:effectRef idx="0">
+            <a:schemeClr val="accent1"/>
+          </a:effectRef>
+          <a:fontRef idx="minor">
+            <a:schemeClr val="lt1"/>
+          </a:fontRef>
+        </p:style>
+      </p:cxnSp>
+      <p:sp>
+        <p:nvSpPr>
+          <p:cNvPr id="54" name="TextBox 53"/>
+          <p:cNvSpPr txBox="1"/>
+          <p:nvPr/>
+        </p:nvSpPr>
+        <p:spPr>
+          <a:xfrm>
+            <a:off x="3396073" y="4883018"/>
+            <a:ext cx="472536" cy="369332"/>
+          </a:xfrm>
+          <a:prstGeom prst="rect">
+            <a:avLst/>
+          </a:prstGeom>
+          <a:noFill/>
+        </p:spPr>
+        <p:txBody>
+          <a:bodyPr wrap="square" rtlCol="0">
+            <a:spAutoFit/>
+          </a:bodyPr>
+          <a:lstStyle/>
+          <a:p>
+            <a:r>
+              <a:rPr lang="fr-FR" sz="900" dirty="0">
+                <a:latin typeface="Cambria" panose="02040503050406030204" pitchFamily="18" charset="0"/>
+                <a:ea typeface="Cambria" panose="02040503050406030204" pitchFamily="18" charset="0"/>
+              </a:rPr>
+              <a:t>Read</a:t>
+            </a:r>
+            <a:endParaRPr lang="en-US" sz="900" dirty="0">
+              <a:latin typeface="Cambria" panose="02040503050406030204" pitchFamily="18" charset="0"/>
+              <a:ea typeface="Cambria" panose="02040503050406030204" pitchFamily="18" charset="0"/>
+            </a:endParaRPr>
+          </a:p>
+        </p:txBody>
+      </p:sp>
+      <p:pic>
+        <p:nvPicPr>
+          <p:cNvPr id="57" name="Picture 7" descr="D:\Devel\tsduck\images\tsduck-48.png"/>
+          <p:cNvPicPr>
+            <a:picLocks noChangeAspect="1" noChangeArrowheads="1"/>
+          </p:cNvPicPr>
+          <p:nvPr/>
+        </p:nvPicPr>
+        <p:blipFill>
+          <a:blip r:embed="rId2">
+            <a:extLst>
+              <a:ext uri="{28A0092B-C50C-407E-A947-70E740481C1C}">
+                <a14:useLocalDpi xmlns:a14="http://schemas.microsoft.com/office/drawing/2010/main" val="0"/>
+              </a:ext>
+            </a:extLst>
+          </a:blip>
+          <a:srcRect/>
+          <a:stretch>
+            <a:fillRect/>
+          </a:stretch>
+        </p:blipFill>
+        <p:spPr bwMode="auto">
+          <a:xfrm>
+            <a:off x="5620335" y="6882930"/>
+            <a:ext cx="146050" cy="146050"/>
+          </a:xfrm>
+          <a:prstGeom prst="rect">
+            <a:avLst/>
+          </a:prstGeom>
+          <a:noFill/>
+          <a:extLst>
+            <a:ext uri="{909E8E84-426E-40DD-AFC4-6F175D3DCCD1}">
+              <a14:hiddenFill xmlns:a14="http://schemas.microsoft.com/office/drawing/2010/main">
+                <a:solidFill>
+                  <a:srgbClr val="FFFFFF"/>
+                </a:solidFill>
+              </a14:hiddenFill>
+            </a:ext>
+          </a:extLst>
+        </p:spPr>
+      </p:pic>
+      <p:sp>
+        <p:nvSpPr>
+          <p:cNvPr id="58" name="ZoneTexte 241"/>
+          <p:cNvSpPr txBox="1"/>
+          <p:nvPr/>
+        </p:nvSpPr>
+        <p:spPr>
+          <a:xfrm>
+            <a:off x="5783584" y="6902094"/>
+            <a:ext cx="302156" cy="107722"/>
+          </a:xfrm>
+          <a:prstGeom prst="rect">
+            <a:avLst/>
+          </a:prstGeom>
+          <a:noFill/>
+        </p:spPr>
+        <p:txBody>
+          <a:bodyPr wrap="square" lIns="0" tIns="0" rIns="0" bIns="0" rtlCol="0">
+            <a:spAutoFit/>
+          </a:bodyPr>
+          <a:lstStyle/>
+          <a:p>
+            <a:r>
+              <a:rPr lang="fr-FR" sz="700" noProof="1">
+                <a:latin typeface="Cambria" panose="02040503050406030204" pitchFamily="18" charset="0"/>
+                <a:ea typeface="Arial Rounded MT Bold" charset="0"/>
+                <a:cs typeface="Arial Rounded MT Bold" charset="0"/>
+              </a:rPr>
+              <a:t>TSDuck</a:t>
+            </a:r>
+          </a:p>
+        </p:txBody>
+      </p:sp>
+      <p:sp>
+        <p:nvSpPr>
+          <p:cNvPr id="59" name="TextBox 58"/>
+          <p:cNvSpPr txBox="1"/>
+          <p:nvPr/>
+        </p:nvSpPr>
+        <p:spPr>
+          <a:xfrm>
+            <a:off x="3530112" y="6429079"/>
+            <a:ext cx="2555628" cy="415498"/>
+          </a:xfrm>
+          <a:prstGeom prst="rect">
+            <a:avLst/>
+          </a:prstGeom>
+          <a:noFill/>
+        </p:spPr>
+        <p:txBody>
+          <a:bodyPr wrap="square" lIns="0" rIns="0" rtlCol="0">
+            <a:spAutoFit/>
+          </a:bodyPr>
+          <a:lstStyle/>
+          <a:p>
+            <a:pPr algn="r"/>
+            <a:r>
+              <a:rPr lang="fr-FR" sz="1050" b="1" dirty="0">
+                <a:latin typeface="Cambria" panose="02040503050406030204" pitchFamily="18" charset="0"/>
+                <a:ea typeface="Cambria" panose="02040503050406030204" pitchFamily="18" charset="0"/>
+              </a:rPr>
+              <a:t>DirectShow graph for</a:t>
+            </a:r>
+          </a:p>
+          <a:p>
+            <a:pPr algn="r"/>
+            <a:r>
+              <a:rPr lang="fr-FR" sz="1050" b="1" dirty="0">
+                <a:latin typeface="Cambria" panose="02040503050406030204" pitchFamily="18" charset="0"/>
+                <a:ea typeface="Cambria" panose="02040503050406030204" pitchFamily="18" charset="0"/>
+              </a:rPr>
+              <a:t> TSDuck tuner on Windows</a:t>
+            </a:r>
+            <a:endParaRPr lang="en-US" sz="1050" b="1" dirty="0">
+              <a:latin typeface="Cambria" panose="02040503050406030204" pitchFamily="18" charset="0"/>
+              <a:ea typeface="Cambria" panose="02040503050406030204" pitchFamily="18" charset="0"/>
+            </a:endParaRPr>
+          </a:p>
+        </p:txBody>
+      </p:sp>
+    </p:spTree>
+    <p:extLst>
+      <p:ext uri="{BB962C8B-B14F-4D97-AF65-F5344CB8AC3E}">
+        <p14:creationId xmlns:p14="http://schemas.microsoft.com/office/powerpoint/2010/main" val="3183673908"/>
       </p:ext>
     </p:extLst>
   </p:cSld>
@@ -16121,7 +17116,7 @@
   <a:extraClrSchemeLst/>
   <a:extLst>
     <a:ext uri="{05A4C25C-085E-4340-85A3-A5531E510DB2}">
-      <thm15:themeFamily xmlns:thm15="http://schemas.microsoft.com/office/thememl/2012/main" xmlns="" name="Office Theme" id="{62F939B6-93AF-4DB8-9C6B-D6C7DFDC589F}" vid="{4A3C46E8-61CC-4603-A589-7422A47A8E4A}"/>
+      <thm15:themeFamily xmlns:thm15="http://schemas.microsoft.com/office/thememl/2012/main" name="Office Theme" id="{62F939B6-93AF-4DB8-9C6B-D6C7DFDC589F}" vid="{4A3C46E8-61CC-4603-A589-7422A47A8E4A}"/>
     </a:ext>
   </a:extLst>
 </a:theme>

</xml_diff>